<commit_message>
Did some work on OTel presentation. Still a work in progress
</commit_message>
<xml_diff>
--- a/2023-03 - Orlando Code Camp - OpenTelemetry/Presentation.pptx
+++ b/2023-03 - Orlando Code Camp - OpenTelemetry/Presentation.pptx
@@ -6,10 +6,14 @@
   </p:sldMasterIdLst>
   <p:sldIdLst>
     <p:sldId id="256" r:id="rId2"/>
-    <p:sldId id="257" r:id="rId3"/>
-    <p:sldId id="258" r:id="rId4"/>
-    <p:sldId id="259" r:id="rId5"/>
-    <p:sldId id="260" r:id="rId6"/>
+    <p:sldId id="264" r:id="rId3"/>
+    <p:sldId id="261" r:id="rId4"/>
+    <p:sldId id="263" r:id="rId5"/>
+    <p:sldId id="262" r:id="rId6"/>
+    <p:sldId id="257" r:id="rId7"/>
+    <p:sldId id="258" r:id="rId8"/>
+    <p:sldId id="259" r:id="rId9"/>
+    <p:sldId id="260" r:id="rId10"/>
   </p:sldIdLst>
   <p:sldSz cx="12192000" cy="6858000"/>
   <p:notesSz cx="6858000" cy="9144000"/>
@@ -108,6 +112,11 @@
       </a:defRPr>
     </a:lvl9pPr>
   </p:defaultTextStyle>
+  <p:extLst>
+    <p:ext uri="{EFAFB233-063F-42B5-8137-9DF3F51BA10A}">
+      <p15:sldGuideLst xmlns:p15="http://schemas.microsoft.com/office/powerpoint/2012/main"/>
+    </p:ext>
+  </p:extLst>
 </p:presentation>
 </file>
 
@@ -3356,29 +3365,19 @@
                 <a:effectLst/>
                 <a:latin typeface="Arial" panose="020B0604020202020204" pitchFamily="34" charset="0"/>
               </a:rPr>
-              <a:t>Intro to </a:t>
-            </a:r>
-            <a:r>
-              <a:rPr lang="en-US" b="1" i="0" dirty="0" err="1">
+              <a:t>Intro to OpenTelemetry </a:t>
+            </a:r>
+            <a:r>
+              <a:rPr lang="en-US" sz="3000" i="0" dirty="0">
                 <a:solidFill>
                   <a:srgbClr val="111111"/>
                 </a:solidFill>
                 <a:effectLst/>
                 <a:latin typeface="Arial" panose="020B0604020202020204" pitchFamily="34" charset="0"/>
               </a:rPr>
-              <a:t>OpenTelemetry</a:t>
-            </a:r>
-            <a:r>
-              <a:rPr lang="en-US" b="1" i="0" dirty="0">
-                <a:solidFill>
-                  <a:srgbClr val="111111"/>
-                </a:solidFill>
-                <a:effectLst/>
-                <a:latin typeface="Arial" panose="020B0604020202020204" pitchFamily="34" charset="0"/>
-              </a:rPr>
-              <a:t> with C# Applications</a:t>
-            </a:r>
-            <a:endParaRPr lang="en-US" dirty="0"/>
+              <a:t>(with C# Applications)</a:t>
+            </a:r>
+            <a:endParaRPr lang="en-US" sz="3000" dirty="0"/>
           </a:p>
         </p:txBody>
       </p:sp>
@@ -3463,7 +3462,7 @@
           <p:cNvPr id="2" name="Title 1">
             <a:extLst>
               <a:ext uri="{FF2B5EF4-FFF2-40B4-BE49-F238E27FC236}">
-                <a16:creationId xmlns:a16="http://schemas.microsoft.com/office/drawing/2014/main" id="{5E307F74-4B66-E256-883D-61DAB1C2B0A8}"/>
+                <a16:creationId xmlns:a16="http://schemas.microsoft.com/office/drawing/2014/main" id="{529AA271-9006-EEE5-25FA-09B86FD0CE1B}"/>
               </a:ext>
             </a:extLst>
           </p:cNvPr>
@@ -3481,56 +3480,75 @@
           <a:p>
             <a:r>
               <a:rPr lang="en-US" dirty="0"/>
-              <a:t>What is </a:t>
-            </a:r>
-            <a:r>
-              <a:rPr lang="en-US" dirty="0" err="1"/>
-              <a:t>OpenTelemetry</a:t>
-            </a:r>
+              <a:t>Links</a:t>
+            </a:r>
+          </a:p>
+        </p:txBody>
+      </p:sp>
+      <p:sp>
+        <p:nvSpPr>
+          <p:cNvPr id="3" name="Content Placeholder 2">
+            <a:extLst>
+              <a:ext uri="{FF2B5EF4-FFF2-40B4-BE49-F238E27FC236}">
+                <a16:creationId xmlns:a16="http://schemas.microsoft.com/office/drawing/2014/main" id="{8359EA30-E929-2DE7-0FEA-4F54AA81D473}"/>
+              </a:ext>
+            </a:extLst>
+          </p:cNvPr>
+          <p:cNvSpPr>
+            <a:spLocks noGrp="1"/>
+          </p:cNvSpPr>
+          <p:nvPr>
+            <p:ph idx="1"/>
+          </p:nvPr>
+        </p:nvSpPr>
+        <p:spPr/>
+        <p:txBody>
+          <a:bodyPr/>
+          <a:lstStyle/>
+          <a:p>
             <a:r>
               <a:rPr lang="en-US" dirty="0"/>
-              <a:t> (</a:t>
-            </a:r>
-            <a:r>
-              <a:rPr lang="en-US"/>
-              <a:t>OTel</a:t>
+              <a:t>GitHub Repo:</a:t>
+            </a:r>
+          </a:p>
+          <a:p>
+            <a:pPr lvl="1"/>
+            <a:r>
+              <a:rPr lang="en-US" dirty="0">
+                <a:hlinkClick r:id="rId2"/>
+              </a:rPr>
+              <a:t>https://github.com/ProgrammerAl/Presentations-2023</a:t>
             </a:r>
             <a:r>
               <a:rPr lang="en-US" dirty="0"/>
-              <a:t>)?</a:t>
-            </a:r>
-          </a:p>
-        </p:txBody>
-      </p:sp>
-      <p:sp>
-        <p:nvSpPr>
-          <p:cNvPr id="3" name="Content Placeholder 2">
-            <a:extLst>
-              <a:ext uri="{FF2B5EF4-FFF2-40B4-BE49-F238E27FC236}">
-                <a16:creationId xmlns:a16="http://schemas.microsoft.com/office/drawing/2014/main" id="{B70B10D9-25F8-1530-119E-C1523AD1F882}"/>
-              </a:ext>
-            </a:extLst>
-          </p:cNvPr>
-          <p:cNvSpPr>
-            <a:spLocks noGrp="1"/>
-          </p:cNvSpPr>
-          <p:nvPr>
-            <p:ph idx="1"/>
-          </p:nvPr>
-        </p:nvSpPr>
-        <p:spPr/>
-        <p:txBody>
-          <a:bodyPr/>
-          <a:lstStyle/>
-          <a:p>
-            <a:endParaRPr lang="en-US"/>
+              <a:t> </a:t>
+            </a:r>
+          </a:p>
+          <a:p>
+            <a:r>
+              <a:rPr lang="en-US" dirty="0"/>
+              <a:t>This Talk: </a:t>
+            </a:r>
+          </a:p>
+          <a:p>
+            <a:pPr lvl="1"/>
+            <a:r>
+              <a:rPr lang="en-US" dirty="0">
+                <a:hlinkClick r:id="rId3"/>
+              </a:rPr>
+              <a:t>https://github.com/ProgrammerAl/Presentations-2023/tree/main/2023-03%20-%20Orlando%20Code%20Camp%20-%20OpenTelemetry</a:t>
+            </a:r>
+            <a:r>
+              <a:rPr lang="en-US" dirty="0"/>
+              <a:t> </a:t>
+            </a:r>
           </a:p>
         </p:txBody>
       </p:sp>
     </p:spTree>
     <p:extLst>
       <p:ext uri="{BB962C8B-B14F-4D97-AF65-F5344CB8AC3E}">
-        <p14:creationId xmlns:p14="http://schemas.microsoft.com/office/powerpoint/2010/main" val="1831172772"/>
+        <p14:creationId xmlns:p14="http://schemas.microsoft.com/office/powerpoint/2010/main" val="1364794253"/>
       </p:ext>
     </p:extLst>
   </p:cSld>
@@ -3562,7 +3580,7 @@
           <p:cNvPr id="2" name="Title 1">
             <a:extLst>
               <a:ext uri="{FF2B5EF4-FFF2-40B4-BE49-F238E27FC236}">
-                <a16:creationId xmlns:a16="http://schemas.microsoft.com/office/drawing/2014/main" id="{D8B96612-17A0-176A-92F7-3BCE97F3A665}"/>
+                <a16:creationId xmlns:a16="http://schemas.microsoft.com/office/drawing/2014/main" id="{EDF53E10-2794-ADE5-8E75-D602C7FC4C68}"/>
               </a:ext>
             </a:extLst>
           </p:cNvPr>
@@ -3578,7 +3596,10 @@
           <a:bodyPr/>
           <a:lstStyle/>
           <a:p>
-            <a:endParaRPr lang="en-US"/>
+            <a:r>
+              <a:rPr lang="en-US" dirty="0"/>
+              <a:t>Level Setting – What existed before OTel</a:t>
+            </a:r>
           </a:p>
         </p:txBody>
       </p:sp>
@@ -3587,7 +3608,7 @@
           <p:cNvPr id="3" name="Content Placeholder 2">
             <a:extLst>
               <a:ext uri="{FF2B5EF4-FFF2-40B4-BE49-F238E27FC236}">
-                <a16:creationId xmlns:a16="http://schemas.microsoft.com/office/drawing/2014/main" id="{E2E199BB-9297-AC8A-E12E-8C5CB312F3FD}"/>
+                <a16:creationId xmlns:a16="http://schemas.microsoft.com/office/drawing/2014/main" id="{6C04272E-9577-1251-FB88-A61452ECF9FD}"/>
               </a:ext>
             </a:extLst>
           </p:cNvPr>
@@ -3603,14 +3624,35 @@
           <a:bodyPr/>
           <a:lstStyle/>
           <a:p>
-            <a:endParaRPr lang="en-US"/>
+            <a:r>
+              <a:rPr lang="en-US" dirty="0"/>
+              <a:t>1957</a:t>
+            </a:r>
+          </a:p>
+          <a:p>
+            <a:pPr lvl="1"/>
+            <a:r>
+              <a:rPr lang="en-US" dirty="0"/>
+              <a:t>Fortran programming language created</a:t>
+            </a:r>
+          </a:p>
+          <a:p>
+            <a:pPr lvl="1"/>
+            <a:r>
+              <a:rPr lang="en-US" dirty="0"/>
+              <a:t>Plain text log messages go to console/files</a:t>
+            </a:r>
+          </a:p>
+          <a:p>
+            <a:pPr lvl="2"/>
+            <a:endParaRPr lang="en-US" dirty="0"/>
           </a:p>
         </p:txBody>
       </p:sp>
     </p:spTree>
     <p:extLst>
       <p:ext uri="{BB962C8B-B14F-4D97-AF65-F5344CB8AC3E}">
-        <p14:creationId xmlns:p14="http://schemas.microsoft.com/office/powerpoint/2010/main" val="2452761775"/>
+        <p14:creationId xmlns:p14="http://schemas.microsoft.com/office/powerpoint/2010/main" val="3412636616"/>
       </p:ext>
     </p:extLst>
   </p:cSld>
@@ -3642,7 +3684,7 @@
           <p:cNvPr id="2" name="Title 1">
             <a:extLst>
               <a:ext uri="{FF2B5EF4-FFF2-40B4-BE49-F238E27FC236}">
-                <a16:creationId xmlns:a16="http://schemas.microsoft.com/office/drawing/2014/main" id="{E9D5BFED-98DA-1F9D-BD38-501E6FA022AC}"/>
+                <a16:creationId xmlns:a16="http://schemas.microsoft.com/office/drawing/2014/main" id="{EDF53E10-2794-ADE5-8E75-D602C7FC4C68}"/>
               </a:ext>
             </a:extLst>
           </p:cNvPr>
@@ -3658,7 +3700,10 @@
           <a:bodyPr/>
           <a:lstStyle/>
           <a:p>
-            <a:endParaRPr lang="en-US"/>
+            <a:r>
+              <a:rPr lang="en-US" dirty="0"/>
+              <a:t>Cont. – What existed before OTel</a:t>
+            </a:r>
           </a:p>
         </p:txBody>
       </p:sp>
@@ -3667,7 +3712,7 @@
           <p:cNvPr id="3" name="Content Placeholder 2">
             <a:extLst>
               <a:ext uri="{FF2B5EF4-FFF2-40B4-BE49-F238E27FC236}">
-                <a16:creationId xmlns:a16="http://schemas.microsoft.com/office/drawing/2014/main" id="{8BED0D18-AA50-7A8C-26EC-7C136586261A}"/>
+                <a16:creationId xmlns:a16="http://schemas.microsoft.com/office/drawing/2014/main" id="{6C04272E-9577-1251-FB88-A61452ECF9FD}"/>
               </a:ext>
             </a:extLst>
           </p:cNvPr>
@@ -3683,14 +3728,88 @@
           <a:bodyPr/>
           <a:lstStyle/>
           <a:p>
-            <a:endParaRPr lang="en-US"/>
-          </a:p>
-        </p:txBody>
-      </p:sp>
+            <a:r>
+              <a:rPr lang="en-US" dirty="0"/>
+              <a:t>2023+</a:t>
+            </a:r>
+          </a:p>
+          <a:p>
+            <a:pPr lvl="1"/>
+            <a:r>
+              <a:rPr lang="en-US" dirty="0"/>
+              <a:t>More programming languages exist</a:t>
+            </a:r>
+          </a:p>
+          <a:p>
+            <a:pPr lvl="1"/>
+            <a:r>
+              <a:rPr lang="en-US" dirty="0"/>
+              <a:t>Plain text log messages to console/files/3</a:t>
+            </a:r>
+            <a:r>
+              <a:rPr lang="en-US" baseline="30000" dirty="0"/>
+              <a:t>rd</a:t>
+            </a:r>
+            <a:r>
+              <a:rPr lang="en-US" dirty="0"/>
+              <a:t> party company solution</a:t>
+            </a:r>
+          </a:p>
+          <a:p>
+            <a:pPr lvl="1"/>
+            <a:r>
+              <a:rPr lang="en-US" dirty="0"/>
+              <a:t>Logs have higher verbosity, more data per line</a:t>
+            </a:r>
+          </a:p>
+          <a:p>
+            <a:pPr lvl="2"/>
+            <a:r>
+              <a:rPr lang="en-US" dirty="0"/>
+              <a:t>Timestamp, log level, JSON output, Thread Id, Request Id, </a:t>
+            </a:r>
+            <a:r>
+              <a:rPr lang="en-US" dirty="0" err="1"/>
+              <a:t>etc</a:t>
+            </a:r>
+            <a:endParaRPr lang="en-US" dirty="0"/>
+          </a:p>
+        </p:txBody>
+      </p:sp>
+      <p:pic>
+        <p:nvPicPr>
+          <p:cNvPr id="5" name="Picture 4">
+            <a:extLst>
+              <a:ext uri="{FF2B5EF4-FFF2-40B4-BE49-F238E27FC236}">
+                <a16:creationId xmlns:a16="http://schemas.microsoft.com/office/drawing/2014/main" id="{2F23E70F-A9A9-2A7D-B9A6-19C14628EBCB}"/>
+              </a:ext>
+            </a:extLst>
+          </p:cNvPr>
+          <p:cNvPicPr>
+            <a:picLocks noChangeAspect="1"/>
+          </p:cNvPicPr>
+          <p:nvPr/>
+        </p:nvPicPr>
+        <p:blipFill>
+          <a:blip r:embed="rId2"/>
+          <a:stretch>
+            <a:fillRect/>
+          </a:stretch>
+        </p:blipFill>
+        <p:spPr>
+          <a:xfrm>
+            <a:off x="181711" y="4609267"/>
+            <a:ext cx="11828577" cy="471692"/>
+          </a:xfrm>
+          <a:prstGeom prst="rect">
+            <a:avLst/>
+          </a:prstGeom>
+        </p:spPr>
+      </p:pic>
     </p:spTree>
     <p:extLst>
       <p:ext uri="{BB962C8B-B14F-4D97-AF65-F5344CB8AC3E}">
-        <p14:creationId xmlns:p14="http://schemas.microsoft.com/office/powerpoint/2010/main" val="1300523344"/>
+        <p14:creationId xmlns:p14="http://schemas.microsoft.com/office/powerpoint/2010/main" val="2009345962"/>
       </p:ext>
     </p:extLst>
   </p:cSld>
@@ -3722,6 +3841,443 @@
           <p:cNvPr id="2" name="Title 1">
             <a:extLst>
               <a:ext uri="{FF2B5EF4-FFF2-40B4-BE49-F238E27FC236}">
+                <a16:creationId xmlns:a16="http://schemas.microsoft.com/office/drawing/2014/main" id="{7C8A8239-5B17-BCEB-24DB-AF5730BC8662}"/>
+              </a:ext>
+            </a:extLst>
+          </p:cNvPr>
+          <p:cNvSpPr>
+            <a:spLocks noGrp="1"/>
+          </p:cNvSpPr>
+          <p:nvPr>
+            <p:ph type="title"/>
+          </p:nvPr>
+        </p:nvSpPr>
+        <p:spPr/>
+        <p:txBody>
+          <a:bodyPr/>
+          <a:lstStyle/>
+          <a:p>
+            <a:r>
+              <a:rPr lang="en-US" dirty="0"/>
+              <a:t>Level Setting – Limitations of Plain Text Logs</a:t>
+            </a:r>
+          </a:p>
+        </p:txBody>
+      </p:sp>
+      <p:sp>
+        <p:nvSpPr>
+          <p:cNvPr id="3" name="Content Placeholder 2">
+            <a:extLst>
+              <a:ext uri="{FF2B5EF4-FFF2-40B4-BE49-F238E27FC236}">
+                <a16:creationId xmlns:a16="http://schemas.microsoft.com/office/drawing/2014/main" id="{FE44DCF6-C57C-E4F8-C527-B7F600096AB2}"/>
+              </a:ext>
+            </a:extLst>
+          </p:cNvPr>
+          <p:cNvSpPr>
+            <a:spLocks noGrp="1"/>
+          </p:cNvSpPr>
+          <p:nvPr>
+            <p:ph idx="1"/>
+          </p:nvPr>
+        </p:nvSpPr>
+        <p:spPr/>
+        <p:txBody>
+          <a:bodyPr/>
+          <a:lstStyle/>
+          <a:p>
+            <a:r>
+              <a:rPr lang="en-US" dirty="0"/>
+              <a:t>Data in files is hard to sift through</a:t>
+            </a:r>
+          </a:p>
+          <a:p>
+            <a:r>
+              <a:rPr lang="en-US" dirty="0"/>
+              <a:t>Custom providers can make this way easier</a:t>
+            </a:r>
+          </a:p>
+          <a:p>
+            <a:pPr lvl="1"/>
+            <a:r>
+              <a:rPr lang="en-US" dirty="0"/>
+              <a:t>You end up taking a big dependency on their solution</a:t>
+            </a:r>
+          </a:p>
+          <a:p>
+            <a:r>
+              <a:rPr lang="en-US" dirty="0"/>
+              <a:t>Example Scenario:</a:t>
+            </a:r>
+          </a:p>
+          <a:p>
+            <a:pPr lvl="1"/>
+            <a:r>
+              <a:rPr lang="en-US" dirty="0"/>
+              <a:t>UI calls `Service A` which calls `Service B` which calls `Service C`</a:t>
+            </a:r>
+          </a:p>
+          <a:p>
+            <a:pPr lvl="2"/>
+            <a:r>
+              <a:rPr lang="en-US" dirty="0"/>
+              <a:t>An exception occurs in `Service B` because of response from `Service C`</a:t>
+            </a:r>
+          </a:p>
+          <a:p>
+            <a:pPr lvl="2"/>
+            <a:r>
+              <a:rPr lang="en-US" dirty="0"/>
+              <a:t>How do you debug that?</a:t>
+            </a:r>
+          </a:p>
+        </p:txBody>
+      </p:sp>
+    </p:spTree>
+    <p:extLst>
+      <p:ext uri="{BB962C8B-B14F-4D97-AF65-F5344CB8AC3E}">
+        <p14:creationId xmlns:p14="http://schemas.microsoft.com/office/powerpoint/2010/main" val="863765343"/>
+      </p:ext>
+    </p:extLst>
+  </p:cSld>
+  <p:clrMapOvr>
+    <a:masterClrMapping/>
+  </p:clrMapOvr>
+</p:sld>
+</file>
+
+<file path=ppt/slides/slide6.xml><?xml version="1.0" encoding="utf-8"?>
+<p:sld xmlns:a="http://schemas.openxmlformats.org/drawingml/2006/main" xmlns:r="http://schemas.openxmlformats.org/officeDocument/2006/relationships" xmlns:p="http://schemas.openxmlformats.org/presentationml/2006/main">
+  <p:cSld>
+    <p:spTree>
+      <p:nvGrpSpPr>
+        <p:cNvPr id="1" name=""/>
+        <p:cNvGrpSpPr/>
+        <p:nvPr/>
+      </p:nvGrpSpPr>
+      <p:grpSpPr>
+        <a:xfrm>
+          <a:off x="0" y="0"/>
+          <a:ext cx="0" cy="0"/>
+          <a:chOff x="0" y="0"/>
+          <a:chExt cx="0" cy="0"/>
+        </a:xfrm>
+      </p:grpSpPr>
+      <p:sp>
+        <p:nvSpPr>
+          <p:cNvPr id="2" name="Title 1">
+            <a:extLst>
+              <a:ext uri="{FF2B5EF4-FFF2-40B4-BE49-F238E27FC236}">
+                <a16:creationId xmlns:a16="http://schemas.microsoft.com/office/drawing/2014/main" id="{5E307F74-4B66-E256-883D-61DAB1C2B0A8}"/>
+              </a:ext>
+            </a:extLst>
+          </p:cNvPr>
+          <p:cNvSpPr>
+            <a:spLocks noGrp="1"/>
+          </p:cNvSpPr>
+          <p:nvPr>
+            <p:ph type="title"/>
+          </p:nvPr>
+        </p:nvSpPr>
+        <p:spPr/>
+        <p:txBody>
+          <a:bodyPr/>
+          <a:lstStyle/>
+          <a:p>
+            <a:r>
+              <a:rPr lang="en-US" dirty="0"/>
+              <a:t>What is OpenTelemetry (OTel)?</a:t>
+            </a:r>
+          </a:p>
+        </p:txBody>
+      </p:sp>
+      <p:sp>
+        <p:nvSpPr>
+          <p:cNvPr id="3" name="Content Placeholder 2">
+            <a:extLst>
+              <a:ext uri="{FF2B5EF4-FFF2-40B4-BE49-F238E27FC236}">
+                <a16:creationId xmlns:a16="http://schemas.microsoft.com/office/drawing/2014/main" id="{B70B10D9-25F8-1530-119E-C1523AD1F882}"/>
+              </a:ext>
+            </a:extLst>
+          </p:cNvPr>
+          <p:cNvSpPr>
+            <a:spLocks noGrp="1"/>
+          </p:cNvSpPr>
+          <p:nvPr>
+            <p:ph idx="1"/>
+          </p:nvPr>
+        </p:nvSpPr>
+        <p:spPr/>
+        <p:txBody>
+          <a:bodyPr/>
+          <a:lstStyle/>
+          <a:p>
+            <a:r>
+              <a:rPr lang="en-US" dirty="0"/>
+              <a:t>A standard for collecting telemetry data about your services</a:t>
+            </a:r>
+          </a:p>
+          <a:p>
+            <a:r>
+              <a:rPr lang="en-US" dirty="0"/>
+              <a:t>Open Source, Vendor Neutral, Language Agnostic</a:t>
+            </a:r>
+          </a:p>
+          <a:p>
+            <a:r>
+              <a:rPr lang="en-US" dirty="0">
+                <a:hlinkClick r:id="rId2"/>
+              </a:rPr>
+              <a:t>https://opentelemetry.io/</a:t>
+            </a:r>
+            <a:endParaRPr lang="en-US" dirty="0"/>
+          </a:p>
+          <a:p>
+            <a:endParaRPr lang="en-US" dirty="0"/>
+          </a:p>
+          <a:p>
+            <a:endParaRPr lang="en-US" dirty="0"/>
+          </a:p>
+        </p:txBody>
+      </p:sp>
+    </p:spTree>
+    <p:extLst>
+      <p:ext uri="{BB962C8B-B14F-4D97-AF65-F5344CB8AC3E}">
+        <p14:creationId xmlns:p14="http://schemas.microsoft.com/office/powerpoint/2010/main" val="1831172772"/>
+      </p:ext>
+    </p:extLst>
+  </p:cSld>
+  <p:clrMapOvr>
+    <a:masterClrMapping/>
+  </p:clrMapOvr>
+</p:sld>
+</file>
+
+<file path=ppt/slides/slide7.xml><?xml version="1.0" encoding="utf-8"?>
+<p:sld xmlns:a="http://schemas.openxmlformats.org/drawingml/2006/main" xmlns:r="http://schemas.openxmlformats.org/officeDocument/2006/relationships" xmlns:p="http://schemas.openxmlformats.org/presentationml/2006/main">
+  <p:cSld>
+    <p:spTree>
+      <p:nvGrpSpPr>
+        <p:cNvPr id="1" name=""/>
+        <p:cNvGrpSpPr/>
+        <p:nvPr/>
+      </p:nvGrpSpPr>
+      <p:grpSpPr>
+        <a:xfrm>
+          <a:off x="0" y="0"/>
+          <a:ext cx="0" cy="0"/>
+          <a:chOff x="0" y="0"/>
+          <a:chExt cx="0" cy="0"/>
+        </a:xfrm>
+      </p:grpSpPr>
+      <p:sp>
+        <p:nvSpPr>
+          <p:cNvPr id="2" name="Title 1">
+            <a:extLst>
+              <a:ext uri="{FF2B5EF4-FFF2-40B4-BE49-F238E27FC236}">
+                <a16:creationId xmlns:a16="http://schemas.microsoft.com/office/drawing/2014/main" id="{D8B96612-17A0-176A-92F7-3BCE97F3A665}"/>
+              </a:ext>
+            </a:extLst>
+          </p:cNvPr>
+          <p:cNvSpPr>
+            <a:spLocks noGrp="1"/>
+          </p:cNvSpPr>
+          <p:nvPr>
+            <p:ph type="title"/>
+          </p:nvPr>
+        </p:nvSpPr>
+        <p:spPr/>
+        <p:txBody>
+          <a:bodyPr/>
+          <a:lstStyle/>
+          <a:p>
+            <a:r>
+              <a:rPr lang="en-US" dirty="0"/>
+              <a:t>What data does OTel collect?</a:t>
+            </a:r>
+          </a:p>
+        </p:txBody>
+      </p:sp>
+      <p:sp>
+        <p:nvSpPr>
+          <p:cNvPr id="3" name="Content Placeholder 2">
+            <a:extLst>
+              <a:ext uri="{FF2B5EF4-FFF2-40B4-BE49-F238E27FC236}">
+                <a16:creationId xmlns:a16="http://schemas.microsoft.com/office/drawing/2014/main" id="{E2E199BB-9297-AC8A-E12E-8C5CB312F3FD}"/>
+              </a:ext>
+            </a:extLst>
+          </p:cNvPr>
+          <p:cNvSpPr>
+            <a:spLocks noGrp="1"/>
+          </p:cNvSpPr>
+          <p:nvPr>
+            <p:ph idx="1"/>
+          </p:nvPr>
+        </p:nvSpPr>
+        <p:spPr/>
+        <p:txBody>
+          <a:bodyPr/>
+          <a:lstStyle/>
+          <a:p>
+            <a:r>
+              <a:rPr lang="en-US" dirty="0"/>
+              <a:t>Traces</a:t>
+            </a:r>
+          </a:p>
+          <a:p>
+            <a:pPr lvl="1"/>
+            <a:endParaRPr lang="en-US" dirty="0"/>
+          </a:p>
+          <a:p>
+            <a:r>
+              <a:rPr lang="en-US" dirty="0"/>
+              <a:t>Metrics</a:t>
+            </a:r>
+          </a:p>
+          <a:p>
+            <a:pPr lvl="1"/>
+            <a:r>
+              <a:rPr lang="en-US" dirty="0"/>
+              <a:t>Performance counters</a:t>
+            </a:r>
+          </a:p>
+          <a:p>
+            <a:pPr lvl="1"/>
+            <a:r>
+              <a:rPr lang="en-US" dirty="0"/>
+              <a:t>Mostly Automatic</a:t>
+            </a:r>
+          </a:p>
+          <a:p>
+            <a:pPr lvl="2"/>
+            <a:r>
+              <a:rPr lang="en-US" dirty="0"/>
+              <a:t>Install agent on box, set some config, leave it alone</a:t>
+            </a:r>
+          </a:p>
+        </p:txBody>
+      </p:sp>
+    </p:spTree>
+    <p:extLst>
+      <p:ext uri="{BB962C8B-B14F-4D97-AF65-F5344CB8AC3E}">
+        <p14:creationId xmlns:p14="http://schemas.microsoft.com/office/powerpoint/2010/main" val="2452761775"/>
+      </p:ext>
+    </p:extLst>
+  </p:cSld>
+  <p:clrMapOvr>
+    <a:masterClrMapping/>
+  </p:clrMapOvr>
+</p:sld>
+</file>
+
+<file path=ppt/slides/slide8.xml><?xml version="1.0" encoding="utf-8"?>
+<p:sld xmlns:a="http://schemas.openxmlformats.org/drawingml/2006/main" xmlns:r="http://schemas.openxmlformats.org/officeDocument/2006/relationships" xmlns:p="http://schemas.openxmlformats.org/presentationml/2006/main">
+  <p:cSld>
+    <p:spTree>
+      <p:nvGrpSpPr>
+        <p:cNvPr id="1" name=""/>
+        <p:cNvGrpSpPr/>
+        <p:nvPr/>
+      </p:nvGrpSpPr>
+      <p:grpSpPr>
+        <a:xfrm>
+          <a:off x="0" y="0"/>
+          <a:ext cx="0" cy="0"/>
+          <a:chOff x="0" y="0"/>
+          <a:chExt cx="0" cy="0"/>
+        </a:xfrm>
+      </p:grpSpPr>
+      <p:sp>
+        <p:nvSpPr>
+          <p:cNvPr id="2" name="Title 1">
+            <a:extLst>
+              <a:ext uri="{FF2B5EF4-FFF2-40B4-BE49-F238E27FC236}">
+                <a16:creationId xmlns:a16="http://schemas.microsoft.com/office/drawing/2014/main" id="{E9D5BFED-98DA-1F9D-BD38-501E6FA022AC}"/>
+              </a:ext>
+            </a:extLst>
+          </p:cNvPr>
+          <p:cNvSpPr>
+            <a:spLocks noGrp="1"/>
+          </p:cNvSpPr>
+          <p:nvPr>
+            <p:ph type="title"/>
+          </p:nvPr>
+        </p:nvSpPr>
+        <p:spPr/>
+        <p:txBody>
+          <a:bodyPr/>
+          <a:lstStyle/>
+          <a:p>
+            <a:r>
+              <a:rPr lang="en-US" dirty="0" err="1"/>
+              <a:t>Otel</a:t>
+            </a:r>
+            <a:r>
+              <a:rPr lang="en-US" dirty="0"/>
+              <a:t> Metrics</a:t>
+            </a:r>
+          </a:p>
+        </p:txBody>
+      </p:sp>
+      <p:sp>
+        <p:nvSpPr>
+          <p:cNvPr id="3" name="Content Placeholder 2">
+            <a:extLst>
+              <a:ext uri="{FF2B5EF4-FFF2-40B4-BE49-F238E27FC236}">
+                <a16:creationId xmlns:a16="http://schemas.microsoft.com/office/drawing/2014/main" id="{8BED0D18-AA50-7A8C-26EC-7C136586261A}"/>
+              </a:ext>
+            </a:extLst>
+          </p:cNvPr>
+          <p:cNvSpPr>
+            <a:spLocks noGrp="1"/>
+          </p:cNvSpPr>
+          <p:nvPr>
+            <p:ph idx="1"/>
+          </p:nvPr>
+        </p:nvSpPr>
+        <p:spPr/>
+        <p:txBody>
+          <a:bodyPr/>
+          <a:lstStyle/>
+          <a:p>
+            <a:endParaRPr lang="en-US"/>
+          </a:p>
+        </p:txBody>
+      </p:sp>
+    </p:spTree>
+    <p:extLst>
+      <p:ext uri="{BB962C8B-B14F-4D97-AF65-F5344CB8AC3E}">
+        <p14:creationId xmlns:p14="http://schemas.microsoft.com/office/powerpoint/2010/main" val="1300523344"/>
+      </p:ext>
+    </p:extLst>
+  </p:cSld>
+  <p:clrMapOvr>
+    <a:masterClrMapping/>
+  </p:clrMapOvr>
+</p:sld>
+</file>
+
+<file path=ppt/slides/slide9.xml><?xml version="1.0" encoding="utf-8"?>
+<p:sld xmlns:a="http://schemas.openxmlformats.org/drawingml/2006/main" xmlns:r="http://schemas.openxmlformats.org/officeDocument/2006/relationships" xmlns:p="http://schemas.openxmlformats.org/presentationml/2006/main">
+  <p:cSld>
+    <p:spTree>
+      <p:nvGrpSpPr>
+        <p:cNvPr id="1" name=""/>
+        <p:cNvGrpSpPr/>
+        <p:nvPr/>
+      </p:nvGrpSpPr>
+      <p:grpSpPr>
+        <a:xfrm>
+          <a:off x="0" y="0"/>
+          <a:ext cx="0" cy="0"/>
+          <a:chOff x="0" y="0"/>
+          <a:chExt cx="0" cy="0"/>
+        </a:xfrm>
+      </p:grpSpPr>
+      <p:sp>
+        <p:nvSpPr>
+          <p:cNvPr id="2" name="Title 1">
+            <a:extLst>
+              <a:ext uri="{FF2B5EF4-FFF2-40B4-BE49-F238E27FC236}">
                 <a16:creationId xmlns:a16="http://schemas.microsoft.com/office/drawing/2014/main" id="{750EEC00-ACB4-91E4-DA0D-94466EF4CF6C}"/>
               </a:ext>
             </a:extLst>
@@ -3738,7 +4294,14 @@
           <a:bodyPr/>
           <a:lstStyle/>
           <a:p>
-            <a:endParaRPr lang="en-US"/>
+            <a:r>
+              <a:rPr lang="en-US" dirty="0" err="1"/>
+              <a:t>Otel</a:t>
+            </a:r>
+            <a:r>
+              <a:rPr lang="en-US" dirty="0"/>
+              <a:t> Traces</a:t>
+            </a:r>
           </a:p>
         </p:txBody>
       </p:sp>

</xml_diff>

<commit_message>
Worked on the OTel presentation more
</commit_message>
<xml_diff>
--- a/2023-03 - Orlando Code Camp - OpenTelemetry/Presentation.pptx
+++ b/2023-03 - Orlando Code Camp - OpenTelemetry/Presentation.pptx
@@ -14,6 +14,10 @@
     <p:sldId id="258" r:id="rId8"/>
     <p:sldId id="259" r:id="rId9"/>
     <p:sldId id="260" r:id="rId10"/>
+    <p:sldId id="265" r:id="rId11"/>
+    <p:sldId id="266" r:id="rId12"/>
+    <p:sldId id="267" r:id="rId13"/>
+    <p:sldId id="268" r:id="rId14"/>
   </p:sldIdLst>
   <p:sldSz cx="12192000" cy="6858000"/>
   <p:notesSz cx="6858000" cy="9144000"/>
@@ -3440,6 +3444,390 @@
 </p:sld>
 </file>
 
+<file path=ppt/slides/slide10.xml><?xml version="1.0" encoding="utf-8"?>
+<p:sld xmlns:a="http://schemas.openxmlformats.org/drawingml/2006/main" xmlns:r="http://schemas.openxmlformats.org/officeDocument/2006/relationships" xmlns:p="http://schemas.openxmlformats.org/presentationml/2006/main">
+  <p:cSld>
+    <p:spTree>
+      <p:nvGrpSpPr>
+        <p:cNvPr id="1" name=""/>
+        <p:cNvGrpSpPr/>
+        <p:nvPr/>
+      </p:nvGrpSpPr>
+      <p:grpSpPr>
+        <a:xfrm>
+          <a:off x="0" y="0"/>
+          <a:ext cx="0" cy="0"/>
+          <a:chOff x="0" y="0"/>
+          <a:chExt cx="0" cy="0"/>
+        </a:xfrm>
+      </p:grpSpPr>
+      <p:sp>
+        <p:nvSpPr>
+          <p:cNvPr id="2" name="Title 1">
+            <a:extLst>
+              <a:ext uri="{FF2B5EF4-FFF2-40B4-BE49-F238E27FC236}">
+                <a16:creationId xmlns:a16="http://schemas.microsoft.com/office/drawing/2014/main" id="{1B34032A-7733-FF48-0ED1-FE488BD4E2DD}"/>
+              </a:ext>
+            </a:extLst>
+          </p:cNvPr>
+          <p:cNvSpPr>
+            <a:spLocks noGrp="1"/>
+          </p:cNvSpPr>
+          <p:nvPr>
+            <p:ph type="title"/>
+          </p:nvPr>
+        </p:nvSpPr>
+        <p:spPr/>
+        <p:txBody>
+          <a:bodyPr/>
+          <a:lstStyle/>
+          <a:p>
+            <a:r>
+              <a:rPr lang="en-US" dirty="0" err="1"/>
+              <a:t>Otel</a:t>
+            </a:r>
+            <a:r>
+              <a:rPr lang="en-US" dirty="0"/>
+              <a:t> Log Records</a:t>
+            </a:r>
+          </a:p>
+        </p:txBody>
+      </p:sp>
+      <p:sp>
+        <p:nvSpPr>
+          <p:cNvPr id="3" name="Content Placeholder 2">
+            <a:extLst>
+              <a:ext uri="{FF2B5EF4-FFF2-40B4-BE49-F238E27FC236}">
+                <a16:creationId xmlns:a16="http://schemas.microsoft.com/office/drawing/2014/main" id="{507F062A-301B-C6D5-4319-54B039F74FF0}"/>
+              </a:ext>
+            </a:extLst>
+          </p:cNvPr>
+          <p:cNvSpPr>
+            <a:spLocks noGrp="1"/>
+          </p:cNvSpPr>
+          <p:nvPr>
+            <p:ph idx="1"/>
+          </p:nvPr>
+        </p:nvSpPr>
+        <p:spPr/>
+        <p:txBody>
+          <a:bodyPr/>
+          <a:lstStyle/>
+          <a:p>
+            <a:r>
+              <a:rPr lang="en-US" dirty="0"/>
+              <a:t>Standalone Logs</a:t>
+            </a:r>
+          </a:p>
+          <a:p>
+            <a:pPr lvl="1"/>
+            <a:r>
+              <a:rPr lang="en-US" dirty="0"/>
+              <a:t>A Span with an Event, no link to other Spans</a:t>
+            </a:r>
+          </a:p>
+          <a:p>
+            <a:r>
+              <a:rPr lang="en-US" dirty="0"/>
+              <a:t>Embedded Logs</a:t>
+            </a:r>
+          </a:p>
+          <a:p>
+            <a:pPr lvl="1"/>
+            <a:r>
+              <a:rPr lang="en-US" dirty="0"/>
+              <a:t>An Event in a Span</a:t>
+            </a:r>
+          </a:p>
+        </p:txBody>
+      </p:sp>
+    </p:spTree>
+    <p:extLst>
+      <p:ext uri="{BB962C8B-B14F-4D97-AF65-F5344CB8AC3E}">
+        <p14:creationId xmlns:p14="http://schemas.microsoft.com/office/powerpoint/2010/main" val="2314078779"/>
+      </p:ext>
+    </p:extLst>
+  </p:cSld>
+  <p:clrMapOvr>
+    <a:masterClrMapping/>
+  </p:clrMapOvr>
+</p:sld>
+</file>
+
+<file path=ppt/slides/slide11.xml><?xml version="1.0" encoding="utf-8"?>
+<p:sld xmlns:a="http://schemas.openxmlformats.org/drawingml/2006/main" xmlns:r="http://schemas.openxmlformats.org/officeDocument/2006/relationships" xmlns:p="http://schemas.openxmlformats.org/presentationml/2006/main">
+  <p:cSld>
+    <p:spTree>
+      <p:nvGrpSpPr>
+        <p:cNvPr id="1" name=""/>
+        <p:cNvGrpSpPr/>
+        <p:nvPr/>
+      </p:nvGrpSpPr>
+      <p:grpSpPr>
+        <a:xfrm>
+          <a:off x="0" y="0"/>
+          <a:ext cx="0" cy="0"/>
+          <a:chOff x="0" y="0"/>
+          <a:chExt cx="0" cy="0"/>
+        </a:xfrm>
+      </p:grpSpPr>
+      <p:sp>
+        <p:nvSpPr>
+          <p:cNvPr id="2" name="Title 1">
+            <a:extLst>
+              <a:ext uri="{FF2B5EF4-FFF2-40B4-BE49-F238E27FC236}">
+                <a16:creationId xmlns:a16="http://schemas.microsoft.com/office/drawing/2014/main" id="{7E66F3A5-A777-B1AF-24E4-DB86EE46F263}"/>
+              </a:ext>
+            </a:extLst>
+          </p:cNvPr>
+          <p:cNvSpPr>
+            <a:spLocks noGrp="1"/>
+          </p:cNvSpPr>
+          <p:nvPr>
+            <p:ph type="title"/>
+          </p:nvPr>
+        </p:nvSpPr>
+        <p:spPr/>
+        <p:txBody>
+          <a:bodyPr/>
+          <a:lstStyle/>
+          <a:p>
+            <a:r>
+              <a:rPr lang="en-US" dirty="0"/>
+              <a:t>OTel with C#</a:t>
+            </a:r>
+          </a:p>
+        </p:txBody>
+      </p:sp>
+      <p:sp>
+        <p:nvSpPr>
+          <p:cNvPr id="3" name="Content Placeholder 2">
+            <a:extLst>
+              <a:ext uri="{FF2B5EF4-FFF2-40B4-BE49-F238E27FC236}">
+                <a16:creationId xmlns:a16="http://schemas.microsoft.com/office/drawing/2014/main" id="{6BDDC28F-E410-C123-7AB8-3CBFB249933B}"/>
+              </a:ext>
+            </a:extLst>
+          </p:cNvPr>
+          <p:cNvSpPr>
+            <a:spLocks noGrp="1"/>
+          </p:cNvSpPr>
+          <p:nvPr>
+            <p:ph idx="1"/>
+          </p:nvPr>
+        </p:nvSpPr>
+        <p:spPr/>
+        <p:txBody>
+          <a:bodyPr/>
+          <a:lstStyle/>
+          <a:p>
+            <a:r>
+              <a:rPr lang="en-US" dirty="0"/>
+              <a:t>2 APIs</a:t>
+            </a:r>
+          </a:p>
+          <a:p>
+            <a:pPr lvl="1"/>
+            <a:r>
+              <a:rPr lang="en-US" dirty="0"/>
+              <a:t>Because of course there are</a:t>
+            </a:r>
+          </a:p>
+          <a:p>
+            <a:r>
+              <a:rPr lang="en-US" dirty="0"/>
+              <a:t>Built in to .NET one</a:t>
+            </a:r>
+          </a:p>
+          <a:p>
+            <a:r>
+              <a:rPr lang="en-US" dirty="0" err="1"/>
+              <a:t>OpenTelemetry</a:t>
+            </a:r>
+            <a:r>
+              <a:rPr lang="en-US" dirty="0"/>
+              <a:t> </a:t>
+            </a:r>
+            <a:r>
+              <a:rPr lang="en-US"/>
+              <a:t>community provided one</a:t>
+            </a:r>
+            <a:endParaRPr lang="en-US" dirty="0"/>
+          </a:p>
+        </p:txBody>
+      </p:sp>
+    </p:spTree>
+    <p:extLst>
+      <p:ext uri="{BB962C8B-B14F-4D97-AF65-F5344CB8AC3E}">
+        <p14:creationId xmlns:p14="http://schemas.microsoft.com/office/powerpoint/2010/main" val="1503568322"/>
+      </p:ext>
+    </p:extLst>
+  </p:cSld>
+  <p:clrMapOvr>
+    <a:masterClrMapping/>
+  </p:clrMapOvr>
+</p:sld>
+</file>
+
+<file path=ppt/slides/slide12.xml><?xml version="1.0" encoding="utf-8"?>
+<p:sld xmlns:a="http://schemas.openxmlformats.org/drawingml/2006/main" xmlns:r="http://schemas.openxmlformats.org/officeDocument/2006/relationships" xmlns:p="http://schemas.openxmlformats.org/presentationml/2006/main">
+  <p:cSld>
+    <p:spTree>
+      <p:nvGrpSpPr>
+        <p:cNvPr id="1" name=""/>
+        <p:cNvGrpSpPr/>
+        <p:nvPr/>
+      </p:nvGrpSpPr>
+      <p:grpSpPr>
+        <a:xfrm>
+          <a:off x="0" y="0"/>
+          <a:ext cx="0" cy="0"/>
+          <a:chOff x="0" y="0"/>
+          <a:chExt cx="0" cy="0"/>
+        </a:xfrm>
+      </p:grpSpPr>
+      <p:sp>
+        <p:nvSpPr>
+          <p:cNvPr id="2" name="Title 1">
+            <a:extLst>
+              <a:ext uri="{FF2B5EF4-FFF2-40B4-BE49-F238E27FC236}">
+                <a16:creationId xmlns:a16="http://schemas.microsoft.com/office/drawing/2014/main" id="{F5B35BAA-E861-A124-0F27-2BC180B47B78}"/>
+              </a:ext>
+            </a:extLst>
+          </p:cNvPr>
+          <p:cNvSpPr>
+            <a:spLocks noGrp="1"/>
+          </p:cNvSpPr>
+          <p:nvPr>
+            <p:ph type="title"/>
+          </p:nvPr>
+        </p:nvSpPr>
+        <p:spPr/>
+        <p:txBody>
+          <a:bodyPr/>
+          <a:lstStyle/>
+          <a:p>
+            <a:endParaRPr lang="en-US"/>
+          </a:p>
+        </p:txBody>
+      </p:sp>
+      <p:sp>
+        <p:nvSpPr>
+          <p:cNvPr id="3" name="Content Placeholder 2">
+            <a:extLst>
+              <a:ext uri="{FF2B5EF4-FFF2-40B4-BE49-F238E27FC236}">
+                <a16:creationId xmlns:a16="http://schemas.microsoft.com/office/drawing/2014/main" id="{1D4DD0D4-8EA8-3477-13E5-6D429EC8BBAE}"/>
+              </a:ext>
+            </a:extLst>
+          </p:cNvPr>
+          <p:cNvSpPr>
+            <a:spLocks noGrp="1"/>
+          </p:cNvSpPr>
+          <p:nvPr>
+            <p:ph idx="1"/>
+          </p:nvPr>
+        </p:nvSpPr>
+        <p:spPr/>
+        <p:txBody>
+          <a:bodyPr/>
+          <a:lstStyle/>
+          <a:p>
+            <a:endParaRPr lang="en-US"/>
+          </a:p>
+        </p:txBody>
+      </p:sp>
+    </p:spTree>
+    <p:extLst>
+      <p:ext uri="{BB962C8B-B14F-4D97-AF65-F5344CB8AC3E}">
+        <p14:creationId xmlns:p14="http://schemas.microsoft.com/office/powerpoint/2010/main" val="2071471505"/>
+      </p:ext>
+    </p:extLst>
+  </p:cSld>
+  <p:clrMapOvr>
+    <a:masterClrMapping/>
+  </p:clrMapOvr>
+</p:sld>
+</file>
+
+<file path=ppt/slides/slide13.xml><?xml version="1.0" encoding="utf-8"?>
+<p:sld xmlns:a="http://schemas.openxmlformats.org/drawingml/2006/main" xmlns:r="http://schemas.openxmlformats.org/officeDocument/2006/relationships" xmlns:p="http://schemas.openxmlformats.org/presentationml/2006/main">
+  <p:cSld>
+    <p:spTree>
+      <p:nvGrpSpPr>
+        <p:cNvPr id="1" name=""/>
+        <p:cNvGrpSpPr/>
+        <p:nvPr/>
+      </p:nvGrpSpPr>
+      <p:grpSpPr>
+        <a:xfrm>
+          <a:off x="0" y="0"/>
+          <a:ext cx="0" cy="0"/>
+          <a:chOff x="0" y="0"/>
+          <a:chExt cx="0" cy="0"/>
+        </a:xfrm>
+      </p:grpSpPr>
+      <p:sp>
+        <p:nvSpPr>
+          <p:cNvPr id="2" name="Title 1">
+            <a:extLst>
+              <a:ext uri="{FF2B5EF4-FFF2-40B4-BE49-F238E27FC236}">
+                <a16:creationId xmlns:a16="http://schemas.microsoft.com/office/drawing/2014/main" id="{A9BB2B8B-22CC-AA43-82DC-410A70395B08}"/>
+              </a:ext>
+            </a:extLst>
+          </p:cNvPr>
+          <p:cNvSpPr>
+            <a:spLocks noGrp="1"/>
+          </p:cNvSpPr>
+          <p:nvPr>
+            <p:ph type="title"/>
+          </p:nvPr>
+        </p:nvSpPr>
+        <p:spPr/>
+        <p:txBody>
+          <a:bodyPr/>
+          <a:lstStyle/>
+          <a:p>
+            <a:endParaRPr lang="en-US"/>
+          </a:p>
+        </p:txBody>
+      </p:sp>
+      <p:sp>
+        <p:nvSpPr>
+          <p:cNvPr id="3" name="Content Placeholder 2">
+            <a:extLst>
+              <a:ext uri="{FF2B5EF4-FFF2-40B4-BE49-F238E27FC236}">
+                <a16:creationId xmlns:a16="http://schemas.microsoft.com/office/drawing/2014/main" id="{B61DC13D-498B-0A24-389C-CAC2FA1D143D}"/>
+              </a:ext>
+            </a:extLst>
+          </p:cNvPr>
+          <p:cNvSpPr>
+            <a:spLocks noGrp="1"/>
+          </p:cNvSpPr>
+          <p:nvPr>
+            <p:ph idx="1"/>
+          </p:nvPr>
+        </p:nvSpPr>
+        <p:spPr/>
+        <p:txBody>
+          <a:bodyPr/>
+          <a:lstStyle/>
+          <a:p>
+            <a:endParaRPr lang="en-US"/>
+          </a:p>
+        </p:txBody>
+      </p:sp>
+    </p:spTree>
+    <p:extLst>
+      <p:ext uri="{BB962C8B-B14F-4D97-AF65-F5344CB8AC3E}">
+        <p14:creationId xmlns:p14="http://schemas.microsoft.com/office/powerpoint/2010/main" val="2104434691"/>
+      </p:ext>
+    </p:extLst>
+  </p:cSld>
+  <p:clrMapOvr>
+    <a:masterClrMapping/>
+  </p:clrMapOvr>
+</p:sld>
+</file>
+
 <file path=ppt/slides/slide2.xml><?xml version="1.0" encoding="utf-8"?>
 <p:sld xmlns:a="http://schemas.openxmlformats.org/drawingml/2006/main" xmlns:r="http://schemas.openxmlformats.org/officeDocument/2006/relationships" xmlns:p="http://schemas.openxmlformats.org/presentationml/2006/main">
   <p:cSld>
@@ -4239,7 +4627,24 @@
           <a:bodyPr/>
           <a:lstStyle/>
           <a:p>
-            <a:endParaRPr lang="en-US"/>
+            <a:r>
+              <a:rPr lang="en-US" dirty="0"/>
+              <a:t>Counters</a:t>
+            </a:r>
+          </a:p>
+          <a:p>
+            <a:pPr lvl="1"/>
+            <a:r>
+              <a:rPr lang="en-US" dirty="0"/>
+              <a:t>CPU/Memory usage on the box</a:t>
+            </a:r>
+          </a:p>
+          <a:p>
+            <a:pPr lvl="1"/>
+            <a:r>
+              <a:rPr lang="en-US" dirty="0"/>
+              <a:t>Requests per second</a:t>
+            </a:r>
           </a:p>
         </p:txBody>
       </p:sp>
@@ -4323,10 +4728,105 @@
         </p:nvSpPr>
         <p:spPr/>
         <p:txBody>
-          <a:bodyPr/>
-          <a:lstStyle/>
-          <a:p>
-            <a:endParaRPr lang="en-US"/>
+          <a:bodyPr>
+            <a:normAutofit fontScale="92500" lnSpcReduction="20000"/>
+          </a:bodyPr>
+          <a:lstStyle/>
+          <a:p>
+            <a:r>
+              <a:rPr lang="en-US" dirty="0"/>
+              <a:t>Information for a request</a:t>
+            </a:r>
+          </a:p>
+          <a:p>
+            <a:pPr lvl="1"/>
+            <a:r>
+              <a:rPr lang="en-US" dirty="0"/>
+              <a:t>Can span multiple applications, all based on the Trace Id</a:t>
+            </a:r>
+          </a:p>
+          <a:p>
+            <a:r>
+              <a:rPr lang="en-US" dirty="0"/>
+              <a:t>Traces have child Spans</a:t>
+            </a:r>
+          </a:p>
+          <a:p>
+            <a:pPr lvl="1"/>
+            <a:r>
+              <a:rPr lang="en-US" dirty="0"/>
+              <a:t>Spans have child Attributes</a:t>
+            </a:r>
+          </a:p>
+          <a:p>
+            <a:pPr lvl="2"/>
+            <a:r>
+              <a:rPr lang="en-US" dirty="0"/>
+              <a:t>Attributes are key/value pairs of data</a:t>
+            </a:r>
+          </a:p>
+          <a:p>
+            <a:pPr lvl="1"/>
+            <a:r>
+              <a:rPr lang="en-US" dirty="0"/>
+              <a:t>Spans have child Events</a:t>
+            </a:r>
+          </a:p>
+          <a:p>
+            <a:pPr lvl="2"/>
+            <a:r>
+              <a:rPr lang="en-US" dirty="0"/>
+              <a:t>Events are timestamped pieces of data in a span, can have their own attributes</a:t>
+            </a:r>
+          </a:p>
+          <a:p>
+            <a:r>
+              <a:rPr lang="en-US" dirty="0"/>
+              <a:t>Example:</a:t>
+            </a:r>
+          </a:p>
+          <a:p>
+            <a:pPr lvl="1"/>
+            <a:r>
+              <a:rPr lang="en-US" dirty="0"/>
+              <a:t>Trace is created when a request comes into the system</a:t>
+            </a:r>
+          </a:p>
+          <a:p>
+            <a:pPr lvl="1"/>
+            <a:r>
+              <a:rPr lang="en-US" dirty="0"/>
+              <a:t>A span is made to wrap around call to database</a:t>
+            </a:r>
+          </a:p>
+          <a:p>
+            <a:pPr lvl="2"/>
+            <a:r>
+              <a:rPr lang="en-US" dirty="0"/>
+              <a:t>Span stores time it took to run the database query</a:t>
+            </a:r>
+          </a:p>
+          <a:p>
+            <a:pPr lvl="1"/>
+            <a:r>
+              <a:rPr lang="en-US" dirty="0"/>
+              <a:t>Another span is created when making call out to 3</a:t>
+            </a:r>
+            <a:r>
+              <a:rPr lang="en-US" baseline="30000" dirty="0"/>
+              <a:t>rd</a:t>
+            </a:r>
+            <a:r>
+              <a:rPr lang="en-US" dirty="0"/>
+              <a:t> party service</a:t>
+            </a:r>
+          </a:p>
+          <a:p>
+            <a:pPr lvl="2"/>
+            <a:r>
+              <a:rPr lang="en-US" dirty="0"/>
+              <a:t>Span stores time it took to run the HTTP request and the response HTTP status code, plus error if needed</a:t>
+            </a:r>
           </a:p>
         </p:txBody>
       </p:sp>

</xml_diff>

<commit_message>
Added a second demo application that uses the Activity Source object for diagnostics
</commit_message>
<xml_diff>
--- a/2023-03 - Orlando Code Camp - OpenTelemetry/Presentation.pptx
+++ b/2023-03 - Orlando Code Camp - OpenTelemetry/Presentation.pptx
@@ -7,17 +7,20 @@
   <p:sldIdLst>
     <p:sldId id="256" r:id="rId2"/>
     <p:sldId id="264" r:id="rId3"/>
-    <p:sldId id="261" r:id="rId4"/>
-    <p:sldId id="263" r:id="rId5"/>
-    <p:sldId id="262" r:id="rId6"/>
-    <p:sldId id="257" r:id="rId7"/>
-    <p:sldId id="258" r:id="rId8"/>
-    <p:sldId id="259" r:id="rId9"/>
-    <p:sldId id="260" r:id="rId10"/>
-    <p:sldId id="265" r:id="rId11"/>
-    <p:sldId id="266" r:id="rId12"/>
+    <p:sldId id="270" r:id="rId4"/>
+    <p:sldId id="261" r:id="rId5"/>
+    <p:sldId id="263" r:id="rId6"/>
+    <p:sldId id="262" r:id="rId7"/>
+    <p:sldId id="257" r:id="rId8"/>
+    <p:sldId id="258" r:id="rId9"/>
+    <p:sldId id="259" r:id="rId10"/>
+    <p:sldId id="260" r:id="rId11"/>
+    <p:sldId id="265" r:id="rId12"/>
     <p:sldId id="267" r:id="rId13"/>
-    <p:sldId id="268" r:id="rId14"/>
+    <p:sldId id="269" r:id="rId14"/>
+    <p:sldId id="266" r:id="rId15"/>
+    <p:sldId id="268" r:id="rId16"/>
+    <p:sldId id="271" r:id="rId17"/>
   </p:sldIdLst>
   <p:sldSz cx="12192000" cy="6858000"/>
   <p:notesSz cx="6858000" cy="9144000"/>
@@ -271,7 +274,7 @@
           <a:p>
             <a:fld id="{CDF7C942-0668-44C8-8004-BBD737B759C0}" type="datetimeFigureOut">
               <a:rPr lang="en-US" smtClean="0"/>
-              <a:t>3/5/2023</a:t>
+              <a:t>3/12/2023</a:t>
             </a:fld>
             <a:endParaRPr lang="en-US"/>
           </a:p>
@@ -469,7 +472,7 @@
           <a:p>
             <a:fld id="{CDF7C942-0668-44C8-8004-BBD737B759C0}" type="datetimeFigureOut">
               <a:rPr lang="en-US" smtClean="0"/>
-              <a:t>3/5/2023</a:t>
+              <a:t>3/12/2023</a:t>
             </a:fld>
             <a:endParaRPr lang="en-US"/>
           </a:p>
@@ -677,7 +680,7 @@
           <a:p>
             <a:fld id="{CDF7C942-0668-44C8-8004-BBD737B759C0}" type="datetimeFigureOut">
               <a:rPr lang="en-US" smtClean="0"/>
-              <a:t>3/5/2023</a:t>
+              <a:t>3/12/2023</a:t>
             </a:fld>
             <a:endParaRPr lang="en-US"/>
           </a:p>
@@ -875,7 +878,7 @@
           <a:p>
             <a:fld id="{CDF7C942-0668-44C8-8004-BBD737B759C0}" type="datetimeFigureOut">
               <a:rPr lang="en-US" smtClean="0"/>
-              <a:t>3/5/2023</a:t>
+              <a:t>3/12/2023</a:t>
             </a:fld>
             <a:endParaRPr lang="en-US"/>
           </a:p>
@@ -1150,7 +1153,7 @@
           <a:p>
             <a:fld id="{CDF7C942-0668-44C8-8004-BBD737B759C0}" type="datetimeFigureOut">
               <a:rPr lang="en-US" smtClean="0"/>
-              <a:t>3/5/2023</a:t>
+              <a:t>3/12/2023</a:t>
             </a:fld>
             <a:endParaRPr lang="en-US"/>
           </a:p>
@@ -1415,7 +1418,7 @@
           <a:p>
             <a:fld id="{CDF7C942-0668-44C8-8004-BBD737B759C0}" type="datetimeFigureOut">
               <a:rPr lang="en-US" smtClean="0"/>
-              <a:t>3/5/2023</a:t>
+              <a:t>3/12/2023</a:t>
             </a:fld>
             <a:endParaRPr lang="en-US"/>
           </a:p>
@@ -1827,7 +1830,7 @@
           <a:p>
             <a:fld id="{CDF7C942-0668-44C8-8004-BBD737B759C0}" type="datetimeFigureOut">
               <a:rPr lang="en-US" smtClean="0"/>
-              <a:t>3/5/2023</a:t>
+              <a:t>3/12/2023</a:t>
             </a:fld>
             <a:endParaRPr lang="en-US"/>
           </a:p>
@@ -1968,7 +1971,7 @@
           <a:p>
             <a:fld id="{CDF7C942-0668-44C8-8004-BBD737B759C0}" type="datetimeFigureOut">
               <a:rPr lang="en-US" smtClean="0"/>
-              <a:t>3/5/2023</a:t>
+              <a:t>3/12/2023</a:t>
             </a:fld>
             <a:endParaRPr lang="en-US"/>
           </a:p>
@@ -2081,7 +2084,7 @@
           <a:p>
             <a:fld id="{CDF7C942-0668-44C8-8004-BBD737B759C0}" type="datetimeFigureOut">
               <a:rPr lang="en-US" smtClean="0"/>
-              <a:t>3/5/2023</a:t>
+              <a:t>3/12/2023</a:t>
             </a:fld>
             <a:endParaRPr lang="en-US"/>
           </a:p>
@@ -2392,7 +2395,7 @@
           <a:p>
             <a:fld id="{CDF7C942-0668-44C8-8004-BBD737B759C0}" type="datetimeFigureOut">
               <a:rPr lang="en-US" smtClean="0"/>
-              <a:t>3/5/2023</a:t>
+              <a:t>3/12/2023</a:t>
             </a:fld>
             <a:endParaRPr lang="en-US"/>
           </a:p>
@@ -2680,7 +2683,7 @@
           <a:p>
             <a:fld id="{CDF7C942-0668-44C8-8004-BBD737B759C0}" type="datetimeFigureOut">
               <a:rPr lang="en-US" smtClean="0"/>
-              <a:t>3/5/2023</a:t>
+              <a:t>3/12/2023</a:t>
             </a:fld>
             <a:endParaRPr lang="en-US"/>
           </a:p>
@@ -2921,7 +2924,7 @@
           <a:p>
             <a:fld id="{CDF7C942-0668-44C8-8004-BBD737B759C0}" type="datetimeFigureOut">
               <a:rPr lang="en-US" smtClean="0"/>
-              <a:t>3/5/2023</a:t>
+              <a:t>3/12/2023</a:t>
             </a:fld>
             <a:endParaRPr lang="en-US"/>
           </a:p>
@@ -3466,7 +3469,7 @@
           <p:cNvPr id="2" name="Title 1">
             <a:extLst>
               <a:ext uri="{FF2B5EF4-FFF2-40B4-BE49-F238E27FC236}">
-                <a16:creationId xmlns:a16="http://schemas.microsoft.com/office/drawing/2014/main" id="{1B34032A-7733-FF48-0ED1-FE488BD4E2DD}"/>
+                <a16:creationId xmlns:a16="http://schemas.microsoft.com/office/drawing/2014/main" id="{750EEC00-ACB4-91E4-DA0D-94466EF4CF6C}"/>
               </a:ext>
             </a:extLst>
           </p:cNvPr>
@@ -3488,7 +3491,7 @@
             </a:r>
             <a:r>
               <a:rPr lang="en-US" dirty="0"/>
-              <a:t> Log Records</a:t>
+              <a:t> Traces</a:t>
             </a:r>
           </a:p>
         </p:txBody>
@@ -3498,7 +3501,7 @@
           <p:cNvPr id="3" name="Content Placeholder 2">
             <a:extLst>
               <a:ext uri="{FF2B5EF4-FFF2-40B4-BE49-F238E27FC236}">
-                <a16:creationId xmlns:a16="http://schemas.microsoft.com/office/drawing/2014/main" id="{507F062A-301B-C6D5-4319-54B039F74FF0}"/>
+                <a16:creationId xmlns:a16="http://schemas.microsoft.com/office/drawing/2014/main" id="{5B0DA666-D600-BB5F-0EBF-CA05891D174E}"/>
               </a:ext>
             </a:extLst>
           </p:cNvPr>
@@ -3511,32 +3514,104 @@
         </p:nvSpPr>
         <p:spPr/>
         <p:txBody>
-          <a:bodyPr/>
-          <a:lstStyle/>
-          <a:p>
-            <a:r>
-              <a:rPr lang="en-US" dirty="0"/>
-              <a:t>Standalone Logs</a:t>
+          <a:bodyPr>
+            <a:normAutofit fontScale="92500" lnSpcReduction="20000"/>
+          </a:bodyPr>
+          <a:lstStyle/>
+          <a:p>
+            <a:r>
+              <a:rPr lang="en-US" dirty="0"/>
+              <a:t>Information for a request</a:t>
             </a:r>
           </a:p>
           <a:p>
             <a:pPr lvl="1"/>
             <a:r>
               <a:rPr lang="en-US" dirty="0"/>
-              <a:t>A Span with an Event, no link to other Spans</a:t>
-            </a:r>
-          </a:p>
-          <a:p>
-            <a:r>
-              <a:rPr lang="en-US" dirty="0"/>
-              <a:t>Embedded Logs</a:t>
+              <a:t>Can span multiple applications, all based on the Trace Id</a:t>
+            </a:r>
+          </a:p>
+          <a:p>
+            <a:r>
+              <a:rPr lang="en-US" dirty="0"/>
+              <a:t>Traces have child Spans</a:t>
             </a:r>
           </a:p>
           <a:p>
             <a:pPr lvl="1"/>
             <a:r>
               <a:rPr lang="en-US" dirty="0"/>
-              <a:t>An Event in a Span</a:t>
+              <a:t>Spans have child Attributes</a:t>
+            </a:r>
+          </a:p>
+          <a:p>
+            <a:pPr lvl="2"/>
+            <a:r>
+              <a:rPr lang="en-US" dirty="0"/>
+              <a:t>Attributes are key/value pairs of data</a:t>
+            </a:r>
+          </a:p>
+          <a:p>
+            <a:pPr lvl="1"/>
+            <a:r>
+              <a:rPr lang="en-US" dirty="0"/>
+              <a:t>Spans have child Events</a:t>
+            </a:r>
+          </a:p>
+          <a:p>
+            <a:pPr lvl="2"/>
+            <a:r>
+              <a:rPr lang="en-US" dirty="0"/>
+              <a:t>Events are timestamped pieces of data in a span, can have their own attributes</a:t>
+            </a:r>
+          </a:p>
+          <a:p>
+            <a:r>
+              <a:rPr lang="en-US" dirty="0"/>
+              <a:t>Example:</a:t>
+            </a:r>
+          </a:p>
+          <a:p>
+            <a:pPr lvl="1"/>
+            <a:r>
+              <a:rPr lang="en-US" dirty="0"/>
+              <a:t>Trace is created when a request comes into the system</a:t>
+            </a:r>
+          </a:p>
+          <a:p>
+            <a:pPr lvl="1"/>
+            <a:r>
+              <a:rPr lang="en-US" dirty="0"/>
+              <a:t>A span is made to wrap around call to database</a:t>
+            </a:r>
+          </a:p>
+          <a:p>
+            <a:pPr lvl="2"/>
+            <a:r>
+              <a:rPr lang="en-US" dirty="0"/>
+              <a:t>Span stores time it took to run the database query</a:t>
+            </a:r>
+          </a:p>
+          <a:p>
+            <a:pPr lvl="1"/>
+            <a:r>
+              <a:rPr lang="en-US" dirty="0"/>
+              <a:t>Another span is created when making call out to 3</a:t>
+            </a:r>
+            <a:r>
+              <a:rPr lang="en-US" baseline="30000" dirty="0"/>
+              <a:t>rd</a:t>
+            </a:r>
+            <a:r>
+              <a:rPr lang="en-US" dirty="0"/>
+              <a:t> party service</a:t>
+            </a:r>
+          </a:p>
+          <a:p>
+            <a:pPr lvl="2"/>
+            <a:r>
+              <a:rPr lang="en-US" dirty="0"/>
+              <a:t>Span stores time it took to run the HTTP request and the response HTTP status code, plus error if needed</a:t>
             </a:r>
           </a:p>
         </p:txBody>
@@ -3544,7 +3619,7 @@
     </p:spTree>
     <p:extLst>
       <p:ext uri="{BB962C8B-B14F-4D97-AF65-F5344CB8AC3E}">
-        <p14:creationId xmlns:p14="http://schemas.microsoft.com/office/powerpoint/2010/main" val="2314078779"/>
+        <p14:creationId xmlns:p14="http://schemas.microsoft.com/office/powerpoint/2010/main" val="3266317626"/>
       </p:ext>
     </p:extLst>
   </p:cSld>
@@ -3576,7 +3651,7 @@
           <p:cNvPr id="2" name="Title 1">
             <a:extLst>
               <a:ext uri="{FF2B5EF4-FFF2-40B4-BE49-F238E27FC236}">
-                <a16:creationId xmlns:a16="http://schemas.microsoft.com/office/drawing/2014/main" id="{7E66F3A5-A777-B1AF-24E4-DB86EE46F263}"/>
+                <a16:creationId xmlns:a16="http://schemas.microsoft.com/office/drawing/2014/main" id="{1B34032A-7733-FF48-0ED1-FE488BD4E2DD}"/>
               </a:ext>
             </a:extLst>
           </p:cNvPr>
@@ -3593,8 +3668,12 @@
           <a:lstStyle/>
           <a:p>
             <a:r>
-              <a:rPr lang="en-US" dirty="0"/>
-              <a:t>OTel with C#</a:t>
+              <a:rPr lang="en-US" dirty="0" err="1"/>
+              <a:t>Otel</a:t>
+            </a:r>
+            <a:r>
+              <a:rPr lang="en-US" dirty="0"/>
+              <a:t> Log Records</a:t>
             </a:r>
           </a:p>
         </p:txBody>
@@ -3604,7 +3683,7 @@
           <p:cNvPr id="3" name="Content Placeholder 2">
             <a:extLst>
               <a:ext uri="{FF2B5EF4-FFF2-40B4-BE49-F238E27FC236}">
-                <a16:creationId xmlns:a16="http://schemas.microsoft.com/office/drawing/2014/main" id="{6BDDC28F-E410-C123-7AB8-3CBFB249933B}"/>
+                <a16:creationId xmlns:a16="http://schemas.microsoft.com/office/drawing/2014/main" id="{507F062A-301B-C6D5-4319-54B039F74FF0}"/>
               </a:ext>
             </a:extLst>
           </p:cNvPr>
@@ -3622,43 +3701,35 @@
           <a:p>
             <a:r>
               <a:rPr lang="en-US" dirty="0"/>
-              <a:t>2 APIs</a:t>
+              <a:t>Standalone Logs</a:t>
             </a:r>
           </a:p>
           <a:p>
             <a:pPr lvl="1"/>
             <a:r>
               <a:rPr lang="en-US" dirty="0"/>
-              <a:t>Because of course there are</a:t>
-            </a:r>
-          </a:p>
-          <a:p>
-            <a:r>
-              <a:rPr lang="en-US" dirty="0"/>
-              <a:t>Built in to .NET one</a:t>
-            </a:r>
-          </a:p>
-          <a:p>
-            <a:r>
-              <a:rPr lang="en-US" dirty="0" err="1"/>
-              <a:t>OpenTelemetry</a:t>
-            </a:r>
-            <a:r>
-              <a:rPr lang="en-US" dirty="0"/>
-              <a:t> </a:t>
-            </a:r>
-            <a:r>
-              <a:rPr lang="en-US"/>
-              <a:t>community provided one</a:t>
-            </a:r>
-            <a:endParaRPr lang="en-US" dirty="0"/>
+              <a:t>A Span with an Event, no link to other Spans</a:t>
+            </a:r>
+          </a:p>
+          <a:p>
+            <a:r>
+              <a:rPr lang="en-US" dirty="0"/>
+              <a:t>Embedded Logs</a:t>
+            </a:r>
+          </a:p>
+          <a:p>
+            <a:pPr lvl="1"/>
+            <a:r>
+              <a:rPr lang="en-US" dirty="0"/>
+              <a:t>An Event in a Span</a:t>
+            </a:r>
           </a:p>
         </p:txBody>
       </p:sp>
     </p:spTree>
     <p:extLst>
       <p:ext uri="{BB962C8B-B14F-4D97-AF65-F5344CB8AC3E}">
-        <p14:creationId xmlns:p14="http://schemas.microsoft.com/office/powerpoint/2010/main" val="1503568322"/>
+        <p14:creationId xmlns:p14="http://schemas.microsoft.com/office/powerpoint/2010/main" val="2314078779"/>
       </p:ext>
     </p:extLst>
   </p:cSld>
@@ -3706,7 +3777,11 @@
           <a:bodyPr/>
           <a:lstStyle/>
           <a:p>
-            <a:endParaRPr lang="en-US"/>
+            <a:r>
+              <a:rPr lang="en-US" dirty="0" err="1"/>
+              <a:t>TraceContext</a:t>
+            </a:r>
+            <a:endParaRPr lang="en-US" dirty="0"/>
           </a:p>
         </p:txBody>
       </p:sp>
@@ -3731,7 +3806,17 @@
           <a:bodyPr/>
           <a:lstStyle/>
           <a:p>
-            <a:endParaRPr lang="en-US"/>
+            <a:r>
+              <a:rPr lang="en-US" dirty="0"/>
+              <a:t>Passed around to track the parent Trace</a:t>
+            </a:r>
+          </a:p>
+          <a:p>
+            <a:pPr lvl="1"/>
+            <a:r>
+              <a:rPr lang="en-US" dirty="0"/>
+              <a:t>Sometimes automatic, sometimes manually</a:t>
+            </a:r>
           </a:p>
         </p:txBody>
       </p:sp>
@@ -3770,6 +3855,208 @@
           <p:cNvPr id="2" name="Title 1">
             <a:extLst>
               <a:ext uri="{FF2B5EF4-FFF2-40B4-BE49-F238E27FC236}">
+                <a16:creationId xmlns:a16="http://schemas.microsoft.com/office/drawing/2014/main" id="{1E4B3E1C-B7FB-73D4-80B8-E85002405217}"/>
+              </a:ext>
+            </a:extLst>
+          </p:cNvPr>
+          <p:cNvSpPr>
+            <a:spLocks noGrp="1"/>
+          </p:cNvSpPr>
+          <p:nvPr>
+            <p:ph type="title"/>
+          </p:nvPr>
+        </p:nvSpPr>
+        <p:spPr/>
+        <p:txBody>
+          <a:bodyPr/>
+          <a:lstStyle/>
+          <a:p>
+            <a:r>
+              <a:rPr lang="en-US" dirty="0" err="1"/>
+              <a:t>TraceContext</a:t>
+            </a:r>
+            <a:r>
+              <a:rPr lang="en-US" dirty="0"/>
+              <a:t> contd.</a:t>
+            </a:r>
+          </a:p>
+        </p:txBody>
+      </p:sp>
+      <p:pic>
+        <p:nvPicPr>
+          <p:cNvPr id="5" name="Content Placeholder 4" descr="Diagram&#10;&#10;Description automatically generated">
+            <a:extLst>
+              <a:ext uri="{FF2B5EF4-FFF2-40B4-BE49-F238E27FC236}">
+                <a16:creationId xmlns:a16="http://schemas.microsoft.com/office/drawing/2014/main" id="{641DFCD3-020C-004A-DFB8-818F4D9B4B77}"/>
+              </a:ext>
+            </a:extLst>
+          </p:cNvPr>
+          <p:cNvPicPr>
+            <a:picLocks noGrp="1" noChangeAspect="1"/>
+          </p:cNvPicPr>
+          <p:nvPr>
+            <p:ph idx="1"/>
+          </p:nvPr>
+        </p:nvPicPr>
+        <p:blipFill>
+          <a:blip r:embed="rId2">
+            <a:extLst>
+              <a:ext uri="{28A0092B-C50C-407E-A947-70E740481C1C}">
+                <a14:useLocalDpi xmlns:a14="http://schemas.microsoft.com/office/drawing/2010/main" val="0"/>
+              </a:ext>
+            </a:extLst>
+          </a:blip>
+          <a:stretch>
+            <a:fillRect/>
+          </a:stretch>
+        </p:blipFill>
+        <p:spPr>
+          <a:xfrm>
+            <a:off x="1276480" y="1825625"/>
+            <a:ext cx="9639039" cy="4351338"/>
+          </a:xfrm>
+        </p:spPr>
+      </p:pic>
+    </p:spTree>
+    <p:extLst>
+      <p:ext uri="{BB962C8B-B14F-4D97-AF65-F5344CB8AC3E}">
+        <p14:creationId xmlns:p14="http://schemas.microsoft.com/office/powerpoint/2010/main" val="717331255"/>
+      </p:ext>
+    </p:extLst>
+  </p:cSld>
+  <p:clrMapOvr>
+    <a:masterClrMapping/>
+  </p:clrMapOvr>
+</p:sld>
+</file>
+
+<file path=ppt/slides/slide14.xml><?xml version="1.0" encoding="utf-8"?>
+<p:sld xmlns:a="http://schemas.openxmlformats.org/drawingml/2006/main" xmlns:r="http://schemas.openxmlformats.org/officeDocument/2006/relationships" xmlns:p="http://schemas.openxmlformats.org/presentationml/2006/main">
+  <p:cSld>
+    <p:spTree>
+      <p:nvGrpSpPr>
+        <p:cNvPr id="1" name=""/>
+        <p:cNvGrpSpPr/>
+        <p:nvPr/>
+      </p:nvGrpSpPr>
+      <p:grpSpPr>
+        <a:xfrm>
+          <a:off x="0" y="0"/>
+          <a:ext cx="0" cy="0"/>
+          <a:chOff x="0" y="0"/>
+          <a:chExt cx="0" cy="0"/>
+        </a:xfrm>
+      </p:grpSpPr>
+      <p:sp>
+        <p:nvSpPr>
+          <p:cNvPr id="2" name="Title 1">
+            <a:extLst>
+              <a:ext uri="{FF2B5EF4-FFF2-40B4-BE49-F238E27FC236}">
+                <a16:creationId xmlns:a16="http://schemas.microsoft.com/office/drawing/2014/main" id="{7E66F3A5-A777-B1AF-24E4-DB86EE46F263}"/>
+              </a:ext>
+            </a:extLst>
+          </p:cNvPr>
+          <p:cNvSpPr>
+            <a:spLocks noGrp="1"/>
+          </p:cNvSpPr>
+          <p:nvPr>
+            <p:ph type="title"/>
+          </p:nvPr>
+        </p:nvSpPr>
+        <p:spPr/>
+        <p:txBody>
+          <a:bodyPr/>
+          <a:lstStyle/>
+          <a:p>
+            <a:r>
+              <a:rPr lang="en-US" dirty="0"/>
+              <a:t>OTel with C#</a:t>
+            </a:r>
+          </a:p>
+        </p:txBody>
+      </p:sp>
+      <p:sp>
+        <p:nvSpPr>
+          <p:cNvPr id="3" name="Content Placeholder 2">
+            <a:extLst>
+              <a:ext uri="{FF2B5EF4-FFF2-40B4-BE49-F238E27FC236}">
+                <a16:creationId xmlns:a16="http://schemas.microsoft.com/office/drawing/2014/main" id="{6BDDC28F-E410-C123-7AB8-3CBFB249933B}"/>
+              </a:ext>
+            </a:extLst>
+          </p:cNvPr>
+          <p:cNvSpPr>
+            <a:spLocks noGrp="1"/>
+          </p:cNvSpPr>
+          <p:nvPr>
+            <p:ph idx="1"/>
+          </p:nvPr>
+        </p:nvSpPr>
+        <p:spPr/>
+        <p:txBody>
+          <a:bodyPr/>
+          <a:lstStyle/>
+          <a:p>
+            <a:r>
+              <a:rPr lang="en-US" dirty="0"/>
+              <a:t>2 APIs</a:t>
+            </a:r>
+          </a:p>
+          <a:p>
+            <a:pPr lvl="1"/>
+            <a:r>
+              <a:rPr lang="en-US" dirty="0"/>
+              <a:t>Because of course there are</a:t>
+            </a:r>
+          </a:p>
+          <a:p>
+            <a:r>
+              <a:rPr lang="en-US" dirty="0"/>
+              <a:t>Built in to .NET</a:t>
+            </a:r>
+          </a:p>
+          <a:p>
+            <a:r>
+              <a:rPr lang="en-US" dirty="0"/>
+              <a:t>OpenTelemetry community provided one</a:t>
+            </a:r>
+          </a:p>
+        </p:txBody>
+      </p:sp>
+    </p:spTree>
+    <p:extLst>
+      <p:ext uri="{BB962C8B-B14F-4D97-AF65-F5344CB8AC3E}">
+        <p14:creationId xmlns:p14="http://schemas.microsoft.com/office/powerpoint/2010/main" val="1503568322"/>
+      </p:ext>
+    </p:extLst>
+  </p:cSld>
+  <p:clrMapOvr>
+    <a:masterClrMapping/>
+  </p:clrMapOvr>
+</p:sld>
+</file>
+
+<file path=ppt/slides/slide15.xml><?xml version="1.0" encoding="utf-8"?>
+<p:sld xmlns:a="http://schemas.openxmlformats.org/drawingml/2006/main" xmlns:r="http://schemas.openxmlformats.org/officeDocument/2006/relationships" xmlns:p="http://schemas.openxmlformats.org/presentationml/2006/main">
+  <p:cSld>
+    <p:spTree>
+      <p:nvGrpSpPr>
+        <p:cNvPr id="1" name=""/>
+        <p:cNvGrpSpPr/>
+        <p:nvPr/>
+      </p:nvGrpSpPr>
+      <p:grpSpPr>
+        <a:xfrm>
+          <a:off x="0" y="0"/>
+          <a:ext cx="0" cy="0"/>
+          <a:chOff x="0" y="0"/>
+          <a:chExt cx="0" cy="0"/>
+        </a:xfrm>
+      </p:grpSpPr>
+      <p:sp>
+        <p:nvSpPr>
+          <p:cNvPr id="2" name="Title 1">
+            <a:extLst>
+              <a:ext uri="{FF2B5EF4-FFF2-40B4-BE49-F238E27FC236}">
                 <a16:creationId xmlns:a16="http://schemas.microsoft.com/office/drawing/2014/main" id="{A9BB2B8B-22CC-AA43-82DC-410A70395B08}"/>
               </a:ext>
             </a:extLst>
@@ -3786,7 +4073,10 @@
           <a:bodyPr/>
           <a:lstStyle/>
           <a:p>
-            <a:endParaRPr lang="en-US"/>
+            <a:r>
+              <a:rPr lang="en-US" dirty="0"/>
+              <a:t>Built-In API</a:t>
+            </a:r>
           </a:p>
         </p:txBody>
       </p:sp>
@@ -3811,7 +4101,10 @@
           <a:bodyPr/>
           <a:lstStyle/>
           <a:p>
-            <a:endParaRPr lang="en-US"/>
+            <a:r>
+              <a:rPr lang="en-US"/>
+              <a:t>ActivitySource</a:t>
+            </a:r>
           </a:p>
         </p:txBody>
       </p:sp>
@@ -3819,6 +4112,98 @@
     <p:extLst>
       <p:ext uri="{BB962C8B-B14F-4D97-AF65-F5344CB8AC3E}">
         <p14:creationId xmlns:p14="http://schemas.microsoft.com/office/powerpoint/2010/main" val="2104434691"/>
+      </p:ext>
+    </p:extLst>
+  </p:cSld>
+  <p:clrMapOvr>
+    <a:masterClrMapping/>
+  </p:clrMapOvr>
+</p:sld>
+</file>
+
+<file path=ppt/slides/slide16.xml><?xml version="1.0" encoding="utf-8"?>
+<p:sld xmlns:a="http://schemas.openxmlformats.org/drawingml/2006/main" xmlns:r="http://schemas.openxmlformats.org/officeDocument/2006/relationships" xmlns:p="http://schemas.openxmlformats.org/presentationml/2006/main">
+  <p:cSld>
+    <p:spTree>
+      <p:nvGrpSpPr>
+        <p:cNvPr id="1" name=""/>
+        <p:cNvGrpSpPr/>
+        <p:nvPr/>
+      </p:nvGrpSpPr>
+      <p:grpSpPr>
+        <a:xfrm>
+          <a:off x="0" y="0"/>
+          <a:ext cx="0" cy="0"/>
+          <a:chOff x="0" y="0"/>
+          <a:chExt cx="0" cy="0"/>
+        </a:xfrm>
+      </p:grpSpPr>
+      <p:sp>
+        <p:nvSpPr>
+          <p:cNvPr id="2" name="Title 1">
+            <a:extLst>
+              <a:ext uri="{FF2B5EF4-FFF2-40B4-BE49-F238E27FC236}">
+                <a16:creationId xmlns:a16="http://schemas.microsoft.com/office/drawing/2014/main" id="{E14EAEB5-D3D9-4211-1464-A24898D333E8}"/>
+              </a:ext>
+            </a:extLst>
+          </p:cNvPr>
+          <p:cNvSpPr>
+            <a:spLocks noGrp="1"/>
+          </p:cNvSpPr>
+          <p:nvPr>
+            <p:ph type="title"/>
+          </p:nvPr>
+        </p:nvSpPr>
+        <p:spPr/>
+        <p:txBody>
+          <a:bodyPr/>
+          <a:lstStyle/>
+          <a:p>
+            <a:r>
+              <a:rPr lang="en-US" dirty="0"/>
+              <a:t>Community API</a:t>
+            </a:r>
+          </a:p>
+        </p:txBody>
+      </p:sp>
+      <p:sp>
+        <p:nvSpPr>
+          <p:cNvPr id="3" name="Content Placeholder 2">
+            <a:extLst>
+              <a:ext uri="{FF2B5EF4-FFF2-40B4-BE49-F238E27FC236}">
+                <a16:creationId xmlns:a16="http://schemas.microsoft.com/office/drawing/2014/main" id="{764B016F-1B5F-8DEE-0476-B87FF8974058}"/>
+              </a:ext>
+            </a:extLst>
+          </p:cNvPr>
+          <p:cNvSpPr>
+            <a:spLocks noGrp="1"/>
+          </p:cNvSpPr>
+          <p:nvPr>
+            <p:ph idx="1"/>
+          </p:nvPr>
+        </p:nvSpPr>
+        <p:spPr/>
+        <p:txBody>
+          <a:bodyPr/>
+          <a:lstStyle/>
+          <a:p>
+            <a:r>
+              <a:rPr lang="en-US" dirty="0"/>
+              <a:t>Trace object</a:t>
+            </a:r>
+          </a:p>
+          <a:p>
+            <a:r>
+              <a:rPr lang="en-US" dirty="0"/>
+              <a:t>Span Object</a:t>
+            </a:r>
+          </a:p>
+        </p:txBody>
+      </p:sp>
+    </p:spTree>
+    <p:extLst>
+      <p:ext uri="{BB962C8B-B14F-4D97-AF65-F5344CB8AC3E}">
+        <p14:creationId xmlns:p14="http://schemas.microsoft.com/office/powerpoint/2010/main" val="2924318733"/>
       </p:ext>
     </p:extLst>
   </p:cSld>
@@ -3968,6 +4353,125 @@
           <p:cNvPr id="2" name="Title 1">
             <a:extLst>
               <a:ext uri="{FF2B5EF4-FFF2-40B4-BE49-F238E27FC236}">
+                <a16:creationId xmlns:a16="http://schemas.microsoft.com/office/drawing/2014/main" id="{ACBA46CF-7E83-2FFA-3F7F-3129A9C3D9FA}"/>
+              </a:ext>
+            </a:extLst>
+          </p:cNvPr>
+          <p:cNvSpPr>
+            <a:spLocks noGrp="1"/>
+          </p:cNvSpPr>
+          <p:nvPr>
+            <p:ph type="title"/>
+          </p:nvPr>
+        </p:nvSpPr>
+        <p:spPr/>
+        <p:txBody>
+          <a:bodyPr/>
+          <a:lstStyle/>
+          <a:p>
+            <a:r>
+              <a:rPr lang="en-US" dirty="0"/>
+              <a:t>Quick Notes</a:t>
+            </a:r>
+          </a:p>
+        </p:txBody>
+      </p:sp>
+      <p:sp>
+        <p:nvSpPr>
+          <p:cNvPr id="3" name="Content Placeholder 2">
+            <a:extLst>
+              <a:ext uri="{FF2B5EF4-FFF2-40B4-BE49-F238E27FC236}">
+                <a16:creationId xmlns:a16="http://schemas.microsoft.com/office/drawing/2014/main" id="{73CCB095-C4C2-5C2F-770D-A0696F8CA866}"/>
+              </a:ext>
+            </a:extLst>
+          </p:cNvPr>
+          <p:cNvSpPr>
+            <a:spLocks noGrp="1"/>
+          </p:cNvSpPr>
+          <p:nvPr>
+            <p:ph idx="1"/>
+          </p:nvPr>
+        </p:nvSpPr>
+        <p:spPr/>
+        <p:txBody>
+          <a:bodyPr/>
+          <a:lstStyle/>
+          <a:p>
+            <a:r>
+              <a:rPr lang="en-US" dirty="0"/>
+              <a:t>Who is this for? </a:t>
+            </a:r>
+          </a:p>
+          <a:p>
+            <a:pPr lvl="1"/>
+            <a:r>
+              <a:rPr lang="en-US" dirty="0"/>
+              <a:t>Developers</a:t>
+            </a:r>
+          </a:p>
+          <a:p>
+            <a:r>
+              <a:rPr lang="en-US" dirty="0"/>
+              <a:t>What language will we use?</a:t>
+            </a:r>
+          </a:p>
+          <a:p>
+            <a:pPr lvl="1"/>
+            <a:r>
+              <a:rPr lang="en-US" dirty="0"/>
+              <a:t>C#, but concepts apply globally</a:t>
+            </a:r>
+          </a:p>
+          <a:p>
+            <a:r>
+              <a:rPr lang="en-US" dirty="0"/>
+              <a:t>Should you stop using logs and go all in with OTel?</a:t>
+            </a:r>
+          </a:p>
+          <a:p>
+            <a:pPr lvl="1"/>
+            <a:r>
+              <a:rPr lang="en-US" dirty="0"/>
+              <a:t>No</a:t>
+            </a:r>
+          </a:p>
+        </p:txBody>
+      </p:sp>
+    </p:spTree>
+    <p:extLst>
+      <p:ext uri="{BB962C8B-B14F-4D97-AF65-F5344CB8AC3E}">
+        <p14:creationId xmlns:p14="http://schemas.microsoft.com/office/powerpoint/2010/main" val="3891600863"/>
+      </p:ext>
+    </p:extLst>
+  </p:cSld>
+  <p:clrMapOvr>
+    <a:masterClrMapping/>
+  </p:clrMapOvr>
+</p:sld>
+</file>
+
+<file path=ppt/slides/slide4.xml><?xml version="1.0" encoding="utf-8"?>
+<p:sld xmlns:a="http://schemas.openxmlformats.org/drawingml/2006/main" xmlns:r="http://schemas.openxmlformats.org/officeDocument/2006/relationships" xmlns:p="http://schemas.openxmlformats.org/presentationml/2006/main">
+  <p:cSld>
+    <p:spTree>
+      <p:nvGrpSpPr>
+        <p:cNvPr id="1" name=""/>
+        <p:cNvGrpSpPr/>
+        <p:nvPr/>
+      </p:nvGrpSpPr>
+      <p:grpSpPr>
+        <a:xfrm>
+          <a:off x="0" y="0"/>
+          <a:ext cx="0" cy="0"/>
+          <a:chOff x="0" y="0"/>
+          <a:chExt cx="0" cy="0"/>
+        </a:xfrm>
+      </p:grpSpPr>
+      <p:sp>
+        <p:nvSpPr>
+          <p:cNvPr id="2" name="Title 1">
+            <a:extLst>
+              <a:ext uri="{FF2B5EF4-FFF2-40B4-BE49-F238E27FC236}">
                 <a16:creationId xmlns:a16="http://schemas.microsoft.com/office/drawing/2014/main" id="{EDF53E10-2794-ADE5-8E75-D602C7FC4C68}"/>
               </a:ext>
             </a:extLst>
@@ -4050,7 +4554,7 @@
 </p:sld>
 </file>
 
-<file path=ppt/slides/slide4.xml><?xml version="1.0" encoding="utf-8"?>
+<file path=ppt/slides/slide5.xml><?xml version="1.0" encoding="utf-8"?>
 <p:sld xmlns:a="http://schemas.openxmlformats.org/drawingml/2006/main" xmlns:r="http://schemas.openxmlformats.org/officeDocument/2006/relationships" xmlns:p="http://schemas.openxmlformats.org/presentationml/2006/main">
   <p:cSld>
     <p:spTree>
@@ -4207,132 +4711,6 @@
 </p:sld>
 </file>
 
-<file path=ppt/slides/slide5.xml><?xml version="1.0" encoding="utf-8"?>
-<p:sld xmlns:a="http://schemas.openxmlformats.org/drawingml/2006/main" xmlns:r="http://schemas.openxmlformats.org/officeDocument/2006/relationships" xmlns:p="http://schemas.openxmlformats.org/presentationml/2006/main">
-  <p:cSld>
-    <p:spTree>
-      <p:nvGrpSpPr>
-        <p:cNvPr id="1" name=""/>
-        <p:cNvGrpSpPr/>
-        <p:nvPr/>
-      </p:nvGrpSpPr>
-      <p:grpSpPr>
-        <a:xfrm>
-          <a:off x="0" y="0"/>
-          <a:ext cx="0" cy="0"/>
-          <a:chOff x="0" y="0"/>
-          <a:chExt cx="0" cy="0"/>
-        </a:xfrm>
-      </p:grpSpPr>
-      <p:sp>
-        <p:nvSpPr>
-          <p:cNvPr id="2" name="Title 1">
-            <a:extLst>
-              <a:ext uri="{FF2B5EF4-FFF2-40B4-BE49-F238E27FC236}">
-                <a16:creationId xmlns:a16="http://schemas.microsoft.com/office/drawing/2014/main" id="{7C8A8239-5B17-BCEB-24DB-AF5730BC8662}"/>
-              </a:ext>
-            </a:extLst>
-          </p:cNvPr>
-          <p:cNvSpPr>
-            <a:spLocks noGrp="1"/>
-          </p:cNvSpPr>
-          <p:nvPr>
-            <p:ph type="title"/>
-          </p:nvPr>
-        </p:nvSpPr>
-        <p:spPr/>
-        <p:txBody>
-          <a:bodyPr/>
-          <a:lstStyle/>
-          <a:p>
-            <a:r>
-              <a:rPr lang="en-US" dirty="0"/>
-              <a:t>Level Setting – Limitations of Plain Text Logs</a:t>
-            </a:r>
-          </a:p>
-        </p:txBody>
-      </p:sp>
-      <p:sp>
-        <p:nvSpPr>
-          <p:cNvPr id="3" name="Content Placeholder 2">
-            <a:extLst>
-              <a:ext uri="{FF2B5EF4-FFF2-40B4-BE49-F238E27FC236}">
-                <a16:creationId xmlns:a16="http://schemas.microsoft.com/office/drawing/2014/main" id="{FE44DCF6-C57C-E4F8-C527-B7F600096AB2}"/>
-              </a:ext>
-            </a:extLst>
-          </p:cNvPr>
-          <p:cNvSpPr>
-            <a:spLocks noGrp="1"/>
-          </p:cNvSpPr>
-          <p:nvPr>
-            <p:ph idx="1"/>
-          </p:nvPr>
-        </p:nvSpPr>
-        <p:spPr/>
-        <p:txBody>
-          <a:bodyPr/>
-          <a:lstStyle/>
-          <a:p>
-            <a:r>
-              <a:rPr lang="en-US" dirty="0"/>
-              <a:t>Data in files is hard to sift through</a:t>
-            </a:r>
-          </a:p>
-          <a:p>
-            <a:r>
-              <a:rPr lang="en-US" dirty="0"/>
-              <a:t>Custom providers can make this way easier</a:t>
-            </a:r>
-          </a:p>
-          <a:p>
-            <a:pPr lvl="1"/>
-            <a:r>
-              <a:rPr lang="en-US" dirty="0"/>
-              <a:t>You end up taking a big dependency on their solution</a:t>
-            </a:r>
-          </a:p>
-          <a:p>
-            <a:r>
-              <a:rPr lang="en-US" dirty="0"/>
-              <a:t>Example Scenario:</a:t>
-            </a:r>
-          </a:p>
-          <a:p>
-            <a:pPr lvl="1"/>
-            <a:r>
-              <a:rPr lang="en-US" dirty="0"/>
-              <a:t>UI calls `Service A` which calls `Service B` which calls `Service C`</a:t>
-            </a:r>
-          </a:p>
-          <a:p>
-            <a:pPr lvl="2"/>
-            <a:r>
-              <a:rPr lang="en-US" dirty="0"/>
-              <a:t>An exception occurs in `Service B` because of response from `Service C`</a:t>
-            </a:r>
-          </a:p>
-          <a:p>
-            <a:pPr lvl="2"/>
-            <a:r>
-              <a:rPr lang="en-US" dirty="0"/>
-              <a:t>How do you debug that?</a:t>
-            </a:r>
-          </a:p>
-        </p:txBody>
-      </p:sp>
-    </p:spTree>
-    <p:extLst>
-      <p:ext uri="{BB962C8B-B14F-4D97-AF65-F5344CB8AC3E}">
-        <p14:creationId xmlns:p14="http://schemas.microsoft.com/office/powerpoint/2010/main" val="863765343"/>
-      </p:ext>
-    </p:extLst>
-  </p:cSld>
-  <p:clrMapOvr>
-    <a:masterClrMapping/>
-  </p:clrMapOvr>
-</p:sld>
-</file>
-
 <file path=ppt/slides/slide6.xml><?xml version="1.0" encoding="utf-8"?>
 <p:sld xmlns:a="http://schemas.openxmlformats.org/drawingml/2006/main" xmlns:r="http://schemas.openxmlformats.org/officeDocument/2006/relationships" xmlns:p="http://schemas.openxmlformats.org/presentationml/2006/main">
   <p:cSld>
@@ -4355,7 +4733,7 @@
           <p:cNvPr id="2" name="Title 1">
             <a:extLst>
               <a:ext uri="{FF2B5EF4-FFF2-40B4-BE49-F238E27FC236}">
-                <a16:creationId xmlns:a16="http://schemas.microsoft.com/office/drawing/2014/main" id="{5E307F74-4B66-E256-883D-61DAB1C2B0A8}"/>
+                <a16:creationId xmlns:a16="http://schemas.microsoft.com/office/drawing/2014/main" id="{7C8A8239-5B17-BCEB-24DB-AF5730BC8662}"/>
               </a:ext>
             </a:extLst>
           </p:cNvPr>
@@ -4373,7 +4751,7 @@
           <a:p>
             <a:r>
               <a:rPr lang="en-US" dirty="0"/>
-              <a:t>What is OpenTelemetry (OTel)?</a:t>
+              <a:t>Level Setting – Limitations of Plain Text Logs</a:t>
             </a:r>
           </a:p>
         </p:txBody>
@@ -4383,7 +4761,7 @@
           <p:cNvPr id="3" name="Content Placeholder 2">
             <a:extLst>
               <a:ext uri="{FF2B5EF4-FFF2-40B4-BE49-F238E27FC236}">
-                <a16:creationId xmlns:a16="http://schemas.microsoft.com/office/drawing/2014/main" id="{B70B10D9-25F8-1530-119E-C1523AD1F882}"/>
+                <a16:creationId xmlns:a16="http://schemas.microsoft.com/office/drawing/2014/main" id="{FE44DCF6-C57C-E4F8-C527-B7F600096AB2}"/>
               </a:ext>
             </a:extLst>
           </p:cNvPr>
@@ -4401,36 +4779,55 @@
           <a:p>
             <a:r>
               <a:rPr lang="en-US" dirty="0"/>
-              <a:t>A standard for collecting telemetry data about your services</a:t>
-            </a:r>
-          </a:p>
-          <a:p>
-            <a:r>
-              <a:rPr lang="en-US" dirty="0"/>
-              <a:t>Open Source, Vendor Neutral, Language Agnostic</a:t>
-            </a:r>
-          </a:p>
-          <a:p>
-            <a:r>
-              <a:rPr lang="en-US" dirty="0">
-                <a:hlinkClick r:id="rId2"/>
-              </a:rPr>
-              <a:t>https://opentelemetry.io/</a:t>
-            </a:r>
-            <a:endParaRPr lang="en-US" dirty="0"/>
-          </a:p>
-          <a:p>
-            <a:endParaRPr lang="en-US" dirty="0"/>
-          </a:p>
-          <a:p>
-            <a:endParaRPr lang="en-US" dirty="0"/>
+              <a:t>Data in files is hard to sift through</a:t>
+            </a:r>
+          </a:p>
+          <a:p>
+            <a:r>
+              <a:rPr lang="en-US" dirty="0"/>
+              <a:t>Custom providers can make this way easier</a:t>
+            </a:r>
+          </a:p>
+          <a:p>
+            <a:pPr lvl="1"/>
+            <a:r>
+              <a:rPr lang="en-US" dirty="0"/>
+              <a:t>You end up taking a big dependency on their solution</a:t>
+            </a:r>
+          </a:p>
+          <a:p>
+            <a:r>
+              <a:rPr lang="en-US" dirty="0"/>
+              <a:t>Example Scenario:</a:t>
+            </a:r>
+          </a:p>
+          <a:p>
+            <a:pPr lvl="1"/>
+            <a:r>
+              <a:rPr lang="en-US" dirty="0"/>
+              <a:t>UI calls `Service A` which calls `Service B` which calls `Service C`</a:t>
+            </a:r>
+          </a:p>
+          <a:p>
+            <a:pPr lvl="2"/>
+            <a:r>
+              <a:rPr lang="en-US" dirty="0"/>
+              <a:t>An exception occurs in `Service B` because of response from `Service C`</a:t>
+            </a:r>
+          </a:p>
+          <a:p>
+            <a:pPr lvl="2"/>
+            <a:r>
+              <a:rPr lang="en-US" dirty="0"/>
+              <a:t>How do you debug that?</a:t>
+            </a:r>
           </a:p>
         </p:txBody>
       </p:sp>
     </p:spTree>
     <p:extLst>
       <p:ext uri="{BB962C8B-B14F-4D97-AF65-F5344CB8AC3E}">
-        <p14:creationId xmlns:p14="http://schemas.microsoft.com/office/powerpoint/2010/main" val="1831172772"/>
+        <p14:creationId xmlns:p14="http://schemas.microsoft.com/office/powerpoint/2010/main" val="863765343"/>
       </p:ext>
     </p:extLst>
   </p:cSld>
@@ -4462,7 +4859,7 @@
           <p:cNvPr id="2" name="Title 1">
             <a:extLst>
               <a:ext uri="{FF2B5EF4-FFF2-40B4-BE49-F238E27FC236}">
-                <a16:creationId xmlns:a16="http://schemas.microsoft.com/office/drawing/2014/main" id="{D8B96612-17A0-176A-92F7-3BCE97F3A665}"/>
+                <a16:creationId xmlns:a16="http://schemas.microsoft.com/office/drawing/2014/main" id="{5E307F74-4B66-E256-883D-61DAB1C2B0A8}"/>
               </a:ext>
             </a:extLst>
           </p:cNvPr>
@@ -4480,7 +4877,7 @@
           <a:p>
             <a:r>
               <a:rPr lang="en-US" dirty="0"/>
-              <a:t>What data does OTel collect?</a:t>
+              <a:t>What is OpenTelemetry (OTel)?</a:t>
             </a:r>
           </a:p>
         </p:txBody>
@@ -4490,7 +4887,7 @@
           <p:cNvPr id="3" name="Content Placeholder 2">
             <a:extLst>
               <a:ext uri="{FF2B5EF4-FFF2-40B4-BE49-F238E27FC236}">
-                <a16:creationId xmlns:a16="http://schemas.microsoft.com/office/drawing/2014/main" id="{E2E199BB-9297-AC8A-E12E-8C5CB312F3FD}"/>
+                <a16:creationId xmlns:a16="http://schemas.microsoft.com/office/drawing/2014/main" id="{B70B10D9-25F8-1530-119E-C1523AD1F882}"/>
               </a:ext>
             </a:extLst>
           </p:cNvPr>
@@ -4508,46 +4905,36 @@
           <a:p>
             <a:r>
               <a:rPr lang="en-US" dirty="0"/>
-              <a:t>Traces</a:t>
-            </a:r>
-          </a:p>
-          <a:p>
-            <a:pPr lvl="1"/>
+              <a:t>A standard for collecting telemetry data about your services</a:t>
+            </a:r>
+          </a:p>
+          <a:p>
+            <a:r>
+              <a:rPr lang="en-US" dirty="0"/>
+              <a:t>Open Source, Vendor Neutral, Language Agnostic</a:t>
+            </a:r>
+          </a:p>
+          <a:p>
+            <a:r>
+              <a:rPr lang="en-US" dirty="0">
+                <a:hlinkClick r:id="rId2"/>
+              </a:rPr>
+              <a:t>https://opentelemetry.io/</a:t>
+            </a:r>
             <a:endParaRPr lang="en-US" dirty="0"/>
           </a:p>
           <a:p>
-            <a:r>
-              <a:rPr lang="en-US" dirty="0"/>
-              <a:t>Metrics</a:t>
-            </a:r>
-          </a:p>
-          <a:p>
-            <a:pPr lvl="1"/>
-            <a:r>
-              <a:rPr lang="en-US" dirty="0"/>
-              <a:t>Performance counters</a:t>
-            </a:r>
-          </a:p>
-          <a:p>
-            <a:pPr lvl="1"/>
-            <a:r>
-              <a:rPr lang="en-US" dirty="0"/>
-              <a:t>Mostly Automatic</a:t>
-            </a:r>
-          </a:p>
-          <a:p>
-            <a:pPr lvl="2"/>
-            <a:r>
-              <a:rPr lang="en-US" dirty="0"/>
-              <a:t>Install agent on box, set some config, leave it alone</a:t>
-            </a:r>
+            <a:endParaRPr lang="en-US" dirty="0"/>
+          </a:p>
+          <a:p>
+            <a:endParaRPr lang="en-US" dirty="0"/>
           </a:p>
         </p:txBody>
       </p:sp>
     </p:spTree>
     <p:extLst>
       <p:ext uri="{BB962C8B-B14F-4D97-AF65-F5344CB8AC3E}">
-        <p14:creationId xmlns:p14="http://schemas.microsoft.com/office/powerpoint/2010/main" val="2452761775"/>
+        <p14:creationId xmlns:p14="http://schemas.microsoft.com/office/powerpoint/2010/main" val="1831172772"/>
       </p:ext>
     </p:extLst>
   </p:cSld>
@@ -4579,7 +4966,7 @@
           <p:cNvPr id="2" name="Title 1">
             <a:extLst>
               <a:ext uri="{FF2B5EF4-FFF2-40B4-BE49-F238E27FC236}">
-                <a16:creationId xmlns:a16="http://schemas.microsoft.com/office/drawing/2014/main" id="{E9D5BFED-98DA-1F9D-BD38-501E6FA022AC}"/>
+                <a16:creationId xmlns:a16="http://schemas.microsoft.com/office/drawing/2014/main" id="{D8B96612-17A0-176A-92F7-3BCE97F3A665}"/>
               </a:ext>
             </a:extLst>
           </p:cNvPr>
@@ -4596,12 +4983,8 @@
           <a:lstStyle/>
           <a:p>
             <a:r>
-              <a:rPr lang="en-US" dirty="0" err="1"/>
-              <a:t>Otel</a:t>
-            </a:r>
-            <a:r>
-              <a:rPr lang="en-US" dirty="0"/>
-              <a:t> Metrics</a:t>
+              <a:rPr lang="en-US" dirty="0"/>
+              <a:t>What data does OTel collect?</a:t>
             </a:r>
           </a:p>
         </p:txBody>
@@ -4611,7 +4994,7 @@
           <p:cNvPr id="3" name="Content Placeholder 2">
             <a:extLst>
               <a:ext uri="{FF2B5EF4-FFF2-40B4-BE49-F238E27FC236}">
-                <a16:creationId xmlns:a16="http://schemas.microsoft.com/office/drawing/2014/main" id="{8BED0D18-AA50-7A8C-26EC-7C136586261A}"/>
+                <a16:creationId xmlns:a16="http://schemas.microsoft.com/office/drawing/2014/main" id="{E2E199BB-9297-AC8A-E12E-8C5CB312F3FD}"/>
               </a:ext>
             </a:extLst>
           </p:cNvPr>
@@ -4629,21 +5012,38 @@
           <a:p>
             <a:r>
               <a:rPr lang="en-US" dirty="0"/>
-              <a:t>Counters</a:t>
+              <a:t>Traces</a:t>
             </a:r>
           </a:p>
           <a:p>
             <a:pPr lvl="1"/>
-            <a:r>
-              <a:rPr lang="en-US" dirty="0"/>
-              <a:t>CPU/Memory usage on the box</a:t>
+            <a:endParaRPr lang="en-US" dirty="0"/>
+          </a:p>
+          <a:p>
+            <a:r>
+              <a:rPr lang="en-US" dirty="0"/>
+              <a:t>Metrics</a:t>
             </a:r>
           </a:p>
           <a:p>
             <a:pPr lvl="1"/>
             <a:r>
               <a:rPr lang="en-US" dirty="0"/>
-              <a:t>Requests per second</a:t>
+              <a:t>Performance counters</a:t>
+            </a:r>
+          </a:p>
+          <a:p>
+            <a:pPr lvl="1"/>
+            <a:r>
+              <a:rPr lang="en-US" dirty="0"/>
+              <a:t>Mostly Automatic</a:t>
+            </a:r>
+          </a:p>
+          <a:p>
+            <a:pPr lvl="2"/>
+            <a:r>
+              <a:rPr lang="en-US" dirty="0"/>
+              <a:t>Install agent on box, set some config, leave it alone</a:t>
             </a:r>
           </a:p>
         </p:txBody>
@@ -4651,7 +5051,7 @@
     </p:spTree>
     <p:extLst>
       <p:ext uri="{BB962C8B-B14F-4D97-AF65-F5344CB8AC3E}">
-        <p14:creationId xmlns:p14="http://schemas.microsoft.com/office/powerpoint/2010/main" val="1300523344"/>
+        <p14:creationId xmlns:p14="http://schemas.microsoft.com/office/powerpoint/2010/main" val="2452761775"/>
       </p:ext>
     </p:extLst>
   </p:cSld>
@@ -4683,7 +5083,7 @@
           <p:cNvPr id="2" name="Title 1">
             <a:extLst>
               <a:ext uri="{FF2B5EF4-FFF2-40B4-BE49-F238E27FC236}">
-                <a16:creationId xmlns:a16="http://schemas.microsoft.com/office/drawing/2014/main" id="{750EEC00-ACB4-91E4-DA0D-94466EF4CF6C}"/>
+                <a16:creationId xmlns:a16="http://schemas.microsoft.com/office/drawing/2014/main" id="{E9D5BFED-98DA-1F9D-BD38-501E6FA022AC}"/>
               </a:ext>
             </a:extLst>
           </p:cNvPr>
@@ -4705,7 +5105,7 @@
             </a:r>
             <a:r>
               <a:rPr lang="en-US" dirty="0"/>
-              <a:t> Traces</a:t>
+              <a:t> Metrics</a:t>
             </a:r>
           </a:p>
         </p:txBody>
@@ -4715,7 +5115,7 @@
           <p:cNvPr id="3" name="Content Placeholder 2">
             <a:extLst>
               <a:ext uri="{FF2B5EF4-FFF2-40B4-BE49-F238E27FC236}">
-                <a16:creationId xmlns:a16="http://schemas.microsoft.com/office/drawing/2014/main" id="{5B0DA666-D600-BB5F-0EBF-CA05891D174E}"/>
+                <a16:creationId xmlns:a16="http://schemas.microsoft.com/office/drawing/2014/main" id="{8BED0D18-AA50-7A8C-26EC-7C136586261A}"/>
               </a:ext>
             </a:extLst>
           </p:cNvPr>
@@ -4728,104 +5128,26 @@
         </p:nvSpPr>
         <p:spPr/>
         <p:txBody>
-          <a:bodyPr>
-            <a:normAutofit fontScale="92500" lnSpcReduction="20000"/>
-          </a:bodyPr>
-          <a:lstStyle/>
-          <a:p>
-            <a:r>
-              <a:rPr lang="en-US" dirty="0"/>
-              <a:t>Information for a request</a:t>
+          <a:bodyPr/>
+          <a:lstStyle/>
+          <a:p>
+            <a:r>
+              <a:rPr lang="en-US" dirty="0"/>
+              <a:t>Counters</a:t>
             </a:r>
           </a:p>
           <a:p>
             <a:pPr lvl="1"/>
             <a:r>
               <a:rPr lang="en-US" dirty="0"/>
-              <a:t>Can span multiple applications, all based on the Trace Id</a:t>
-            </a:r>
-          </a:p>
-          <a:p>
-            <a:r>
-              <a:rPr lang="en-US" dirty="0"/>
-              <a:t>Traces have child Spans</a:t>
+              <a:t>CPU/Memory usage on the box</a:t>
             </a:r>
           </a:p>
           <a:p>
             <a:pPr lvl="1"/>
             <a:r>
               <a:rPr lang="en-US" dirty="0"/>
-              <a:t>Spans have child Attributes</a:t>
-            </a:r>
-          </a:p>
-          <a:p>
-            <a:pPr lvl="2"/>
-            <a:r>
-              <a:rPr lang="en-US" dirty="0"/>
-              <a:t>Attributes are key/value pairs of data</a:t>
-            </a:r>
-          </a:p>
-          <a:p>
-            <a:pPr lvl="1"/>
-            <a:r>
-              <a:rPr lang="en-US" dirty="0"/>
-              <a:t>Spans have child Events</a:t>
-            </a:r>
-          </a:p>
-          <a:p>
-            <a:pPr lvl="2"/>
-            <a:r>
-              <a:rPr lang="en-US" dirty="0"/>
-              <a:t>Events are timestamped pieces of data in a span, can have their own attributes</a:t>
-            </a:r>
-          </a:p>
-          <a:p>
-            <a:r>
-              <a:rPr lang="en-US" dirty="0"/>
-              <a:t>Example:</a:t>
-            </a:r>
-          </a:p>
-          <a:p>
-            <a:pPr lvl="1"/>
-            <a:r>
-              <a:rPr lang="en-US" dirty="0"/>
-              <a:t>Trace is created when a request comes into the system</a:t>
-            </a:r>
-          </a:p>
-          <a:p>
-            <a:pPr lvl="1"/>
-            <a:r>
-              <a:rPr lang="en-US" dirty="0"/>
-              <a:t>A span is made to wrap around call to database</a:t>
-            </a:r>
-          </a:p>
-          <a:p>
-            <a:pPr lvl="2"/>
-            <a:r>
-              <a:rPr lang="en-US" dirty="0"/>
-              <a:t>Span stores time it took to run the database query</a:t>
-            </a:r>
-          </a:p>
-          <a:p>
-            <a:pPr lvl="1"/>
-            <a:r>
-              <a:rPr lang="en-US" dirty="0"/>
-              <a:t>Another span is created when making call out to 3</a:t>
-            </a:r>
-            <a:r>
-              <a:rPr lang="en-US" baseline="30000" dirty="0"/>
-              <a:t>rd</a:t>
-            </a:r>
-            <a:r>
-              <a:rPr lang="en-US" dirty="0"/>
-              <a:t> party service</a:t>
-            </a:r>
-          </a:p>
-          <a:p>
-            <a:pPr lvl="2"/>
-            <a:r>
-              <a:rPr lang="en-US" dirty="0"/>
-              <a:t>Span stores time it took to run the HTTP request and the response HTTP status code, plus error if needed</a:t>
+              <a:t>Requests per second</a:t>
             </a:r>
           </a:p>
         </p:txBody>
@@ -4833,7 +5155,7 @@
     </p:spTree>
     <p:extLst>
       <p:ext uri="{BB962C8B-B14F-4D97-AF65-F5344CB8AC3E}">
-        <p14:creationId xmlns:p14="http://schemas.microsoft.com/office/powerpoint/2010/main" val="3266317626"/>
+        <p14:creationId xmlns:p14="http://schemas.microsoft.com/office/powerpoint/2010/main" val="1300523344"/>
       </p:ext>
     </p:extLst>
   </p:cSld>

</xml_diff>

<commit_message>
Some upgrades after testing the demo code
</commit_message>
<xml_diff>
--- a/2023-03 - Orlando Code Camp - OpenTelemetry/Presentation.pptx
+++ b/2023-03 - Orlando Code Camp - OpenTelemetry/Presentation.pptx
@@ -3818,6 +3818,27 @@
               <a:t>Sometimes automatic, sometimes manually</a:t>
             </a:r>
           </a:p>
+          <a:p>
+            <a:r>
+              <a:rPr lang="en-US" dirty="0"/>
+              <a:t>“</a:t>
+            </a:r>
+            <a:r>
+              <a:rPr lang="en-US" dirty="0" err="1"/>
+              <a:t>traceparent</a:t>
+            </a:r>
+            <a:r>
+              <a:rPr lang="en-US" dirty="0"/>
+              <a:t>” Header</a:t>
+            </a:r>
+          </a:p>
+          <a:p>
+            <a:pPr lvl="1"/>
+            <a:r>
+              <a:rPr lang="en-US" dirty="0"/>
+              <a:t>00-c9dafef5b02172ce9f19a70ee83e9fc8-4f78ce7bf9cb7d22-01</a:t>
+            </a:r>
+          </a:p>
         </p:txBody>
       </p:sp>
     </p:spTree>
@@ -4102,9 +4123,10 @@
           <a:lstStyle/>
           <a:p>
             <a:r>
-              <a:rPr lang="en-US"/>
+              <a:rPr lang="en-US" dirty="0" err="1"/>
               <a:t>ActivitySource</a:t>
             </a:r>
+            <a:endParaRPr lang="en-US" dirty="0"/>
           </a:p>
         </p:txBody>
       </p:sp>

</xml_diff>

<commit_message>
Worked on the presentation some more
</commit_message>
<xml_diff>
--- a/2023-03 - Orlando Code Camp - OpenTelemetry/Presentation.pptx
+++ b/2023-03 - Orlando Code Camp - OpenTelemetry/Presentation.pptx
@@ -15,12 +15,17 @@
     <p:sldId id="258" r:id="rId9"/>
     <p:sldId id="259" r:id="rId10"/>
     <p:sldId id="260" r:id="rId11"/>
-    <p:sldId id="265" r:id="rId12"/>
-    <p:sldId id="267" r:id="rId13"/>
+    <p:sldId id="274" r:id="rId12"/>
+    <p:sldId id="276" r:id="rId13"/>
     <p:sldId id="269" r:id="rId14"/>
-    <p:sldId id="266" r:id="rId15"/>
-    <p:sldId id="268" r:id="rId16"/>
-    <p:sldId id="271" r:id="rId17"/>
+    <p:sldId id="267" r:id="rId15"/>
+    <p:sldId id="275" r:id="rId16"/>
+    <p:sldId id="266" r:id="rId17"/>
+    <p:sldId id="268" r:id="rId18"/>
+    <p:sldId id="271" r:id="rId19"/>
+    <p:sldId id="272" r:id="rId20"/>
+    <p:sldId id="265" r:id="rId21"/>
+    <p:sldId id="273" r:id="rId22"/>
   </p:sldIdLst>
   <p:sldSz cx="12192000" cy="6858000"/>
   <p:notesSz cx="6858000" cy="9144000"/>
@@ -3486,12 +3491,8 @@
           <a:lstStyle/>
           <a:p>
             <a:r>
-              <a:rPr lang="en-US" dirty="0" err="1"/>
-              <a:t>Otel</a:t>
-            </a:r>
-            <a:r>
-              <a:rPr lang="en-US" dirty="0"/>
-              <a:t> Traces</a:t>
+              <a:rPr lang="en-US" dirty="0"/>
+              <a:t>OTel Traces</a:t>
             </a:r>
           </a:p>
         </p:txBody>
@@ -3515,13 +3516,13 @@
         <p:spPr/>
         <p:txBody>
           <a:bodyPr>
-            <a:normAutofit fontScale="92500" lnSpcReduction="20000"/>
+            <a:normAutofit/>
           </a:bodyPr>
           <a:lstStyle/>
           <a:p>
             <a:r>
               <a:rPr lang="en-US" dirty="0"/>
-              <a:t>Information for a request</a:t>
+              <a:t>Parent item for tracing data</a:t>
             </a:r>
           </a:p>
           <a:p>
@@ -3534,84 +3535,14 @@
           <a:p>
             <a:r>
               <a:rPr lang="en-US" dirty="0"/>
-              <a:t>Traces have child Spans</a:t>
+              <a:t>Defaults to each request into the system</a:t>
             </a:r>
           </a:p>
           <a:p>
             <a:pPr lvl="1"/>
             <a:r>
               <a:rPr lang="en-US" dirty="0"/>
-              <a:t>Spans have child Attributes</a:t>
-            </a:r>
-          </a:p>
-          <a:p>
-            <a:pPr lvl="2"/>
-            <a:r>
-              <a:rPr lang="en-US" dirty="0"/>
-              <a:t>Attributes are key/value pairs of data</a:t>
-            </a:r>
-          </a:p>
-          <a:p>
-            <a:pPr lvl="1"/>
-            <a:r>
-              <a:rPr lang="en-US" dirty="0"/>
-              <a:t>Spans have child Events</a:t>
-            </a:r>
-          </a:p>
-          <a:p>
-            <a:pPr lvl="2"/>
-            <a:r>
-              <a:rPr lang="en-US" dirty="0"/>
-              <a:t>Events are timestamped pieces of data in a span, can have their own attributes</a:t>
-            </a:r>
-          </a:p>
-          <a:p>
-            <a:r>
-              <a:rPr lang="en-US" dirty="0"/>
-              <a:t>Example:</a:t>
-            </a:r>
-          </a:p>
-          <a:p>
-            <a:pPr lvl="1"/>
-            <a:r>
-              <a:rPr lang="en-US" dirty="0"/>
-              <a:t>Trace is created when a request comes into the system</a:t>
-            </a:r>
-          </a:p>
-          <a:p>
-            <a:pPr lvl="1"/>
-            <a:r>
-              <a:rPr lang="en-US" dirty="0"/>
-              <a:t>A span is made to wrap around call to database</a:t>
-            </a:r>
-          </a:p>
-          <a:p>
-            <a:pPr lvl="2"/>
-            <a:r>
-              <a:rPr lang="en-US" dirty="0"/>
-              <a:t>Span stores time it took to run the database query</a:t>
-            </a:r>
-          </a:p>
-          <a:p>
-            <a:pPr lvl="1"/>
-            <a:r>
-              <a:rPr lang="en-US" dirty="0"/>
-              <a:t>Another span is created when making call out to 3</a:t>
-            </a:r>
-            <a:r>
-              <a:rPr lang="en-US" baseline="30000" dirty="0"/>
-              <a:t>rd</a:t>
-            </a:r>
-            <a:r>
-              <a:rPr lang="en-US" dirty="0"/>
-              <a:t> party service</a:t>
-            </a:r>
-          </a:p>
-          <a:p>
-            <a:pPr lvl="2"/>
-            <a:r>
-              <a:rPr lang="en-US" dirty="0"/>
-              <a:t>Span stores time it took to run the HTTP request and the response HTTP status code, plus error if needed</a:t>
+              <a:t>You can make them anywhere you want, I guess</a:t>
             </a:r>
           </a:p>
         </p:txBody>
@@ -3651,7 +3582,7 @@
           <p:cNvPr id="2" name="Title 1">
             <a:extLst>
               <a:ext uri="{FF2B5EF4-FFF2-40B4-BE49-F238E27FC236}">
-                <a16:creationId xmlns:a16="http://schemas.microsoft.com/office/drawing/2014/main" id="{1B34032A-7733-FF48-0ED1-FE488BD4E2DD}"/>
+                <a16:creationId xmlns:a16="http://schemas.microsoft.com/office/drawing/2014/main" id="{1235C62F-F1AF-214B-F969-782BDDB72EEB}"/>
               </a:ext>
             </a:extLst>
           </p:cNvPr>
@@ -3668,12 +3599,8 @@
           <a:lstStyle/>
           <a:p>
             <a:r>
-              <a:rPr lang="en-US" dirty="0" err="1"/>
-              <a:t>Otel</a:t>
-            </a:r>
-            <a:r>
-              <a:rPr lang="en-US" dirty="0"/>
-              <a:t> Log Records</a:t>
+              <a:rPr lang="en-US" dirty="0"/>
+              <a:t>OTel Spans</a:t>
             </a:r>
           </a:p>
         </p:txBody>
@@ -3683,7 +3610,7 @@
           <p:cNvPr id="3" name="Content Placeholder 2">
             <a:extLst>
               <a:ext uri="{FF2B5EF4-FFF2-40B4-BE49-F238E27FC236}">
-                <a16:creationId xmlns:a16="http://schemas.microsoft.com/office/drawing/2014/main" id="{507F062A-301B-C6D5-4319-54B039F74FF0}"/>
+                <a16:creationId xmlns:a16="http://schemas.microsoft.com/office/drawing/2014/main" id="{E550B4B5-706A-1D6B-C7E4-34C2DE4EDE6C}"/>
               </a:ext>
             </a:extLst>
           </p:cNvPr>
@@ -3696,40 +3623,102 @@
         </p:nvSpPr>
         <p:spPr/>
         <p:txBody>
-          <a:bodyPr/>
-          <a:lstStyle/>
-          <a:p>
-            <a:r>
-              <a:rPr lang="en-US" dirty="0"/>
-              <a:t>Standalone Logs</a:t>
+          <a:bodyPr>
+            <a:normAutofit lnSpcReduction="10000"/>
+          </a:bodyPr>
+          <a:lstStyle/>
+          <a:p>
+            <a:r>
+              <a:rPr lang="en-US" dirty="0"/>
+              <a:t>Traces have child Spans</a:t>
             </a:r>
           </a:p>
           <a:p>
             <a:pPr lvl="1"/>
             <a:r>
               <a:rPr lang="en-US" dirty="0"/>
-              <a:t>A Span with an Event, no link to other Spans</a:t>
-            </a:r>
-          </a:p>
-          <a:p>
-            <a:r>
-              <a:rPr lang="en-US" dirty="0"/>
-              <a:t>Embedded Logs</a:t>
+              <a:t>Spans have child Attributes</a:t>
+            </a:r>
+          </a:p>
+          <a:p>
+            <a:pPr lvl="2"/>
+            <a:r>
+              <a:rPr lang="en-US" dirty="0"/>
+              <a:t>Attributes are key/value pairs of data</a:t>
             </a:r>
           </a:p>
           <a:p>
             <a:pPr lvl="1"/>
             <a:r>
               <a:rPr lang="en-US" dirty="0"/>
-              <a:t>An Event in a Span</a:t>
-            </a:r>
+              <a:t>Spans have child Events</a:t>
+            </a:r>
+          </a:p>
+          <a:p>
+            <a:pPr lvl="2"/>
+            <a:r>
+              <a:rPr lang="en-US" dirty="0"/>
+              <a:t>Events are timestamped pieces of data in a span, can have their own attributes</a:t>
+            </a:r>
+          </a:p>
+          <a:p>
+            <a:r>
+              <a:rPr lang="en-US" dirty="0"/>
+              <a:t>Example:</a:t>
+            </a:r>
+          </a:p>
+          <a:p>
+            <a:pPr lvl="1"/>
+            <a:r>
+              <a:rPr lang="en-US" dirty="0"/>
+              <a:t>Trace is created when a request comes into the system</a:t>
+            </a:r>
+          </a:p>
+          <a:p>
+            <a:pPr lvl="1"/>
+            <a:r>
+              <a:rPr lang="en-US" dirty="0"/>
+              <a:t>A span is made to wrap around call to database</a:t>
+            </a:r>
+          </a:p>
+          <a:p>
+            <a:pPr lvl="2"/>
+            <a:r>
+              <a:rPr lang="en-US" dirty="0"/>
+              <a:t>Span stores time it took to run the database query</a:t>
+            </a:r>
+          </a:p>
+          <a:p>
+            <a:pPr lvl="1"/>
+            <a:r>
+              <a:rPr lang="en-US" dirty="0"/>
+              <a:t>Another span is created when making call out to 3</a:t>
+            </a:r>
+            <a:r>
+              <a:rPr lang="en-US" baseline="30000" dirty="0"/>
+              <a:t>rd</a:t>
+            </a:r>
+            <a:r>
+              <a:rPr lang="en-US" dirty="0"/>
+              <a:t> party service</a:t>
+            </a:r>
+          </a:p>
+          <a:p>
+            <a:pPr lvl="2"/>
+            <a:r>
+              <a:rPr lang="en-US" dirty="0"/>
+              <a:t>Span stores time it took to run the HTTP request and the response HTTP status code, plus error if needed</a:t>
+            </a:r>
+          </a:p>
+          <a:p>
+            <a:endParaRPr lang="en-US" dirty="0"/>
           </a:p>
         </p:txBody>
       </p:sp>
     </p:spTree>
     <p:extLst>
       <p:ext uri="{BB962C8B-B14F-4D97-AF65-F5344CB8AC3E}">
-        <p14:creationId xmlns:p14="http://schemas.microsoft.com/office/powerpoint/2010/main" val="2314078779"/>
+        <p14:creationId xmlns:p14="http://schemas.microsoft.com/office/powerpoint/2010/main" val="3569872106"/>
       </p:ext>
     </p:extLst>
   </p:cSld>
@@ -3761,7 +3750,7 @@
           <p:cNvPr id="2" name="Title 1">
             <a:extLst>
               <a:ext uri="{FF2B5EF4-FFF2-40B4-BE49-F238E27FC236}">
-                <a16:creationId xmlns:a16="http://schemas.microsoft.com/office/drawing/2014/main" id="{F5B35BAA-E861-A124-0F27-2BC180B47B78}"/>
+                <a16:creationId xmlns:a16="http://schemas.microsoft.com/office/drawing/2014/main" id="{B86E2A0E-0DE5-C004-8FEF-6FBD54E538E5}"/>
               </a:ext>
             </a:extLst>
           </p:cNvPr>
@@ -3778,73 +3767,88 @@
           <a:lstStyle/>
           <a:p>
             <a:r>
-              <a:rPr lang="en-US" dirty="0" err="1"/>
-              <a:t>TraceContext</a:t>
-            </a:r>
+              <a:rPr lang="en-US" dirty="0"/>
+              <a:t>Full Trace Example</a:t>
+            </a:r>
+          </a:p>
+        </p:txBody>
+      </p:sp>
+      <p:sp>
+        <p:nvSpPr>
+          <p:cNvPr id="3" name="Content Placeholder 2">
+            <a:extLst>
+              <a:ext uri="{FF2B5EF4-FFF2-40B4-BE49-F238E27FC236}">
+                <a16:creationId xmlns:a16="http://schemas.microsoft.com/office/drawing/2014/main" id="{BF1A4D9F-C835-F38D-5DCB-69413E8D4B19}"/>
+              </a:ext>
+            </a:extLst>
+          </p:cNvPr>
+          <p:cNvSpPr>
+            <a:spLocks noGrp="1"/>
+          </p:cNvSpPr>
+          <p:nvPr>
+            <p:ph idx="1"/>
+          </p:nvPr>
+        </p:nvSpPr>
+        <p:spPr/>
+        <p:txBody>
+          <a:bodyPr/>
+          <a:lstStyle/>
+          <a:p>
             <a:endParaRPr lang="en-US" dirty="0"/>
           </a:p>
         </p:txBody>
       </p:sp>
-      <p:sp>
-        <p:nvSpPr>
-          <p:cNvPr id="3" name="Content Placeholder 2">
-            <a:extLst>
-              <a:ext uri="{FF2B5EF4-FFF2-40B4-BE49-F238E27FC236}">
-                <a16:creationId xmlns:a16="http://schemas.microsoft.com/office/drawing/2014/main" id="{1D4DD0D4-8EA8-3477-13E5-6D429EC8BBAE}"/>
-              </a:ext>
-            </a:extLst>
-          </p:cNvPr>
-          <p:cNvSpPr>
-            <a:spLocks noGrp="1"/>
-          </p:cNvSpPr>
-          <p:nvPr>
-            <p:ph idx="1"/>
-          </p:nvPr>
-        </p:nvSpPr>
-        <p:spPr/>
-        <p:txBody>
-          <a:bodyPr/>
-          <a:lstStyle/>
-          <a:p>
-            <a:r>
-              <a:rPr lang="en-US" dirty="0"/>
-              <a:t>Passed around to track the parent Trace</a:t>
-            </a:r>
-          </a:p>
-          <a:p>
-            <a:pPr lvl="1"/>
-            <a:r>
-              <a:rPr lang="en-US" dirty="0"/>
-              <a:t>Sometimes automatic, sometimes manually</a:t>
-            </a:r>
-          </a:p>
-          <a:p>
-            <a:r>
-              <a:rPr lang="en-US" dirty="0"/>
-              <a:t>“</a:t>
-            </a:r>
-            <a:r>
-              <a:rPr lang="en-US" dirty="0" err="1"/>
-              <a:t>traceparent</a:t>
-            </a:r>
-            <a:r>
-              <a:rPr lang="en-US" dirty="0"/>
-              <a:t>” Header</a:t>
-            </a:r>
-          </a:p>
-          <a:p>
-            <a:pPr lvl="1"/>
-            <a:r>
-              <a:rPr lang="en-US" dirty="0"/>
-              <a:t>00-c9dafef5b02172ce9f19a70ee83e9fc8-4f78ce7bf9cb7d22-01</a:t>
-            </a:r>
-          </a:p>
-        </p:txBody>
-      </p:sp>
+      <p:pic>
+        <p:nvPicPr>
+          <p:cNvPr id="1026" name="Picture 2" descr="Sample Trace">
+            <a:extLst>
+              <a:ext uri="{FF2B5EF4-FFF2-40B4-BE49-F238E27FC236}">
+                <a16:creationId xmlns:a16="http://schemas.microsoft.com/office/drawing/2014/main" id="{0B284022-9C02-EDE0-F230-D9BB26BCE4C1}"/>
+              </a:ext>
+            </a:extLst>
+          </p:cNvPr>
+          <p:cNvPicPr>
+            <a:picLocks noChangeAspect="1" noChangeArrowheads="1"/>
+          </p:cNvPicPr>
+          <p:nvPr/>
+        </p:nvPicPr>
+        <p:blipFill>
+          <a:blip r:embed="rId2">
+            <a:extLst>
+              <a:ext uri="{28A0092B-C50C-407E-A947-70E740481C1C}">
+                <a14:useLocalDpi xmlns:a14="http://schemas.microsoft.com/office/drawing/2010/main" val="0"/>
+              </a:ext>
+            </a:extLst>
+          </a:blip>
+          <a:srcRect/>
+          <a:stretch>
+            <a:fillRect/>
+          </a:stretch>
+        </p:blipFill>
+        <p:spPr bwMode="auto">
+          <a:xfrm>
+            <a:off x="760524" y="1871193"/>
+            <a:ext cx="10515600" cy="4673600"/>
+          </a:xfrm>
+          <a:prstGeom prst="rect">
+            <a:avLst/>
+          </a:prstGeom>
+          <a:noFill/>
+          <a:extLst>
+            <a:ext uri="{909E8E84-426E-40DD-AFC4-6F175D3DCCD1}">
+              <a14:hiddenFill xmlns:a14="http://schemas.microsoft.com/office/drawing/2010/main">
+                <a:solidFill>
+                  <a:srgbClr val="FFFFFF"/>
+                </a:solidFill>
+              </a14:hiddenFill>
+            </a:ext>
+          </a:extLst>
+        </p:spPr>
+      </p:pic>
     </p:spTree>
     <p:extLst>
       <p:ext uri="{BB962C8B-B14F-4D97-AF65-F5344CB8AC3E}">
-        <p14:creationId xmlns:p14="http://schemas.microsoft.com/office/powerpoint/2010/main" val="2071471505"/>
+        <p14:creationId xmlns:p14="http://schemas.microsoft.com/office/powerpoint/2010/main" val="3555601688"/>
       </p:ext>
     </p:extLst>
   </p:cSld>
@@ -3896,10 +3900,7 @@
               <a:rPr lang="en-US" dirty="0" err="1"/>
               <a:t>TraceContext</a:t>
             </a:r>
-            <a:r>
-              <a:rPr lang="en-US" dirty="0"/>
-              <a:t> contd.</a:t>
-            </a:r>
+            <a:endParaRPr lang="en-US" dirty="0"/>
           </a:p>
         </p:txBody>
       </p:sp>
@@ -3973,7 +3974,7 @@
           <p:cNvPr id="2" name="Title 1">
             <a:extLst>
               <a:ext uri="{FF2B5EF4-FFF2-40B4-BE49-F238E27FC236}">
-                <a16:creationId xmlns:a16="http://schemas.microsoft.com/office/drawing/2014/main" id="{7E66F3A5-A777-B1AF-24E4-DB86EE46F263}"/>
+                <a16:creationId xmlns:a16="http://schemas.microsoft.com/office/drawing/2014/main" id="{F5B35BAA-E861-A124-0F27-2BC180B47B78}"/>
               </a:ext>
             </a:extLst>
           </p:cNvPr>
@@ -3990,9 +3991,10 @@
           <a:lstStyle/>
           <a:p>
             <a:r>
-              <a:rPr lang="en-US" dirty="0"/>
-              <a:t>OTel with C#</a:t>
-            </a:r>
+              <a:rPr lang="en-US" dirty="0" err="1"/>
+              <a:t>TraceContext</a:t>
+            </a:r>
+            <a:endParaRPr lang="en-US" dirty="0"/>
           </a:p>
         </p:txBody>
       </p:sp>
@@ -4001,7 +4003,7 @@
           <p:cNvPr id="3" name="Content Placeholder 2">
             <a:extLst>
               <a:ext uri="{FF2B5EF4-FFF2-40B4-BE49-F238E27FC236}">
-                <a16:creationId xmlns:a16="http://schemas.microsoft.com/office/drawing/2014/main" id="{6BDDC28F-E410-C123-7AB8-3CBFB249933B}"/>
+                <a16:creationId xmlns:a16="http://schemas.microsoft.com/office/drawing/2014/main" id="{1D4DD0D4-8EA8-3477-13E5-6D429EC8BBAE}"/>
               </a:ext>
             </a:extLst>
           </p:cNvPr>
@@ -4019,26 +4021,35 @@
           <a:p>
             <a:r>
               <a:rPr lang="en-US" dirty="0"/>
-              <a:t>2 APIs</a:t>
+              <a:t>Passed around to track the parent Trace</a:t>
             </a:r>
           </a:p>
           <a:p>
             <a:pPr lvl="1"/>
             <a:r>
               <a:rPr lang="en-US" dirty="0"/>
-              <a:t>Because of course there are</a:t>
-            </a:r>
-          </a:p>
-          <a:p>
-            <a:r>
-              <a:rPr lang="en-US" dirty="0"/>
-              <a:t>Built in to .NET</a:t>
-            </a:r>
-          </a:p>
-          <a:p>
-            <a:r>
-              <a:rPr lang="en-US" dirty="0"/>
-              <a:t>OpenTelemetry community provided one</a:t>
+              <a:t>Sometimes automatic, sometimes manually</a:t>
+            </a:r>
+          </a:p>
+          <a:p>
+            <a:r>
+              <a:rPr lang="en-US" dirty="0"/>
+              <a:t>“</a:t>
+            </a:r>
+            <a:r>
+              <a:rPr lang="en-US" dirty="0" err="1"/>
+              <a:t>traceparent</a:t>
+            </a:r>
+            <a:r>
+              <a:rPr lang="en-US" dirty="0"/>
+              <a:t>” Header</a:t>
+            </a:r>
+          </a:p>
+          <a:p>
+            <a:pPr lvl="1"/>
+            <a:r>
+              <a:rPr lang="en-US" dirty="0"/>
+              <a:t>00-c9dafef5b02172ce9f19a70ee83e9fc8-4f78ce7bf9cb7d22-01</a:t>
             </a:r>
           </a:p>
         </p:txBody>
@@ -4046,7 +4057,7 @@
     </p:spTree>
     <p:extLst>
       <p:ext uri="{BB962C8B-B14F-4D97-AF65-F5344CB8AC3E}">
-        <p14:creationId xmlns:p14="http://schemas.microsoft.com/office/powerpoint/2010/main" val="1503568322"/>
+        <p14:creationId xmlns:p14="http://schemas.microsoft.com/office/powerpoint/2010/main" val="2071471505"/>
       </p:ext>
     </p:extLst>
   </p:cSld>
@@ -4078,7 +4089,7 @@
           <p:cNvPr id="2" name="Title 1">
             <a:extLst>
               <a:ext uri="{FF2B5EF4-FFF2-40B4-BE49-F238E27FC236}">
-                <a16:creationId xmlns:a16="http://schemas.microsoft.com/office/drawing/2014/main" id="{A9BB2B8B-22CC-AA43-82DC-410A70395B08}"/>
+                <a16:creationId xmlns:a16="http://schemas.microsoft.com/office/drawing/2014/main" id="{D8734B4D-931D-7F89-0A22-01CDE53D467E}"/>
               </a:ext>
             </a:extLst>
           </p:cNvPr>
@@ -4096,7 +4107,7 @@
           <a:p>
             <a:r>
               <a:rPr lang="en-US" dirty="0"/>
-              <a:t>Built-In API</a:t>
+              <a:t>Default Instrumenting</a:t>
             </a:r>
           </a:p>
         </p:txBody>
@@ -4106,7 +4117,7 @@
           <p:cNvPr id="3" name="Content Placeholder 2">
             <a:extLst>
               <a:ext uri="{FF2B5EF4-FFF2-40B4-BE49-F238E27FC236}">
-                <a16:creationId xmlns:a16="http://schemas.microsoft.com/office/drawing/2014/main" id="{B61DC13D-498B-0A24-389C-CAC2FA1D143D}"/>
+                <a16:creationId xmlns:a16="http://schemas.microsoft.com/office/drawing/2014/main" id="{D43F6500-33D8-8737-522C-6F6BE46F0E34}"/>
               </a:ext>
             </a:extLst>
           </p:cNvPr>
@@ -4123,8 +4134,29 @@
           <a:lstStyle/>
           <a:p>
             <a:r>
+              <a:rPr lang="en-US" dirty="0"/>
+              <a:t>Libraries exist to instrument certain actions</a:t>
+            </a:r>
+          </a:p>
+          <a:p>
+            <a:pPr lvl="1"/>
+            <a:r>
+              <a:rPr lang="en-US" dirty="0"/>
+              <a:t>Database Calls</a:t>
+            </a:r>
+          </a:p>
+          <a:p>
+            <a:pPr lvl="1"/>
+            <a:r>
+              <a:rPr lang="en-US" dirty="0"/>
+              <a:t>HTTP Calls</a:t>
+            </a:r>
+          </a:p>
+          <a:p>
+            <a:pPr lvl="1"/>
+            <a:r>
               <a:rPr lang="en-US" dirty="0" err="1"/>
-              <a:t>ActivitySource</a:t>
+              <a:t>etc</a:t>
             </a:r>
             <a:endParaRPr lang="en-US" dirty="0"/>
           </a:p>
@@ -4133,7 +4165,7 @@
     </p:spTree>
     <p:extLst>
       <p:ext uri="{BB962C8B-B14F-4D97-AF65-F5344CB8AC3E}">
-        <p14:creationId xmlns:p14="http://schemas.microsoft.com/office/powerpoint/2010/main" val="2104434691"/>
+        <p14:creationId xmlns:p14="http://schemas.microsoft.com/office/powerpoint/2010/main" val="2058689112"/>
       </p:ext>
     </p:extLst>
   </p:cSld>
@@ -4165,6 +4197,198 @@
           <p:cNvPr id="2" name="Title 1">
             <a:extLst>
               <a:ext uri="{FF2B5EF4-FFF2-40B4-BE49-F238E27FC236}">
+                <a16:creationId xmlns:a16="http://schemas.microsoft.com/office/drawing/2014/main" id="{7E66F3A5-A777-B1AF-24E4-DB86EE46F263}"/>
+              </a:ext>
+            </a:extLst>
+          </p:cNvPr>
+          <p:cNvSpPr>
+            <a:spLocks noGrp="1"/>
+          </p:cNvSpPr>
+          <p:nvPr>
+            <p:ph type="title"/>
+          </p:nvPr>
+        </p:nvSpPr>
+        <p:spPr/>
+        <p:txBody>
+          <a:bodyPr/>
+          <a:lstStyle/>
+          <a:p>
+            <a:r>
+              <a:rPr lang="en-US" dirty="0"/>
+              <a:t>OTel with C#</a:t>
+            </a:r>
+          </a:p>
+        </p:txBody>
+      </p:sp>
+      <p:sp>
+        <p:nvSpPr>
+          <p:cNvPr id="3" name="Content Placeholder 2">
+            <a:extLst>
+              <a:ext uri="{FF2B5EF4-FFF2-40B4-BE49-F238E27FC236}">
+                <a16:creationId xmlns:a16="http://schemas.microsoft.com/office/drawing/2014/main" id="{6BDDC28F-E410-C123-7AB8-3CBFB249933B}"/>
+              </a:ext>
+            </a:extLst>
+          </p:cNvPr>
+          <p:cNvSpPr>
+            <a:spLocks noGrp="1"/>
+          </p:cNvSpPr>
+          <p:nvPr>
+            <p:ph idx="1"/>
+          </p:nvPr>
+        </p:nvSpPr>
+        <p:spPr/>
+        <p:txBody>
+          <a:bodyPr/>
+          <a:lstStyle/>
+          <a:p>
+            <a:r>
+              <a:rPr lang="en-US" dirty="0"/>
+              <a:t>2 APIs</a:t>
+            </a:r>
+          </a:p>
+          <a:p>
+            <a:pPr lvl="1"/>
+            <a:r>
+              <a:rPr lang="en-US" dirty="0"/>
+              <a:t>Because of course there are</a:t>
+            </a:r>
+          </a:p>
+          <a:p>
+            <a:r>
+              <a:rPr lang="en-US" dirty="0"/>
+              <a:t>Built in to .NET</a:t>
+            </a:r>
+          </a:p>
+          <a:p>
+            <a:r>
+              <a:rPr lang="en-US" dirty="0"/>
+              <a:t>OpenTelemetry community provided one</a:t>
+            </a:r>
+          </a:p>
+        </p:txBody>
+      </p:sp>
+    </p:spTree>
+    <p:extLst>
+      <p:ext uri="{BB962C8B-B14F-4D97-AF65-F5344CB8AC3E}">
+        <p14:creationId xmlns:p14="http://schemas.microsoft.com/office/powerpoint/2010/main" val="1503568322"/>
+      </p:ext>
+    </p:extLst>
+  </p:cSld>
+  <p:clrMapOvr>
+    <a:masterClrMapping/>
+  </p:clrMapOvr>
+</p:sld>
+</file>
+
+<file path=ppt/slides/slide17.xml><?xml version="1.0" encoding="utf-8"?>
+<p:sld xmlns:a="http://schemas.openxmlformats.org/drawingml/2006/main" xmlns:r="http://schemas.openxmlformats.org/officeDocument/2006/relationships" xmlns:p="http://schemas.openxmlformats.org/presentationml/2006/main">
+  <p:cSld>
+    <p:spTree>
+      <p:nvGrpSpPr>
+        <p:cNvPr id="1" name=""/>
+        <p:cNvGrpSpPr/>
+        <p:nvPr/>
+      </p:nvGrpSpPr>
+      <p:grpSpPr>
+        <a:xfrm>
+          <a:off x="0" y="0"/>
+          <a:ext cx="0" cy="0"/>
+          <a:chOff x="0" y="0"/>
+          <a:chExt cx="0" cy="0"/>
+        </a:xfrm>
+      </p:grpSpPr>
+      <p:sp>
+        <p:nvSpPr>
+          <p:cNvPr id="2" name="Title 1">
+            <a:extLst>
+              <a:ext uri="{FF2B5EF4-FFF2-40B4-BE49-F238E27FC236}">
+                <a16:creationId xmlns:a16="http://schemas.microsoft.com/office/drawing/2014/main" id="{A9BB2B8B-22CC-AA43-82DC-410A70395B08}"/>
+              </a:ext>
+            </a:extLst>
+          </p:cNvPr>
+          <p:cNvSpPr>
+            <a:spLocks noGrp="1"/>
+          </p:cNvSpPr>
+          <p:nvPr>
+            <p:ph type="title"/>
+          </p:nvPr>
+        </p:nvSpPr>
+        <p:spPr/>
+        <p:txBody>
+          <a:bodyPr/>
+          <a:lstStyle/>
+          <a:p>
+            <a:r>
+              <a:rPr lang="en-US" dirty="0"/>
+              <a:t>Built-In API</a:t>
+            </a:r>
+          </a:p>
+        </p:txBody>
+      </p:sp>
+      <p:sp>
+        <p:nvSpPr>
+          <p:cNvPr id="3" name="Content Placeholder 2">
+            <a:extLst>
+              <a:ext uri="{FF2B5EF4-FFF2-40B4-BE49-F238E27FC236}">
+                <a16:creationId xmlns:a16="http://schemas.microsoft.com/office/drawing/2014/main" id="{B61DC13D-498B-0A24-389C-CAC2FA1D143D}"/>
+              </a:ext>
+            </a:extLst>
+          </p:cNvPr>
+          <p:cNvSpPr>
+            <a:spLocks noGrp="1"/>
+          </p:cNvSpPr>
+          <p:nvPr>
+            <p:ph idx="1"/>
+          </p:nvPr>
+        </p:nvSpPr>
+        <p:spPr/>
+        <p:txBody>
+          <a:bodyPr/>
+          <a:lstStyle/>
+          <a:p>
+            <a:r>
+              <a:rPr lang="en-US" dirty="0" err="1"/>
+              <a:t>ActivitySource</a:t>
+            </a:r>
+            <a:endParaRPr lang="en-US" dirty="0"/>
+          </a:p>
+        </p:txBody>
+      </p:sp>
+    </p:spTree>
+    <p:extLst>
+      <p:ext uri="{BB962C8B-B14F-4D97-AF65-F5344CB8AC3E}">
+        <p14:creationId xmlns:p14="http://schemas.microsoft.com/office/powerpoint/2010/main" val="2104434691"/>
+      </p:ext>
+    </p:extLst>
+  </p:cSld>
+  <p:clrMapOvr>
+    <a:masterClrMapping/>
+  </p:clrMapOvr>
+</p:sld>
+</file>
+
+<file path=ppt/slides/slide18.xml><?xml version="1.0" encoding="utf-8"?>
+<p:sld xmlns:a="http://schemas.openxmlformats.org/drawingml/2006/main" xmlns:r="http://schemas.openxmlformats.org/officeDocument/2006/relationships" xmlns:p="http://schemas.openxmlformats.org/presentationml/2006/main">
+  <p:cSld>
+    <p:spTree>
+      <p:nvGrpSpPr>
+        <p:cNvPr id="1" name=""/>
+        <p:cNvGrpSpPr/>
+        <p:nvPr/>
+      </p:nvGrpSpPr>
+      <p:grpSpPr>
+        <a:xfrm>
+          <a:off x="0" y="0"/>
+          <a:ext cx="0" cy="0"/>
+          <a:chOff x="0" y="0"/>
+          <a:chExt cx="0" cy="0"/>
+        </a:xfrm>
+      </p:grpSpPr>
+      <p:sp>
+        <p:nvSpPr>
+          <p:cNvPr id="2" name="Title 1">
+            <a:extLst>
+              <a:ext uri="{FF2B5EF4-FFF2-40B4-BE49-F238E27FC236}">
                 <a16:creationId xmlns:a16="http://schemas.microsoft.com/office/drawing/2014/main" id="{E14EAEB5-D3D9-4211-1464-A24898D333E8}"/>
               </a:ext>
             </a:extLst>
@@ -4226,6 +4450,112 @@
     <p:extLst>
       <p:ext uri="{BB962C8B-B14F-4D97-AF65-F5344CB8AC3E}">
         <p14:creationId xmlns:p14="http://schemas.microsoft.com/office/powerpoint/2010/main" val="2924318733"/>
+      </p:ext>
+    </p:extLst>
+  </p:cSld>
+  <p:clrMapOvr>
+    <a:masterClrMapping/>
+  </p:clrMapOvr>
+</p:sld>
+</file>
+
+<file path=ppt/slides/slide19.xml><?xml version="1.0" encoding="utf-8"?>
+<p:sld xmlns:a="http://schemas.openxmlformats.org/drawingml/2006/main" xmlns:r="http://schemas.openxmlformats.org/officeDocument/2006/relationships" xmlns:p="http://schemas.openxmlformats.org/presentationml/2006/main">
+  <p:cSld>
+    <p:spTree>
+      <p:nvGrpSpPr>
+        <p:cNvPr id="1" name=""/>
+        <p:cNvGrpSpPr/>
+        <p:nvPr/>
+      </p:nvGrpSpPr>
+      <p:grpSpPr>
+        <a:xfrm>
+          <a:off x="0" y="0"/>
+          <a:ext cx="0" cy="0"/>
+          <a:chOff x="0" y="0"/>
+          <a:chExt cx="0" cy="0"/>
+        </a:xfrm>
+      </p:grpSpPr>
+      <p:sp>
+        <p:nvSpPr>
+          <p:cNvPr id="2" name="Title 1">
+            <a:extLst>
+              <a:ext uri="{FF2B5EF4-FFF2-40B4-BE49-F238E27FC236}">
+                <a16:creationId xmlns:a16="http://schemas.microsoft.com/office/drawing/2014/main" id="{6BDA9CE8-27C2-9C98-540A-61891CA12F74}"/>
+              </a:ext>
+            </a:extLst>
+          </p:cNvPr>
+          <p:cNvSpPr>
+            <a:spLocks noGrp="1"/>
+          </p:cNvSpPr>
+          <p:nvPr>
+            <p:ph type="title"/>
+          </p:nvPr>
+        </p:nvSpPr>
+        <p:spPr/>
+        <p:txBody>
+          <a:bodyPr/>
+          <a:lstStyle/>
+          <a:p>
+            <a:r>
+              <a:rPr lang="en-US" dirty="0"/>
+              <a:t>Demo App</a:t>
+            </a:r>
+          </a:p>
+        </p:txBody>
+      </p:sp>
+      <p:sp>
+        <p:nvSpPr>
+          <p:cNvPr id="3" name="Content Placeholder 2">
+            <a:extLst>
+              <a:ext uri="{FF2B5EF4-FFF2-40B4-BE49-F238E27FC236}">
+                <a16:creationId xmlns:a16="http://schemas.microsoft.com/office/drawing/2014/main" id="{3D7BB622-EF8F-5593-10D8-7444B787FA3C}"/>
+              </a:ext>
+            </a:extLst>
+          </p:cNvPr>
+          <p:cNvSpPr>
+            <a:spLocks noGrp="1"/>
+          </p:cNvSpPr>
+          <p:nvPr>
+            <p:ph idx="1"/>
+          </p:nvPr>
+        </p:nvSpPr>
+        <p:spPr/>
+        <p:txBody>
+          <a:bodyPr/>
+          <a:lstStyle/>
+          <a:p>
+            <a:r>
+              <a:rPr lang="en-US" dirty="0"/>
+              <a:t>2 micro services</a:t>
+            </a:r>
+          </a:p>
+          <a:p>
+            <a:pPr lvl="1"/>
+            <a:r>
+              <a:rPr lang="en-US" dirty="0"/>
+              <a:t>Users</a:t>
+            </a:r>
+          </a:p>
+          <a:p>
+            <a:pPr lvl="1"/>
+            <a:r>
+              <a:rPr lang="en-US" dirty="0"/>
+              <a:t>Products/Purchases</a:t>
+            </a:r>
+          </a:p>
+          <a:p>
+            <a:r>
+              <a:rPr lang="en-US" dirty="0"/>
+              <a:t>Communicate with each other using HTTP REST calls</a:t>
+            </a:r>
+          </a:p>
+        </p:txBody>
+      </p:sp>
+    </p:spTree>
+    <p:extLst>
+      <p:ext uri="{BB962C8B-B14F-4D97-AF65-F5344CB8AC3E}">
+        <p14:creationId xmlns:p14="http://schemas.microsoft.com/office/powerpoint/2010/main" val="521004899"/>
       </p:ext>
     </p:extLst>
   </p:cSld>
@@ -4344,6 +4674,208 @@
     <p:extLst>
       <p:ext uri="{BB962C8B-B14F-4D97-AF65-F5344CB8AC3E}">
         <p14:creationId xmlns:p14="http://schemas.microsoft.com/office/powerpoint/2010/main" val="1364794253"/>
+      </p:ext>
+    </p:extLst>
+  </p:cSld>
+  <p:clrMapOvr>
+    <a:masterClrMapping/>
+  </p:clrMapOvr>
+</p:sld>
+</file>
+
+<file path=ppt/slides/slide20.xml><?xml version="1.0" encoding="utf-8"?>
+<p:sld xmlns:a="http://schemas.openxmlformats.org/drawingml/2006/main" xmlns:r="http://schemas.openxmlformats.org/officeDocument/2006/relationships" xmlns:p="http://schemas.openxmlformats.org/presentationml/2006/main">
+  <p:cSld>
+    <p:spTree>
+      <p:nvGrpSpPr>
+        <p:cNvPr id="1" name=""/>
+        <p:cNvGrpSpPr/>
+        <p:nvPr/>
+      </p:nvGrpSpPr>
+      <p:grpSpPr>
+        <a:xfrm>
+          <a:off x="0" y="0"/>
+          <a:ext cx="0" cy="0"/>
+          <a:chOff x="0" y="0"/>
+          <a:chExt cx="0" cy="0"/>
+        </a:xfrm>
+      </p:grpSpPr>
+      <p:sp>
+        <p:nvSpPr>
+          <p:cNvPr id="2" name="Title 1">
+            <a:extLst>
+              <a:ext uri="{FF2B5EF4-FFF2-40B4-BE49-F238E27FC236}">
+                <a16:creationId xmlns:a16="http://schemas.microsoft.com/office/drawing/2014/main" id="{1B34032A-7733-FF48-0ED1-FE488BD4E2DD}"/>
+              </a:ext>
+            </a:extLst>
+          </p:cNvPr>
+          <p:cNvSpPr>
+            <a:spLocks noGrp="1"/>
+          </p:cNvSpPr>
+          <p:nvPr>
+            <p:ph type="title"/>
+          </p:nvPr>
+        </p:nvSpPr>
+        <p:spPr/>
+        <p:txBody>
+          <a:bodyPr/>
+          <a:lstStyle/>
+          <a:p>
+            <a:r>
+              <a:rPr lang="en-US" dirty="0" err="1"/>
+              <a:t>Otel</a:t>
+            </a:r>
+            <a:r>
+              <a:rPr lang="en-US" dirty="0"/>
+              <a:t> Log Records</a:t>
+            </a:r>
+          </a:p>
+        </p:txBody>
+      </p:sp>
+      <p:sp>
+        <p:nvSpPr>
+          <p:cNvPr id="3" name="Content Placeholder 2">
+            <a:extLst>
+              <a:ext uri="{FF2B5EF4-FFF2-40B4-BE49-F238E27FC236}">
+                <a16:creationId xmlns:a16="http://schemas.microsoft.com/office/drawing/2014/main" id="{507F062A-301B-C6D5-4319-54B039F74FF0}"/>
+              </a:ext>
+            </a:extLst>
+          </p:cNvPr>
+          <p:cNvSpPr>
+            <a:spLocks noGrp="1"/>
+          </p:cNvSpPr>
+          <p:nvPr>
+            <p:ph idx="1"/>
+          </p:nvPr>
+        </p:nvSpPr>
+        <p:spPr/>
+        <p:txBody>
+          <a:bodyPr/>
+          <a:lstStyle/>
+          <a:p>
+            <a:r>
+              <a:rPr lang="en-US" dirty="0"/>
+              <a:t>Standalone Logs</a:t>
+            </a:r>
+          </a:p>
+          <a:p>
+            <a:pPr lvl="1"/>
+            <a:r>
+              <a:rPr lang="en-US" dirty="0"/>
+              <a:t>A Span with an Event, no link to other Spans</a:t>
+            </a:r>
+          </a:p>
+          <a:p>
+            <a:r>
+              <a:rPr lang="en-US" dirty="0"/>
+              <a:t>Embedded Logs</a:t>
+            </a:r>
+          </a:p>
+          <a:p>
+            <a:pPr lvl="1"/>
+            <a:r>
+              <a:rPr lang="en-US" dirty="0"/>
+              <a:t>An Event in a Span</a:t>
+            </a:r>
+          </a:p>
+        </p:txBody>
+      </p:sp>
+    </p:spTree>
+    <p:extLst>
+      <p:ext uri="{BB962C8B-B14F-4D97-AF65-F5344CB8AC3E}">
+        <p14:creationId xmlns:p14="http://schemas.microsoft.com/office/powerpoint/2010/main" val="2314078779"/>
+      </p:ext>
+    </p:extLst>
+  </p:cSld>
+  <p:clrMapOvr>
+    <a:masterClrMapping/>
+  </p:clrMapOvr>
+</p:sld>
+</file>
+
+<file path=ppt/slides/slide21.xml><?xml version="1.0" encoding="utf-8"?>
+<p:sld xmlns:a="http://schemas.openxmlformats.org/drawingml/2006/main" xmlns:r="http://schemas.openxmlformats.org/officeDocument/2006/relationships" xmlns:p="http://schemas.openxmlformats.org/presentationml/2006/main">
+  <p:cSld>
+    <p:spTree>
+      <p:nvGrpSpPr>
+        <p:cNvPr id="1" name=""/>
+        <p:cNvGrpSpPr/>
+        <p:nvPr/>
+      </p:nvGrpSpPr>
+      <p:grpSpPr>
+        <a:xfrm>
+          <a:off x="0" y="0"/>
+          <a:ext cx="0" cy="0"/>
+          <a:chOff x="0" y="0"/>
+          <a:chExt cx="0" cy="0"/>
+        </a:xfrm>
+      </p:grpSpPr>
+      <p:sp>
+        <p:nvSpPr>
+          <p:cNvPr id="2" name="Title 1">
+            <a:extLst>
+              <a:ext uri="{FF2B5EF4-FFF2-40B4-BE49-F238E27FC236}">
+                <a16:creationId xmlns:a16="http://schemas.microsoft.com/office/drawing/2014/main" id="{30CDEC62-F813-8701-D46F-1AAB8648F923}"/>
+              </a:ext>
+            </a:extLst>
+          </p:cNvPr>
+          <p:cNvSpPr>
+            <a:spLocks noGrp="1"/>
+          </p:cNvSpPr>
+          <p:nvPr>
+            <p:ph type="title"/>
+          </p:nvPr>
+        </p:nvSpPr>
+        <p:spPr/>
+        <p:txBody>
+          <a:bodyPr/>
+          <a:lstStyle/>
+          <a:p>
+            <a:r>
+              <a:rPr lang="en-US" dirty="0"/>
+              <a:t>OTel on the Client</a:t>
+            </a:r>
+          </a:p>
+        </p:txBody>
+      </p:sp>
+      <p:sp>
+        <p:nvSpPr>
+          <p:cNvPr id="3" name="Content Placeholder 2">
+            <a:extLst>
+              <a:ext uri="{FF2B5EF4-FFF2-40B4-BE49-F238E27FC236}">
+                <a16:creationId xmlns:a16="http://schemas.microsoft.com/office/drawing/2014/main" id="{536E466F-40DE-F40F-478D-6323D85E30A0}"/>
+              </a:ext>
+            </a:extLst>
+          </p:cNvPr>
+          <p:cNvSpPr>
+            <a:spLocks noGrp="1"/>
+          </p:cNvSpPr>
+          <p:nvPr>
+            <p:ph idx="1"/>
+          </p:nvPr>
+        </p:nvSpPr>
+        <p:spPr/>
+        <p:txBody>
+          <a:bodyPr/>
+          <a:lstStyle/>
+          <a:p>
+            <a:r>
+              <a:rPr lang="en-US" dirty="0"/>
+              <a:t>Possible, but difficult</a:t>
+            </a:r>
+          </a:p>
+          <a:p>
+            <a:r>
+              <a:rPr lang="en-US" dirty="0"/>
+              <a:t>Where do you start the trace?</a:t>
+            </a:r>
+          </a:p>
+        </p:txBody>
+      </p:sp>
+    </p:spTree>
+    <p:extLst>
+      <p:ext uri="{BB962C8B-B14F-4D97-AF65-F5344CB8AC3E}">
+        <p14:creationId xmlns:p14="http://schemas.microsoft.com/office/powerpoint/2010/main" val="466515078"/>
       </p:ext>
     </p:extLst>
   </p:cSld>
@@ -4512,7 +5044,7 @@
           <a:p>
             <a:r>
               <a:rPr lang="en-US" dirty="0"/>
-              <a:t>Level Setting – What existed before OTel</a:t>
+              <a:t>Level Setting – Logs</a:t>
             </a:r>
           </a:p>
         </p:txBody>
@@ -4616,7 +5148,7 @@
           <a:p>
             <a:r>
               <a:rPr lang="en-US" dirty="0"/>
-              <a:t>Cont. – What existed before OTel</a:t>
+              <a:t>Logs in 2023</a:t>
             </a:r>
           </a:p>
         </p:txBody>
@@ -4801,7 +5333,7 @@
           <a:p>
             <a:r>
               <a:rPr lang="en-US" dirty="0"/>
-              <a:t>Data in files is hard to sift through</a:t>
+              <a:t>Data in files is hard to sift through without specialized tools</a:t>
             </a:r>
           </a:p>
           <a:p>
@@ -4946,6 +5478,32 @@
             <a:endParaRPr lang="en-US" dirty="0"/>
           </a:p>
           <a:p>
+            <a:r>
+              <a:rPr lang="en-US" dirty="0"/>
+              <a:t>Developers (you)</a:t>
+            </a:r>
+          </a:p>
+          <a:p>
+            <a:pPr lvl="1"/>
+            <a:r>
+              <a:rPr lang="en-US" dirty="0"/>
+              <a:t>Use OTel to trace info about your code</a:t>
+            </a:r>
+          </a:p>
+          <a:p>
+            <a:r>
+              <a:rPr lang="en-US" dirty="0"/>
+              <a:t>Providers (companies)</a:t>
+            </a:r>
+          </a:p>
+          <a:p>
+            <a:pPr lvl="1"/>
+            <a:r>
+              <a:rPr lang="en-US" dirty="0"/>
+              <a:t>Receive this data</a:t>
+            </a:r>
+          </a:p>
+          <a:p>
             <a:endParaRPr lang="en-US" dirty="0"/>
           </a:p>
           <a:p>
@@ -5039,7 +5597,10 @@
           </a:p>
           <a:p>
             <a:pPr lvl="1"/>
-            <a:endParaRPr lang="en-US" dirty="0"/>
+            <a:r>
+              <a:rPr lang="en-US" dirty="0"/>
+              <a:t>Info for each request</a:t>
+            </a:r>
           </a:p>
           <a:p>
             <a:r>

</xml_diff>

<commit_message>
Cleaned up the code a bit for the demo
</commit_message>
<xml_diff>
--- a/2023-03 - Orlando Code Camp - OpenTelemetry/Presentation.pptx
+++ b/2023-03 - Orlando Code Camp - OpenTelemetry/Presentation.pptx
@@ -6,13 +6,13 @@
   </p:sldMasterIdLst>
   <p:sldIdLst>
     <p:sldId id="256" r:id="rId2"/>
-    <p:sldId id="264" r:id="rId3"/>
-    <p:sldId id="270" r:id="rId4"/>
-    <p:sldId id="261" r:id="rId5"/>
-    <p:sldId id="263" r:id="rId6"/>
-    <p:sldId id="262" r:id="rId7"/>
-    <p:sldId id="277" r:id="rId8"/>
-    <p:sldId id="257" r:id="rId9"/>
+    <p:sldId id="270" r:id="rId3"/>
+    <p:sldId id="261" r:id="rId4"/>
+    <p:sldId id="263" r:id="rId5"/>
+    <p:sldId id="262" r:id="rId6"/>
+    <p:sldId id="277" r:id="rId7"/>
+    <p:sldId id="257" r:id="rId8"/>
+    <p:sldId id="279" r:id="rId9"/>
     <p:sldId id="258" r:id="rId10"/>
     <p:sldId id="259" r:id="rId11"/>
     <p:sldId id="260" r:id="rId12"/>
@@ -281,7 +281,7 @@
           <a:p>
             <a:fld id="{CDF7C942-0668-44C8-8004-BBD737B759C0}" type="datetimeFigureOut">
               <a:rPr lang="en-US" smtClean="0"/>
-              <a:t>3/21/2023</a:t>
+              <a:t>3/23/2023</a:t>
             </a:fld>
             <a:endParaRPr lang="en-US"/>
           </a:p>
@@ -479,7 +479,7 @@
           <a:p>
             <a:fld id="{CDF7C942-0668-44C8-8004-BBD737B759C0}" type="datetimeFigureOut">
               <a:rPr lang="en-US" smtClean="0"/>
-              <a:t>3/21/2023</a:t>
+              <a:t>3/23/2023</a:t>
             </a:fld>
             <a:endParaRPr lang="en-US"/>
           </a:p>
@@ -687,7 +687,7 @@
           <a:p>
             <a:fld id="{CDF7C942-0668-44C8-8004-BBD737B759C0}" type="datetimeFigureOut">
               <a:rPr lang="en-US" smtClean="0"/>
-              <a:t>3/21/2023</a:t>
+              <a:t>3/23/2023</a:t>
             </a:fld>
             <a:endParaRPr lang="en-US"/>
           </a:p>
@@ -885,7 +885,7 @@
           <a:p>
             <a:fld id="{CDF7C942-0668-44C8-8004-BBD737B759C0}" type="datetimeFigureOut">
               <a:rPr lang="en-US" smtClean="0"/>
-              <a:t>3/21/2023</a:t>
+              <a:t>3/23/2023</a:t>
             </a:fld>
             <a:endParaRPr lang="en-US"/>
           </a:p>
@@ -1160,7 +1160,7 @@
           <a:p>
             <a:fld id="{CDF7C942-0668-44C8-8004-BBD737B759C0}" type="datetimeFigureOut">
               <a:rPr lang="en-US" smtClean="0"/>
-              <a:t>3/21/2023</a:t>
+              <a:t>3/23/2023</a:t>
             </a:fld>
             <a:endParaRPr lang="en-US"/>
           </a:p>
@@ -1425,7 +1425,7 @@
           <a:p>
             <a:fld id="{CDF7C942-0668-44C8-8004-BBD737B759C0}" type="datetimeFigureOut">
               <a:rPr lang="en-US" smtClean="0"/>
-              <a:t>3/21/2023</a:t>
+              <a:t>3/23/2023</a:t>
             </a:fld>
             <a:endParaRPr lang="en-US"/>
           </a:p>
@@ -1837,7 +1837,7 @@
           <a:p>
             <a:fld id="{CDF7C942-0668-44C8-8004-BBD737B759C0}" type="datetimeFigureOut">
               <a:rPr lang="en-US" smtClean="0"/>
-              <a:t>3/21/2023</a:t>
+              <a:t>3/23/2023</a:t>
             </a:fld>
             <a:endParaRPr lang="en-US"/>
           </a:p>
@@ -1978,7 +1978,7 @@
           <a:p>
             <a:fld id="{CDF7C942-0668-44C8-8004-BBD737B759C0}" type="datetimeFigureOut">
               <a:rPr lang="en-US" smtClean="0"/>
-              <a:t>3/21/2023</a:t>
+              <a:t>3/23/2023</a:t>
             </a:fld>
             <a:endParaRPr lang="en-US"/>
           </a:p>
@@ -2091,7 +2091,7 @@
           <a:p>
             <a:fld id="{CDF7C942-0668-44C8-8004-BBD737B759C0}" type="datetimeFigureOut">
               <a:rPr lang="en-US" smtClean="0"/>
-              <a:t>3/21/2023</a:t>
+              <a:t>3/23/2023</a:t>
             </a:fld>
             <a:endParaRPr lang="en-US"/>
           </a:p>
@@ -2402,7 +2402,7 @@
           <a:p>
             <a:fld id="{CDF7C942-0668-44C8-8004-BBD737B759C0}" type="datetimeFigureOut">
               <a:rPr lang="en-US" smtClean="0"/>
-              <a:t>3/21/2023</a:t>
+              <a:t>3/23/2023</a:t>
             </a:fld>
             <a:endParaRPr lang="en-US"/>
           </a:p>
@@ -2690,7 +2690,7 @@
           <a:p>
             <a:fld id="{CDF7C942-0668-44C8-8004-BBD737B759C0}" type="datetimeFigureOut">
               <a:rPr lang="en-US" smtClean="0"/>
-              <a:t>3/21/2023</a:t>
+              <a:t>3/23/2023</a:t>
             </a:fld>
             <a:endParaRPr lang="en-US"/>
           </a:p>
@@ -2931,7 +2931,7 @@
           <a:p>
             <a:fld id="{CDF7C942-0668-44C8-8004-BBD737B759C0}" type="datetimeFigureOut">
               <a:rPr lang="en-US" smtClean="0"/>
-              <a:t>3/21/2023</a:t>
+              <a:t>3/23/2023</a:t>
             </a:fld>
             <a:endParaRPr lang="en-US"/>
           </a:p>
@@ -4436,32 +4436,8 @@
           <a:p>
             <a:r>
               <a:rPr lang="en-US" dirty="0"/>
-              <a:t>Built-In API</a:t>
-            </a:r>
-          </a:p>
-        </p:txBody>
-      </p:sp>
-      <p:sp>
-        <p:nvSpPr>
-          <p:cNvPr id="3" name="Content Placeholder 2">
-            <a:extLst>
-              <a:ext uri="{FF2B5EF4-FFF2-40B4-BE49-F238E27FC236}">
-                <a16:creationId xmlns:a16="http://schemas.microsoft.com/office/drawing/2014/main" id="{B61DC13D-498B-0A24-389C-CAC2FA1D143D}"/>
-              </a:ext>
-            </a:extLst>
-          </p:cNvPr>
-          <p:cNvSpPr>
-            <a:spLocks noGrp="1"/>
-          </p:cNvSpPr>
-          <p:nvPr>
-            <p:ph idx="1"/>
-          </p:nvPr>
-        </p:nvSpPr>
-        <p:spPr/>
-        <p:txBody>
-          <a:bodyPr/>
-          <a:lstStyle/>
-          <a:p>
+              <a:t>Built-In API - </a:t>
+            </a:r>
             <a:r>
               <a:rPr lang="en-US" dirty="0" err="1"/>
               <a:t>ActivitySource</a:t>
@@ -4492,8 +4468,8 @@
         </p:blipFill>
         <p:spPr>
           <a:xfrm>
-            <a:off x="838200" y="2474740"/>
-            <a:ext cx="9516803" cy="752580"/>
+            <a:off x="838200" y="1690687"/>
+            <a:ext cx="11090430" cy="877021"/>
           </a:xfrm>
           <a:prstGeom prst="rect">
             <a:avLst/>
@@ -4502,10 +4478,10 @@
       </p:pic>
       <p:pic>
         <p:nvPicPr>
-          <p:cNvPr id="7" name="Picture 6">
-            <a:extLst>
-              <a:ext uri="{FF2B5EF4-FFF2-40B4-BE49-F238E27FC236}">
-                <a16:creationId xmlns:a16="http://schemas.microsoft.com/office/drawing/2014/main" id="{F293B86B-8B5E-CA23-C2F8-05F766872E52}"/>
+          <p:cNvPr id="6" name="Picture 5">
+            <a:extLst>
+              <a:ext uri="{FF2B5EF4-FFF2-40B4-BE49-F238E27FC236}">
+                <a16:creationId xmlns:a16="http://schemas.microsoft.com/office/drawing/2014/main" id="{4DEC4A0F-5242-57CA-62F1-E175D4949D40}"/>
               </a:ext>
             </a:extLst>
           </p:cNvPr>
@@ -4522,8 +4498,8 @@
         </p:blipFill>
         <p:spPr>
           <a:xfrm>
-            <a:off x="838200" y="4139897"/>
-            <a:ext cx="8049748" cy="2172003"/>
+            <a:off x="775215" y="3143718"/>
+            <a:ext cx="11091044" cy="2943046"/>
           </a:xfrm>
           <a:prstGeom prst="rect">
             <a:avLst/>
@@ -4583,51 +4559,17 @@
           <a:p>
             <a:r>
               <a:rPr lang="en-US" dirty="0"/>
-              <a:t>Community API</a:t>
-            </a:r>
-          </a:p>
-        </p:txBody>
-      </p:sp>
-      <p:sp>
-        <p:nvSpPr>
-          <p:cNvPr id="3" name="Content Placeholder 2">
-            <a:extLst>
-              <a:ext uri="{FF2B5EF4-FFF2-40B4-BE49-F238E27FC236}">
-                <a16:creationId xmlns:a16="http://schemas.microsoft.com/office/drawing/2014/main" id="{764B016F-1B5F-8DEE-0476-B87FF8974058}"/>
-              </a:ext>
-            </a:extLst>
-          </p:cNvPr>
-          <p:cNvSpPr>
-            <a:spLocks noGrp="1"/>
-          </p:cNvSpPr>
-          <p:nvPr>
-            <p:ph idx="1"/>
-          </p:nvPr>
-        </p:nvSpPr>
-        <p:spPr/>
-        <p:txBody>
-          <a:bodyPr/>
-          <a:lstStyle/>
-          <a:p>
-            <a:r>
-              <a:rPr lang="en-US" dirty="0"/>
-              <a:t>Trace object</a:t>
-            </a:r>
-          </a:p>
-          <a:p>
-            <a:r>
-              <a:rPr lang="en-US" dirty="0"/>
-              <a:t>Span Object</a:t>
+              <a:t>Community API – Trace and Span objects</a:t>
             </a:r>
           </a:p>
         </p:txBody>
       </p:sp>
       <p:pic>
         <p:nvPicPr>
-          <p:cNvPr id="5" name="Picture 4">
-            <a:extLst>
-              <a:ext uri="{FF2B5EF4-FFF2-40B4-BE49-F238E27FC236}">
-                <a16:creationId xmlns:a16="http://schemas.microsoft.com/office/drawing/2014/main" id="{74406B5C-7125-D920-C130-5235B557ED2F}"/>
+          <p:cNvPr id="6" name="Picture 5">
+            <a:extLst>
+              <a:ext uri="{FF2B5EF4-FFF2-40B4-BE49-F238E27FC236}">
+                <a16:creationId xmlns:a16="http://schemas.microsoft.com/office/drawing/2014/main" id="{500B92FE-9F0F-63F0-FE2B-C89BE1FF3707}"/>
               </a:ext>
             </a:extLst>
           </p:cNvPr>
@@ -4644,8 +4586,8 @@
         </p:blipFill>
         <p:spPr>
           <a:xfrm>
-            <a:off x="916294" y="3182030"/>
-            <a:ext cx="10437506" cy="1438502"/>
+            <a:off x="764309" y="2982953"/>
+            <a:ext cx="11160014" cy="1875374"/>
           </a:xfrm>
           <a:prstGeom prst="rect">
             <a:avLst/>
@@ -4687,7 +4629,7 @@
           <p:cNvPr id="2" name="Title 1">
             <a:extLst>
               <a:ext uri="{FF2B5EF4-FFF2-40B4-BE49-F238E27FC236}">
-                <a16:creationId xmlns:a16="http://schemas.microsoft.com/office/drawing/2014/main" id="{529AA271-9006-EEE5-25FA-09B86FD0CE1B}"/>
+                <a16:creationId xmlns:a16="http://schemas.microsoft.com/office/drawing/2014/main" id="{ACBA46CF-7E83-2FFA-3F7F-3129A9C3D9FA}"/>
               </a:ext>
             </a:extLst>
           </p:cNvPr>
@@ -4705,7 +4647,7 @@
           <a:p>
             <a:r>
               <a:rPr lang="en-US" dirty="0"/>
-              <a:t>Links</a:t>
+              <a:t>Quick Notes</a:t>
             </a:r>
           </a:p>
         </p:txBody>
@@ -4715,7 +4657,7 @@
           <p:cNvPr id="3" name="Content Placeholder 2">
             <a:extLst>
               <a:ext uri="{FF2B5EF4-FFF2-40B4-BE49-F238E27FC236}">
-                <a16:creationId xmlns:a16="http://schemas.microsoft.com/office/drawing/2014/main" id="{8359EA30-E929-2DE7-0FEA-4F54AA81D473}"/>
+                <a16:creationId xmlns:a16="http://schemas.microsoft.com/office/drawing/2014/main" id="{73CCB095-C4C2-5C2F-770D-A0696F8CA866}"/>
               </a:ext>
             </a:extLst>
           </p:cNvPr>
@@ -4752,20 +4694,40 @@
           <a:p>
             <a:r>
               <a:rPr lang="en-US" dirty="0"/>
-              <a:t>This Talk: </a:t>
+              <a:t>Who is this for? </a:t>
             </a:r>
           </a:p>
           <a:p>
             <a:pPr lvl="1"/>
             <a:r>
-              <a:rPr lang="en-US" dirty="0">
-                <a:hlinkClick r:id="rId3"/>
-              </a:rPr>
-              <a:t>https://github.com/ProgrammerAl/Presentations-2023/tree/main/2023-03%20-%20Orlando%20Code%20Camp%20-%20OpenTelemetry</a:t>
-            </a:r>
-            <a:r>
-              <a:rPr lang="en-US" dirty="0"/>
-              <a:t> </a:t>
+              <a:rPr lang="en-US" dirty="0"/>
+              <a:t>Developers</a:t>
+            </a:r>
+          </a:p>
+          <a:p>
+            <a:r>
+              <a:rPr lang="en-US" dirty="0"/>
+              <a:t>What language will we use?</a:t>
+            </a:r>
+          </a:p>
+          <a:p>
+            <a:pPr lvl="1"/>
+            <a:r>
+              <a:rPr lang="en-US" dirty="0"/>
+              <a:t>C#, but concepts apply globally</a:t>
+            </a:r>
+          </a:p>
+          <a:p>
+            <a:r>
+              <a:rPr lang="en-US" dirty="0"/>
+              <a:t>Should you stop using logs and go all in with OTel?</a:t>
+            </a:r>
+          </a:p>
+          <a:p>
+            <a:pPr lvl="1"/>
+            <a:r>
+              <a:rPr lang="en-US" dirty="0"/>
+              <a:t>No</a:t>
             </a:r>
           </a:p>
         </p:txBody>
@@ -4773,7 +4735,7 @@
     </p:spTree>
     <p:extLst>
       <p:ext uri="{BB962C8B-B14F-4D97-AF65-F5344CB8AC3E}">
-        <p14:creationId xmlns:p14="http://schemas.microsoft.com/office/powerpoint/2010/main" val="1364794253"/>
+        <p14:creationId xmlns:p14="http://schemas.microsoft.com/office/powerpoint/2010/main" val="3891600863"/>
       </p:ext>
     </p:extLst>
   </p:cSld>
@@ -5245,125 +5207,6 @@
           <p:cNvPr id="2" name="Title 1">
             <a:extLst>
               <a:ext uri="{FF2B5EF4-FFF2-40B4-BE49-F238E27FC236}">
-                <a16:creationId xmlns:a16="http://schemas.microsoft.com/office/drawing/2014/main" id="{ACBA46CF-7E83-2FFA-3F7F-3129A9C3D9FA}"/>
-              </a:ext>
-            </a:extLst>
-          </p:cNvPr>
-          <p:cNvSpPr>
-            <a:spLocks noGrp="1"/>
-          </p:cNvSpPr>
-          <p:nvPr>
-            <p:ph type="title"/>
-          </p:nvPr>
-        </p:nvSpPr>
-        <p:spPr/>
-        <p:txBody>
-          <a:bodyPr/>
-          <a:lstStyle/>
-          <a:p>
-            <a:r>
-              <a:rPr lang="en-US" dirty="0"/>
-              <a:t>Quick Notes</a:t>
-            </a:r>
-          </a:p>
-        </p:txBody>
-      </p:sp>
-      <p:sp>
-        <p:nvSpPr>
-          <p:cNvPr id="3" name="Content Placeholder 2">
-            <a:extLst>
-              <a:ext uri="{FF2B5EF4-FFF2-40B4-BE49-F238E27FC236}">
-                <a16:creationId xmlns:a16="http://schemas.microsoft.com/office/drawing/2014/main" id="{73CCB095-C4C2-5C2F-770D-A0696F8CA866}"/>
-              </a:ext>
-            </a:extLst>
-          </p:cNvPr>
-          <p:cNvSpPr>
-            <a:spLocks noGrp="1"/>
-          </p:cNvSpPr>
-          <p:nvPr>
-            <p:ph idx="1"/>
-          </p:nvPr>
-        </p:nvSpPr>
-        <p:spPr/>
-        <p:txBody>
-          <a:bodyPr/>
-          <a:lstStyle/>
-          <a:p>
-            <a:r>
-              <a:rPr lang="en-US" dirty="0"/>
-              <a:t>Who is this for? </a:t>
-            </a:r>
-          </a:p>
-          <a:p>
-            <a:pPr lvl="1"/>
-            <a:r>
-              <a:rPr lang="en-US" dirty="0"/>
-              <a:t>Developers</a:t>
-            </a:r>
-          </a:p>
-          <a:p>
-            <a:r>
-              <a:rPr lang="en-US" dirty="0"/>
-              <a:t>What language will we use?</a:t>
-            </a:r>
-          </a:p>
-          <a:p>
-            <a:pPr lvl="1"/>
-            <a:r>
-              <a:rPr lang="en-US" dirty="0"/>
-              <a:t>C#, but concepts apply globally</a:t>
-            </a:r>
-          </a:p>
-          <a:p>
-            <a:r>
-              <a:rPr lang="en-US" dirty="0"/>
-              <a:t>Should you stop using logs and go all in with OTel?</a:t>
-            </a:r>
-          </a:p>
-          <a:p>
-            <a:pPr lvl="1"/>
-            <a:r>
-              <a:rPr lang="en-US" dirty="0"/>
-              <a:t>No</a:t>
-            </a:r>
-          </a:p>
-        </p:txBody>
-      </p:sp>
-    </p:spTree>
-    <p:extLst>
-      <p:ext uri="{BB962C8B-B14F-4D97-AF65-F5344CB8AC3E}">
-        <p14:creationId xmlns:p14="http://schemas.microsoft.com/office/powerpoint/2010/main" val="3891600863"/>
-      </p:ext>
-    </p:extLst>
-  </p:cSld>
-  <p:clrMapOvr>
-    <a:masterClrMapping/>
-  </p:clrMapOvr>
-</p:sld>
-</file>
-
-<file path=ppt/slides/slide4.xml><?xml version="1.0" encoding="utf-8"?>
-<p:sld xmlns:a="http://schemas.openxmlformats.org/drawingml/2006/main" xmlns:r="http://schemas.openxmlformats.org/officeDocument/2006/relationships" xmlns:p="http://schemas.openxmlformats.org/presentationml/2006/main">
-  <p:cSld>
-    <p:spTree>
-      <p:nvGrpSpPr>
-        <p:cNvPr id="1" name=""/>
-        <p:cNvGrpSpPr/>
-        <p:nvPr/>
-      </p:nvGrpSpPr>
-      <p:grpSpPr>
-        <a:xfrm>
-          <a:off x="0" y="0"/>
-          <a:ext cx="0" cy="0"/>
-          <a:chOff x="0" y="0"/>
-          <a:chExt cx="0" cy="0"/>
-        </a:xfrm>
-      </p:grpSpPr>
-      <p:sp>
-        <p:nvSpPr>
-          <p:cNvPr id="2" name="Title 1">
-            <a:extLst>
-              <a:ext uri="{FF2B5EF4-FFF2-40B4-BE49-F238E27FC236}">
                 <a16:creationId xmlns:a16="http://schemas.microsoft.com/office/drawing/2014/main" id="{EDF53E10-2794-ADE5-8E75-D602C7FC4C68}"/>
               </a:ext>
             </a:extLst>
@@ -5446,7 +5289,7 @@
 </p:sld>
 </file>
 
-<file path=ppt/slides/slide5.xml><?xml version="1.0" encoding="utf-8"?>
+<file path=ppt/slides/slide4.xml><?xml version="1.0" encoding="utf-8"?>
 <p:sld xmlns:a="http://schemas.openxmlformats.org/drawingml/2006/main" xmlns:r="http://schemas.openxmlformats.org/officeDocument/2006/relationships" xmlns:p="http://schemas.openxmlformats.org/presentationml/2006/main">
   <p:cSld>
     <p:spTree>
@@ -5603,6 +5446,132 @@
 </p:sld>
 </file>
 
+<file path=ppt/slides/slide5.xml><?xml version="1.0" encoding="utf-8"?>
+<p:sld xmlns:a="http://schemas.openxmlformats.org/drawingml/2006/main" xmlns:r="http://schemas.openxmlformats.org/officeDocument/2006/relationships" xmlns:p="http://schemas.openxmlformats.org/presentationml/2006/main">
+  <p:cSld>
+    <p:spTree>
+      <p:nvGrpSpPr>
+        <p:cNvPr id="1" name=""/>
+        <p:cNvGrpSpPr/>
+        <p:nvPr/>
+      </p:nvGrpSpPr>
+      <p:grpSpPr>
+        <a:xfrm>
+          <a:off x="0" y="0"/>
+          <a:ext cx="0" cy="0"/>
+          <a:chOff x="0" y="0"/>
+          <a:chExt cx="0" cy="0"/>
+        </a:xfrm>
+      </p:grpSpPr>
+      <p:sp>
+        <p:nvSpPr>
+          <p:cNvPr id="2" name="Title 1">
+            <a:extLst>
+              <a:ext uri="{FF2B5EF4-FFF2-40B4-BE49-F238E27FC236}">
+                <a16:creationId xmlns:a16="http://schemas.microsoft.com/office/drawing/2014/main" id="{7C8A8239-5B17-BCEB-24DB-AF5730BC8662}"/>
+              </a:ext>
+            </a:extLst>
+          </p:cNvPr>
+          <p:cNvSpPr>
+            <a:spLocks noGrp="1"/>
+          </p:cNvSpPr>
+          <p:nvPr>
+            <p:ph type="title"/>
+          </p:nvPr>
+        </p:nvSpPr>
+        <p:spPr/>
+        <p:txBody>
+          <a:bodyPr/>
+          <a:lstStyle/>
+          <a:p>
+            <a:r>
+              <a:rPr lang="en-US" dirty="0"/>
+              <a:t>Level Setting – Limitations of Plain Text Logs</a:t>
+            </a:r>
+          </a:p>
+        </p:txBody>
+      </p:sp>
+      <p:sp>
+        <p:nvSpPr>
+          <p:cNvPr id="3" name="Content Placeholder 2">
+            <a:extLst>
+              <a:ext uri="{FF2B5EF4-FFF2-40B4-BE49-F238E27FC236}">
+                <a16:creationId xmlns:a16="http://schemas.microsoft.com/office/drawing/2014/main" id="{FE44DCF6-C57C-E4F8-C527-B7F600096AB2}"/>
+              </a:ext>
+            </a:extLst>
+          </p:cNvPr>
+          <p:cNvSpPr>
+            <a:spLocks noGrp="1"/>
+          </p:cNvSpPr>
+          <p:nvPr>
+            <p:ph idx="1"/>
+          </p:nvPr>
+        </p:nvSpPr>
+        <p:spPr/>
+        <p:txBody>
+          <a:bodyPr/>
+          <a:lstStyle/>
+          <a:p>
+            <a:r>
+              <a:rPr lang="en-US" dirty="0"/>
+              <a:t>Data in files is hard to sift through</a:t>
+            </a:r>
+          </a:p>
+          <a:p>
+            <a:r>
+              <a:rPr lang="en-US" dirty="0"/>
+              <a:t>Custom providers can make this way easier</a:t>
+            </a:r>
+          </a:p>
+          <a:p>
+            <a:pPr lvl="1"/>
+            <a:r>
+              <a:rPr lang="en-US" dirty="0"/>
+              <a:t>You end up taking a big dependency on their solution</a:t>
+            </a:r>
+          </a:p>
+          <a:p>
+            <a:r>
+              <a:rPr lang="en-US" dirty="0"/>
+              <a:t>Example Scenario:</a:t>
+            </a:r>
+          </a:p>
+          <a:p>
+            <a:pPr lvl="1"/>
+            <a:r>
+              <a:rPr lang="en-US" dirty="0"/>
+              <a:t>UI calls `Service A` which calls `Service B` which calls `Service C`</a:t>
+            </a:r>
+          </a:p>
+          <a:p>
+            <a:pPr lvl="2"/>
+            <a:r>
+              <a:rPr lang="en-US" dirty="0"/>
+              <a:t>An exception occurs in `Service B` because of response from `Service C`</a:t>
+            </a:r>
+          </a:p>
+          <a:p>
+            <a:pPr lvl="2"/>
+            <a:r>
+              <a:rPr lang="en-US" dirty="0"/>
+              <a:t>How do you debug that?</a:t>
+            </a:r>
+          </a:p>
+        </p:txBody>
+      </p:sp>
+    </p:spTree>
+    <p:extLst>
+      <p:ext uri="{BB962C8B-B14F-4D97-AF65-F5344CB8AC3E}">
+        <p14:creationId xmlns:p14="http://schemas.microsoft.com/office/powerpoint/2010/main" val="863765343"/>
+      </p:ext>
+    </p:extLst>
+  </p:cSld>
+  <p:clrMapOvr>
+    <a:masterClrMapping/>
+  </p:clrMapOvr>
+</p:sld>
+</file>
+
 <file path=ppt/slides/slide6.xml><?xml version="1.0" encoding="utf-8"?>
 <p:sld xmlns:a="http://schemas.openxmlformats.org/drawingml/2006/main" xmlns:r="http://schemas.openxmlformats.org/officeDocument/2006/relationships" xmlns:p="http://schemas.openxmlformats.org/presentationml/2006/main">
   <p:cSld>
@@ -5625,7 +5594,7 @@
           <p:cNvPr id="2" name="Title 1">
             <a:extLst>
               <a:ext uri="{FF2B5EF4-FFF2-40B4-BE49-F238E27FC236}">
-                <a16:creationId xmlns:a16="http://schemas.microsoft.com/office/drawing/2014/main" id="{7C8A8239-5B17-BCEB-24DB-AF5730BC8662}"/>
+                <a16:creationId xmlns:a16="http://schemas.microsoft.com/office/drawing/2014/main" id="{2C6AA810-5B21-CD27-EAE6-10F6BE261640}"/>
               </a:ext>
             </a:extLst>
           </p:cNvPr>
@@ -5643,7 +5612,7 @@
           <a:p>
             <a:r>
               <a:rPr lang="en-US" dirty="0"/>
-              <a:t>Level Setting – Limitations of Plain Text Logs</a:t>
+              <a:t>What is Open Telemetry (OTel)?</a:t>
             </a:r>
           </a:p>
         </p:txBody>
@@ -5653,7 +5622,7 @@
           <p:cNvPr id="3" name="Content Placeholder 2">
             <a:extLst>
               <a:ext uri="{FF2B5EF4-FFF2-40B4-BE49-F238E27FC236}">
-                <a16:creationId xmlns:a16="http://schemas.microsoft.com/office/drawing/2014/main" id="{FE44DCF6-C57C-E4F8-C527-B7F600096AB2}"/>
+                <a16:creationId xmlns:a16="http://schemas.microsoft.com/office/drawing/2014/main" id="{3F7DE21D-2382-B67A-2430-4E7BEF80C845}"/>
               </a:ext>
             </a:extLst>
           </p:cNvPr>
@@ -5671,47 +5640,14 @@
           <a:p>
             <a:r>
               <a:rPr lang="en-US" dirty="0"/>
-              <a:t>Data in files is hard to sift through</a:t>
-            </a:r>
-          </a:p>
-          <a:p>
-            <a:r>
-              <a:rPr lang="en-US" dirty="0"/>
-              <a:t>Custom providers can make this way easier</a:t>
+              <a:t>A different way to log data</a:t>
             </a:r>
           </a:p>
           <a:p>
             <a:pPr lvl="1"/>
             <a:r>
               <a:rPr lang="en-US" dirty="0"/>
-              <a:t>You end up taking a big dependency on their solution</a:t>
-            </a:r>
-          </a:p>
-          <a:p>
-            <a:r>
-              <a:rPr lang="en-US" dirty="0"/>
-              <a:t>Example Scenario:</a:t>
-            </a:r>
-          </a:p>
-          <a:p>
-            <a:pPr lvl="1"/>
-            <a:r>
-              <a:rPr lang="en-US" dirty="0"/>
-              <a:t>UI calls `Service A` which calls `Service B` which calls `Service C`</a:t>
-            </a:r>
-          </a:p>
-          <a:p>
-            <a:pPr lvl="2"/>
-            <a:r>
-              <a:rPr lang="en-US" dirty="0"/>
-              <a:t>An exception occurs in `Service B` because of response from `Service C`</a:t>
-            </a:r>
-          </a:p>
-          <a:p>
-            <a:pPr lvl="2"/>
-            <a:r>
-              <a:rPr lang="en-US" dirty="0"/>
-              <a:t>How do you debug that?</a:t>
+              <a:t>A programmatic way</a:t>
             </a:r>
           </a:p>
         </p:txBody>
@@ -5719,7 +5655,7 @@
     </p:spTree>
     <p:extLst>
       <p:ext uri="{BB962C8B-B14F-4D97-AF65-F5344CB8AC3E}">
-        <p14:creationId xmlns:p14="http://schemas.microsoft.com/office/powerpoint/2010/main" val="863765343"/>
+        <p14:creationId xmlns:p14="http://schemas.microsoft.com/office/powerpoint/2010/main" val="1373373935"/>
       </p:ext>
     </p:extLst>
   </p:cSld>
@@ -5751,7 +5687,7 @@
           <p:cNvPr id="2" name="Title 1">
             <a:extLst>
               <a:ext uri="{FF2B5EF4-FFF2-40B4-BE49-F238E27FC236}">
-                <a16:creationId xmlns:a16="http://schemas.microsoft.com/office/drawing/2014/main" id="{2C6AA810-5B21-CD27-EAE6-10F6BE261640}"/>
+                <a16:creationId xmlns:a16="http://schemas.microsoft.com/office/drawing/2014/main" id="{5E307F74-4B66-E256-883D-61DAB1C2B0A8}"/>
               </a:ext>
             </a:extLst>
           </p:cNvPr>
@@ -5769,7 +5705,7 @@
           <a:p>
             <a:r>
               <a:rPr lang="en-US" dirty="0"/>
-              <a:t>What is Open Telemetry (OTel)?</a:t>
+              <a:t>What is OpenTelemetry (OTel)?</a:t>
             </a:r>
           </a:p>
         </p:txBody>
@@ -5779,7 +5715,7 @@
           <p:cNvPr id="3" name="Content Placeholder 2">
             <a:extLst>
               <a:ext uri="{FF2B5EF4-FFF2-40B4-BE49-F238E27FC236}">
-                <a16:creationId xmlns:a16="http://schemas.microsoft.com/office/drawing/2014/main" id="{3F7DE21D-2382-B67A-2430-4E7BEF80C845}"/>
+                <a16:creationId xmlns:a16="http://schemas.microsoft.com/office/drawing/2014/main" id="{B70B10D9-25F8-1530-119E-C1523AD1F882}"/>
               </a:ext>
             </a:extLst>
           </p:cNvPr>
@@ -5797,22 +5733,36 @@
           <a:p>
             <a:r>
               <a:rPr lang="en-US" dirty="0"/>
-              <a:t>A different way to log data</a:t>
-            </a:r>
-          </a:p>
-          <a:p>
-            <a:pPr lvl="1"/>
-            <a:r>
-              <a:rPr lang="en-US" dirty="0"/>
-              <a:t>A programmatic way</a:t>
-            </a:r>
+              <a:t>A standard for collecting telemetry data about your services</a:t>
+            </a:r>
+          </a:p>
+          <a:p>
+            <a:r>
+              <a:rPr lang="en-US" dirty="0"/>
+              <a:t>Open Source, Vendor Neutral, Language Agnostic</a:t>
+            </a:r>
+          </a:p>
+          <a:p>
+            <a:r>
+              <a:rPr lang="en-US" dirty="0">
+                <a:hlinkClick r:id="rId2"/>
+              </a:rPr>
+              <a:t>https://opentelemetry.io/</a:t>
+            </a:r>
+            <a:endParaRPr lang="en-US" dirty="0"/>
+          </a:p>
+          <a:p>
+            <a:endParaRPr lang="en-US" dirty="0"/>
+          </a:p>
+          <a:p>
+            <a:endParaRPr lang="en-US" dirty="0"/>
           </a:p>
         </p:txBody>
       </p:sp>
     </p:spTree>
     <p:extLst>
       <p:ext uri="{BB962C8B-B14F-4D97-AF65-F5344CB8AC3E}">
-        <p14:creationId xmlns:p14="http://schemas.microsoft.com/office/powerpoint/2010/main" val="1373373935"/>
+        <p14:creationId xmlns:p14="http://schemas.microsoft.com/office/powerpoint/2010/main" val="1831172772"/>
       </p:ext>
     </p:extLst>
   </p:cSld>
@@ -5844,7 +5794,7 @@
           <p:cNvPr id="2" name="Title 1">
             <a:extLst>
               <a:ext uri="{FF2B5EF4-FFF2-40B4-BE49-F238E27FC236}">
-                <a16:creationId xmlns:a16="http://schemas.microsoft.com/office/drawing/2014/main" id="{5E307F74-4B66-E256-883D-61DAB1C2B0A8}"/>
+                <a16:creationId xmlns:a16="http://schemas.microsoft.com/office/drawing/2014/main" id="{AAD5DAA3-53C8-E9B6-E493-EF43BE2291AF}"/>
               </a:ext>
             </a:extLst>
           </p:cNvPr>
@@ -5862,7 +5812,7 @@
           <a:p>
             <a:r>
               <a:rPr lang="en-US" dirty="0"/>
-              <a:t>What is OpenTelemetry (OTel)?</a:t>
+              <a:t>Anything new in OTel?</a:t>
             </a:r>
           </a:p>
         </p:txBody>
@@ -5872,7 +5822,7 @@
           <p:cNvPr id="3" name="Content Placeholder 2">
             <a:extLst>
               <a:ext uri="{FF2B5EF4-FFF2-40B4-BE49-F238E27FC236}">
-                <a16:creationId xmlns:a16="http://schemas.microsoft.com/office/drawing/2014/main" id="{B70B10D9-25F8-1530-119E-C1523AD1F882}"/>
+                <a16:creationId xmlns:a16="http://schemas.microsoft.com/office/drawing/2014/main" id="{19E33655-393E-BA6E-5196-A5AE05A269A1}"/>
               </a:ext>
             </a:extLst>
           </p:cNvPr>
@@ -5890,36 +5840,21 @@
           <a:p>
             <a:r>
               <a:rPr lang="en-US" dirty="0"/>
-              <a:t>A standard for collecting telemetry data about your services</a:t>
-            </a:r>
-          </a:p>
-          <a:p>
-            <a:r>
-              <a:rPr lang="en-US" dirty="0"/>
-              <a:t>Open Source, Vendor Neutral, Language Agnostic</a:t>
-            </a:r>
-          </a:p>
-          <a:p>
-            <a:r>
-              <a:rPr lang="en-US" dirty="0">
-                <a:hlinkClick r:id="rId2"/>
-              </a:rPr>
-              <a:t>https://opentelemetry.io/</a:t>
-            </a:r>
-            <a:endParaRPr lang="en-US" dirty="0"/>
-          </a:p>
-          <a:p>
-            <a:endParaRPr lang="en-US" dirty="0"/>
-          </a:p>
-          <a:p>
-            <a:endParaRPr lang="en-US" dirty="0"/>
+              <a:t>Not really</a:t>
+            </a:r>
+          </a:p>
+          <a:p>
+            <a:r>
+              <a:rPr lang="en-US" dirty="0"/>
+              <a:t>But it standardizes functionality</a:t>
+            </a:r>
           </a:p>
         </p:txBody>
       </p:sp>
     </p:spTree>
     <p:extLst>
       <p:ext uri="{BB962C8B-B14F-4D97-AF65-F5344CB8AC3E}">
-        <p14:creationId xmlns:p14="http://schemas.microsoft.com/office/powerpoint/2010/main" val="1831172772"/>
+        <p14:creationId xmlns:p14="http://schemas.microsoft.com/office/powerpoint/2010/main" val="4089575898"/>
       </p:ext>
     </p:extLst>
   </p:cSld>

</xml_diff>

<commit_message>
Consolidated a PowerPoint slide
</commit_message>
<xml_diff>
--- a/2023-03 - Orlando Code Camp - OpenTelemetry/Presentation.pptx
+++ b/2023-03 - Orlando Code Camp - OpenTelemetry/Presentation.pptx
@@ -10,24 +10,23 @@
     <p:sldId id="261" r:id="rId4"/>
     <p:sldId id="263" r:id="rId5"/>
     <p:sldId id="262" r:id="rId6"/>
-    <p:sldId id="277" r:id="rId7"/>
-    <p:sldId id="257" r:id="rId8"/>
-    <p:sldId id="279" r:id="rId9"/>
-    <p:sldId id="258" r:id="rId10"/>
-    <p:sldId id="259" r:id="rId11"/>
-    <p:sldId id="260" r:id="rId12"/>
-    <p:sldId id="276" r:id="rId13"/>
-    <p:sldId id="278" r:id="rId14"/>
-    <p:sldId id="273" r:id="rId15"/>
-    <p:sldId id="267" r:id="rId16"/>
-    <p:sldId id="269" r:id="rId17"/>
-    <p:sldId id="266" r:id="rId18"/>
-    <p:sldId id="268" r:id="rId19"/>
-    <p:sldId id="271" r:id="rId20"/>
-    <p:sldId id="272" r:id="rId21"/>
-    <p:sldId id="274" r:id="rId22"/>
-    <p:sldId id="265" r:id="rId23"/>
-    <p:sldId id="275" r:id="rId24"/>
+    <p:sldId id="257" r:id="rId7"/>
+    <p:sldId id="279" r:id="rId8"/>
+    <p:sldId id="258" r:id="rId9"/>
+    <p:sldId id="259" r:id="rId10"/>
+    <p:sldId id="260" r:id="rId11"/>
+    <p:sldId id="276" r:id="rId12"/>
+    <p:sldId id="278" r:id="rId13"/>
+    <p:sldId id="273" r:id="rId14"/>
+    <p:sldId id="267" r:id="rId15"/>
+    <p:sldId id="269" r:id="rId16"/>
+    <p:sldId id="266" r:id="rId17"/>
+    <p:sldId id="268" r:id="rId18"/>
+    <p:sldId id="271" r:id="rId19"/>
+    <p:sldId id="272" r:id="rId20"/>
+    <p:sldId id="274" r:id="rId21"/>
+    <p:sldId id="265" r:id="rId22"/>
+    <p:sldId id="275" r:id="rId23"/>
   </p:sldIdLst>
   <p:sldSz cx="12192000" cy="6858000"/>
   <p:notesSz cx="6858000" cy="9144000"/>
@@ -3476,7 +3475,7 @@
           <p:cNvPr id="2" name="Title 1">
             <a:extLst>
               <a:ext uri="{FF2B5EF4-FFF2-40B4-BE49-F238E27FC236}">
-                <a16:creationId xmlns:a16="http://schemas.microsoft.com/office/drawing/2014/main" id="{E9D5BFED-98DA-1F9D-BD38-501E6FA022AC}"/>
+                <a16:creationId xmlns:a16="http://schemas.microsoft.com/office/drawing/2014/main" id="{750EEC00-ACB4-91E4-DA0D-94466EF4CF6C}"/>
               </a:ext>
             </a:extLst>
           </p:cNvPr>
@@ -3494,7 +3493,7 @@
           <a:p>
             <a:r>
               <a:rPr lang="en-US" dirty="0"/>
-              <a:t>OTel Metrics</a:t>
+              <a:t>OTel Traces</a:t>
             </a:r>
           </a:p>
         </p:txBody>
@@ -3504,7 +3503,7 @@
           <p:cNvPr id="3" name="Content Placeholder 2">
             <a:extLst>
               <a:ext uri="{FF2B5EF4-FFF2-40B4-BE49-F238E27FC236}">
-                <a16:creationId xmlns:a16="http://schemas.microsoft.com/office/drawing/2014/main" id="{8BED0D18-AA50-7A8C-26EC-7C136586261A}"/>
+                <a16:creationId xmlns:a16="http://schemas.microsoft.com/office/drawing/2014/main" id="{5B0DA666-D600-BB5F-0EBF-CA05891D174E}"/>
               </a:ext>
             </a:extLst>
           </p:cNvPr>
@@ -3517,39 +3516,41 @@
         </p:nvSpPr>
         <p:spPr/>
         <p:txBody>
-          <a:bodyPr/>
-          <a:lstStyle/>
-          <a:p>
-            <a:r>
-              <a:rPr lang="en-US" dirty="0"/>
-              <a:t>Counters</a:t>
+          <a:bodyPr>
+            <a:normAutofit/>
+          </a:bodyPr>
+          <a:lstStyle/>
+          <a:p>
+            <a:r>
+              <a:rPr lang="en-US" dirty="0"/>
+              <a:t>Information for a request</a:t>
             </a:r>
           </a:p>
           <a:p>
             <a:pPr lvl="1"/>
             <a:r>
               <a:rPr lang="en-US" dirty="0"/>
-              <a:t>CPU/Memory usage on the box</a:t>
+              <a:t>Can span multiple applications, all based on the Trace Id</a:t>
+            </a:r>
+          </a:p>
+          <a:p>
+            <a:r>
+              <a:rPr lang="en-US" dirty="0"/>
+              <a:t>Full information for a request</a:t>
             </a:r>
           </a:p>
           <a:p>
             <a:pPr lvl="1"/>
             <a:r>
               <a:rPr lang="en-US" dirty="0"/>
-              <a:t>Requests per second</a:t>
-            </a:r>
-          </a:p>
-          <a:p>
-            <a:r>
-              <a:rPr lang="en-US" dirty="0"/>
-              <a:t>Has an API to write custom data to</a:t>
+              <a:t>From beginning to end</a:t>
             </a:r>
           </a:p>
           <a:p>
             <a:pPr lvl="1"/>
             <a:r>
               <a:rPr lang="en-US" dirty="0"/>
-              <a:t>Still in beta</a:t>
+              <a:t>Across multiple services</a:t>
             </a:r>
           </a:p>
         </p:txBody>
@@ -3557,7 +3558,7 @@
     </p:spTree>
     <p:extLst>
       <p:ext uri="{BB962C8B-B14F-4D97-AF65-F5344CB8AC3E}">
-        <p14:creationId xmlns:p14="http://schemas.microsoft.com/office/powerpoint/2010/main" val="1300523344"/>
+        <p14:creationId xmlns:p14="http://schemas.microsoft.com/office/powerpoint/2010/main" val="3266317626"/>
       </p:ext>
     </p:extLst>
   </p:cSld>
@@ -3589,7 +3590,7 @@
           <p:cNvPr id="2" name="Title 1">
             <a:extLst>
               <a:ext uri="{FF2B5EF4-FFF2-40B4-BE49-F238E27FC236}">
-                <a16:creationId xmlns:a16="http://schemas.microsoft.com/office/drawing/2014/main" id="{750EEC00-ACB4-91E4-DA0D-94466EF4CF6C}"/>
+                <a16:creationId xmlns:a16="http://schemas.microsoft.com/office/drawing/2014/main" id="{CA36E138-4037-1571-502D-1CACEC8C1A76}"/>
               </a:ext>
             </a:extLst>
           </p:cNvPr>
@@ -3607,7 +3608,7 @@
           <a:p>
             <a:r>
               <a:rPr lang="en-US" dirty="0"/>
-              <a:t>OTel Traces</a:t>
+              <a:t>Trace Spans</a:t>
             </a:r>
           </a:p>
         </p:txBody>
@@ -3617,7 +3618,7 @@
           <p:cNvPr id="3" name="Content Placeholder 2">
             <a:extLst>
               <a:ext uri="{FF2B5EF4-FFF2-40B4-BE49-F238E27FC236}">
-                <a16:creationId xmlns:a16="http://schemas.microsoft.com/office/drawing/2014/main" id="{5B0DA666-D600-BB5F-0EBF-CA05891D174E}"/>
+                <a16:creationId xmlns:a16="http://schemas.microsoft.com/office/drawing/2014/main" id="{BC44F77B-F096-EAA1-EB22-A144A7C33569}"/>
               </a:ext>
             </a:extLst>
           </p:cNvPr>
@@ -3637,42 +3638,53 @@
           <a:p>
             <a:r>
               <a:rPr lang="en-US" dirty="0"/>
-              <a:t>Information for a request</a:t>
+              <a:t>Traces have child Spans</a:t>
             </a:r>
           </a:p>
           <a:p>
             <a:pPr lvl="1"/>
             <a:r>
               <a:rPr lang="en-US" dirty="0"/>
-              <a:t>Can span multiple applications, all based on the Trace Id</a:t>
-            </a:r>
-          </a:p>
-          <a:p>
-            <a:r>
-              <a:rPr lang="en-US" dirty="0"/>
-              <a:t>Full information for a request</a:t>
+              <a:t>Track their own timing</a:t>
             </a:r>
           </a:p>
           <a:p>
             <a:pPr lvl="1"/>
             <a:r>
               <a:rPr lang="en-US" dirty="0"/>
-              <a:t>From beginning to end</a:t>
+              <a:t>Spans have child Attributes</a:t>
+            </a:r>
+          </a:p>
+          <a:p>
+            <a:pPr lvl="2"/>
+            <a:r>
+              <a:rPr lang="en-US" dirty="0"/>
+              <a:t>Attributes are key/value pairs of data</a:t>
             </a:r>
           </a:p>
           <a:p>
             <a:pPr lvl="1"/>
             <a:r>
               <a:rPr lang="en-US" dirty="0"/>
-              <a:t>Across multiple services</a:t>
-            </a:r>
+              <a:t>Spans have child Events</a:t>
+            </a:r>
+          </a:p>
+          <a:p>
+            <a:pPr lvl="2"/>
+            <a:r>
+              <a:rPr lang="en-US" dirty="0"/>
+              <a:t>Events are timestamped pieces of data in a span, can have their own attributes</a:t>
+            </a:r>
+          </a:p>
+          <a:p>
+            <a:endParaRPr lang="en-US" dirty="0"/>
           </a:p>
         </p:txBody>
       </p:sp>
     </p:spTree>
     <p:extLst>
       <p:ext uri="{BB962C8B-B14F-4D97-AF65-F5344CB8AC3E}">
-        <p14:creationId xmlns:p14="http://schemas.microsoft.com/office/powerpoint/2010/main" val="3266317626"/>
+        <p14:creationId xmlns:p14="http://schemas.microsoft.com/office/powerpoint/2010/main" val="2592434834"/>
       </p:ext>
     </p:extLst>
   </p:cSld>
@@ -3704,132 +3716,6 @@
           <p:cNvPr id="2" name="Title 1">
             <a:extLst>
               <a:ext uri="{FF2B5EF4-FFF2-40B4-BE49-F238E27FC236}">
-                <a16:creationId xmlns:a16="http://schemas.microsoft.com/office/drawing/2014/main" id="{CA36E138-4037-1571-502D-1CACEC8C1A76}"/>
-              </a:ext>
-            </a:extLst>
-          </p:cNvPr>
-          <p:cNvSpPr>
-            <a:spLocks noGrp="1"/>
-          </p:cNvSpPr>
-          <p:nvPr>
-            <p:ph type="title"/>
-          </p:nvPr>
-        </p:nvSpPr>
-        <p:spPr/>
-        <p:txBody>
-          <a:bodyPr/>
-          <a:lstStyle/>
-          <a:p>
-            <a:r>
-              <a:rPr lang="en-US" dirty="0"/>
-              <a:t>Trace Spans</a:t>
-            </a:r>
-          </a:p>
-        </p:txBody>
-      </p:sp>
-      <p:sp>
-        <p:nvSpPr>
-          <p:cNvPr id="3" name="Content Placeholder 2">
-            <a:extLst>
-              <a:ext uri="{FF2B5EF4-FFF2-40B4-BE49-F238E27FC236}">
-                <a16:creationId xmlns:a16="http://schemas.microsoft.com/office/drawing/2014/main" id="{BC44F77B-F096-EAA1-EB22-A144A7C33569}"/>
-              </a:ext>
-            </a:extLst>
-          </p:cNvPr>
-          <p:cNvSpPr>
-            <a:spLocks noGrp="1"/>
-          </p:cNvSpPr>
-          <p:nvPr>
-            <p:ph idx="1"/>
-          </p:nvPr>
-        </p:nvSpPr>
-        <p:spPr/>
-        <p:txBody>
-          <a:bodyPr>
-            <a:normAutofit/>
-          </a:bodyPr>
-          <a:lstStyle/>
-          <a:p>
-            <a:r>
-              <a:rPr lang="en-US" dirty="0"/>
-              <a:t>Traces have child Spans</a:t>
-            </a:r>
-          </a:p>
-          <a:p>
-            <a:pPr lvl="1"/>
-            <a:r>
-              <a:rPr lang="en-US" dirty="0"/>
-              <a:t>Track their own timing</a:t>
-            </a:r>
-          </a:p>
-          <a:p>
-            <a:pPr lvl="1"/>
-            <a:r>
-              <a:rPr lang="en-US" dirty="0"/>
-              <a:t>Spans have child Attributes</a:t>
-            </a:r>
-          </a:p>
-          <a:p>
-            <a:pPr lvl="2"/>
-            <a:r>
-              <a:rPr lang="en-US" dirty="0"/>
-              <a:t>Attributes are key/value pairs of data</a:t>
-            </a:r>
-          </a:p>
-          <a:p>
-            <a:pPr lvl="1"/>
-            <a:r>
-              <a:rPr lang="en-US" dirty="0"/>
-              <a:t>Spans have child Events</a:t>
-            </a:r>
-          </a:p>
-          <a:p>
-            <a:pPr lvl="2"/>
-            <a:r>
-              <a:rPr lang="en-US" dirty="0"/>
-              <a:t>Events are timestamped pieces of data in a span, can have their own attributes</a:t>
-            </a:r>
-          </a:p>
-          <a:p>
-            <a:endParaRPr lang="en-US" dirty="0"/>
-          </a:p>
-        </p:txBody>
-      </p:sp>
-    </p:spTree>
-    <p:extLst>
-      <p:ext uri="{BB962C8B-B14F-4D97-AF65-F5344CB8AC3E}">
-        <p14:creationId xmlns:p14="http://schemas.microsoft.com/office/powerpoint/2010/main" val="2592434834"/>
-      </p:ext>
-    </p:extLst>
-  </p:cSld>
-  <p:clrMapOvr>
-    <a:masterClrMapping/>
-  </p:clrMapOvr>
-</p:sld>
-</file>
-
-<file path=ppt/slides/slide13.xml><?xml version="1.0" encoding="utf-8"?>
-<p:sld xmlns:a="http://schemas.openxmlformats.org/drawingml/2006/main" xmlns:r="http://schemas.openxmlformats.org/officeDocument/2006/relationships" xmlns:p="http://schemas.openxmlformats.org/presentationml/2006/main">
-  <p:cSld>
-    <p:spTree>
-      <p:nvGrpSpPr>
-        <p:cNvPr id="1" name=""/>
-        <p:cNvGrpSpPr/>
-        <p:nvPr/>
-      </p:nvGrpSpPr>
-      <p:grpSpPr>
-        <a:xfrm>
-          <a:off x="0" y="0"/>
-          <a:ext cx="0" cy="0"/>
-          <a:chOff x="0" y="0"/>
-          <a:chExt cx="0" cy="0"/>
-        </a:xfrm>
-      </p:grpSpPr>
-      <p:sp>
-        <p:nvSpPr>
-          <p:cNvPr id="2" name="Title 1">
-            <a:extLst>
-              <a:ext uri="{FF2B5EF4-FFF2-40B4-BE49-F238E27FC236}">
                 <a16:creationId xmlns:a16="http://schemas.microsoft.com/office/drawing/2014/main" id="{D50EF6EF-BDEA-13F5-2E5F-4014D35E0069}"/>
               </a:ext>
             </a:extLst>
@@ -3931,7 +3817,7 @@
 </p:sld>
 </file>
 
-<file path=ppt/slides/slide14.xml><?xml version="1.0" encoding="utf-8"?>
+<file path=ppt/slides/slide13.xml><?xml version="1.0" encoding="utf-8"?>
 <p:sld xmlns:a="http://schemas.openxmlformats.org/drawingml/2006/main" xmlns:r="http://schemas.openxmlformats.org/officeDocument/2006/relationships" xmlns:p="http://schemas.openxmlformats.org/presentationml/2006/main">
   <p:cSld>
     <p:spTree>
@@ -4044,6 +3930,156 @@
 </p:sld>
 </file>
 
+<file path=ppt/slides/slide14.xml><?xml version="1.0" encoding="utf-8"?>
+<p:sld xmlns:a="http://schemas.openxmlformats.org/drawingml/2006/main" xmlns:r="http://schemas.openxmlformats.org/officeDocument/2006/relationships" xmlns:p="http://schemas.openxmlformats.org/presentationml/2006/main">
+  <p:cSld>
+    <p:spTree>
+      <p:nvGrpSpPr>
+        <p:cNvPr id="1" name=""/>
+        <p:cNvGrpSpPr/>
+        <p:nvPr/>
+      </p:nvGrpSpPr>
+      <p:grpSpPr>
+        <a:xfrm>
+          <a:off x="0" y="0"/>
+          <a:ext cx="0" cy="0"/>
+          <a:chOff x="0" y="0"/>
+          <a:chExt cx="0" cy="0"/>
+        </a:xfrm>
+      </p:grpSpPr>
+      <p:sp>
+        <p:nvSpPr>
+          <p:cNvPr id="2" name="Title 1">
+            <a:extLst>
+              <a:ext uri="{FF2B5EF4-FFF2-40B4-BE49-F238E27FC236}">
+                <a16:creationId xmlns:a16="http://schemas.microsoft.com/office/drawing/2014/main" id="{F5B35BAA-E861-A124-0F27-2BC180B47B78}"/>
+              </a:ext>
+            </a:extLst>
+          </p:cNvPr>
+          <p:cNvSpPr>
+            <a:spLocks noGrp="1"/>
+          </p:cNvSpPr>
+          <p:nvPr>
+            <p:ph type="title"/>
+          </p:nvPr>
+        </p:nvSpPr>
+        <p:spPr/>
+        <p:txBody>
+          <a:bodyPr/>
+          <a:lstStyle/>
+          <a:p>
+            <a:r>
+              <a:rPr lang="en-US" dirty="0" err="1"/>
+              <a:t>TraceContext</a:t>
+            </a:r>
+            <a:endParaRPr lang="en-US" dirty="0"/>
+          </a:p>
+        </p:txBody>
+      </p:sp>
+      <p:sp>
+        <p:nvSpPr>
+          <p:cNvPr id="3" name="Content Placeholder 2">
+            <a:extLst>
+              <a:ext uri="{FF2B5EF4-FFF2-40B4-BE49-F238E27FC236}">
+                <a16:creationId xmlns:a16="http://schemas.microsoft.com/office/drawing/2014/main" id="{1D4DD0D4-8EA8-3477-13E5-6D429EC8BBAE}"/>
+              </a:ext>
+            </a:extLst>
+          </p:cNvPr>
+          <p:cNvSpPr>
+            <a:spLocks noGrp="1"/>
+          </p:cNvSpPr>
+          <p:nvPr>
+            <p:ph idx="1"/>
+          </p:nvPr>
+        </p:nvSpPr>
+        <p:spPr/>
+        <p:txBody>
+          <a:bodyPr/>
+          <a:lstStyle/>
+          <a:p>
+            <a:r>
+              <a:rPr lang="en-US" dirty="0"/>
+              <a:t>Passed around to track the parent Trace</a:t>
+            </a:r>
+          </a:p>
+          <a:p>
+            <a:pPr lvl="1"/>
+            <a:r>
+              <a:rPr lang="en-US" dirty="0"/>
+              <a:t>Sometimes automatic, sometimes manually</a:t>
+            </a:r>
+          </a:p>
+          <a:p>
+            <a:r>
+              <a:rPr lang="en-US" dirty="0"/>
+              <a:t>“</a:t>
+            </a:r>
+            <a:r>
+              <a:rPr lang="en-US" dirty="0" err="1"/>
+              <a:t>traceparent</a:t>
+            </a:r>
+            <a:r>
+              <a:rPr lang="en-US" dirty="0"/>
+              <a:t>” Header</a:t>
+            </a:r>
+          </a:p>
+          <a:p>
+            <a:pPr lvl="1"/>
+            <a:r>
+              <a:rPr lang="en-US" dirty="0"/>
+              <a:t>00-c9dafef5b02172ce9f19a70ee83e9fc8-4f78ce7bf9cb7d22-01</a:t>
+            </a:r>
+          </a:p>
+          <a:p>
+            <a:pPr lvl="2"/>
+            <a:r>
+              <a:rPr lang="en-US" dirty="0"/>
+              <a:t>Separated by dashes:</a:t>
+            </a:r>
+          </a:p>
+          <a:p>
+            <a:pPr lvl="3"/>
+            <a:r>
+              <a:rPr lang="en-US" dirty="0"/>
+              <a:t>Version Format</a:t>
+            </a:r>
+          </a:p>
+          <a:p>
+            <a:pPr lvl="3"/>
+            <a:r>
+              <a:rPr lang="en-US" dirty="0"/>
+              <a:t>Trace Id</a:t>
+            </a:r>
+          </a:p>
+          <a:p>
+            <a:pPr lvl="3"/>
+            <a:r>
+              <a:rPr lang="en-US" dirty="0"/>
+              <a:t>Parent Id</a:t>
+            </a:r>
+          </a:p>
+          <a:p>
+            <a:pPr lvl="3"/>
+            <a:r>
+              <a:rPr lang="en-US" dirty="0"/>
+              <a:t>Trace Flags</a:t>
+            </a:r>
+          </a:p>
+        </p:txBody>
+      </p:sp>
+    </p:spTree>
+    <p:extLst>
+      <p:ext uri="{BB962C8B-B14F-4D97-AF65-F5344CB8AC3E}">
+        <p14:creationId xmlns:p14="http://schemas.microsoft.com/office/powerpoint/2010/main" val="2071471505"/>
+      </p:ext>
+    </p:extLst>
+  </p:cSld>
+  <p:clrMapOvr>
+    <a:masterClrMapping/>
+  </p:clrMapOvr>
+</p:sld>
+</file>
+
 <file path=ppt/slides/slide15.xml><?xml version="1.0" encoding="utf-8"?>
 <p:sld xmlns:a="http://schemas.openxmlformats.org/drawingml/2006/main" xmlns:r="http://schemas.openxmlformats.org/officeDocument/2006/relationships" xmlns:p="http://schemas.openxmlformats.org/presentationml/2006/main">
   <p:cSld>
@@ -4066,7 +4102,7 @@
           <p:cNvPr id="2" name="Title 1">
             <a:extLst>
               <a:ext uri="{FF2B5EF4-FFF2-40B4-BE49-F238E27FC236}">
-                <a16:creationId xmlns:a16="http://schemas.microsoft.com/office/drawing/2014/main" id="{F5B35BAA-E861-A124-0F27-2BC180B47B78}"/>
+                <a16:creationId xmlns:a16="http://schemas.microsoft.com/office/drawing/2014/main" id="{1E4B3E1C-B7FB-73D4-80B8-E85002405217}"/>
               </a:ext>
             </a:extLst>
           </p:cNvPr>
@@ -4086,105 +4122,52 @@
               <a:rPr lang="en-US" dirty="0" err="1"/>
               <a:t>TraceContext</a:t>
             </a:r>
-            <a:endParaRPr lang="en-US" dirty="0"/>
-          </a:p>
-        </p:txBody>
-      </p:sp>
-      <p:sp>
-        <p:nvSpPr>
-          <p:cNvPr id="3" name="Content Placeholder 2">
-            <a:extLst>
-              <a:ext uri="{FF2B5EF4-FFF2-40B4-BE49-F238E27FC236}">
-                <a16:creationId xmlns:a16="http://schemas.microsoft.com/office/drawing/2014/main" id="{1D4DD0D4-8EA8-3477-13E5-6D429EC8BBAE}"/>
-              </a:ext>
-            </a:extLst>
-          </p:cNvPr>
-          <p:cNvSpPr>
-            <a:spLocks noGrp="1"/>
-          </p:cNvSpPr>
+            <a:r>
+              <a:rPr lang="en-US" dirty="0"/>
+              <a:t> contd.</a:t>
+            </a:r>
+          </a:p>
+        </p:txBody>
+      </p:sp>
+      <p:pic>
+        <p:nvPicPr>
+          <p:cNvPr id="5" name="Content Placeholder 4" descr="Diagram&#10;&#10;Description automatically generated">
+            <a:extLst>
+              <a:ext uri="{FF2B5EF4-FFF2-40B4-BE49-F238E27FC236}">
+                <a16:creationId xmlns:a16="http://schemas.microsoft.com/office/drawing/2014/main" id="{641DFCD3-020C-004A-DFB8-818F4D9B4B77}"/>
+              </a:ext>
+            </a:extLst>
+          </p:cNvPr>
+          <p:cNvPicPr>
+            <a:picLocks noGrp="1" noChangeAspect="1"/>
+          </p:cNvPicPr>
           <p:nvPr>
             <p:ph idx="1"/>
           </p:nvPr>
-        </p:nvSpPr>
-        <p:spPr/>
-        <p:txBody>
-          <a:bodyPr/>
-          <a:lstStyle/>
-          <a:p>
-            <a:r>
-              <a:rPr lang="en-US" dirty="0"/>
-              <a:t>Passed around to track the parent Trace</a:t>
-            </a:r>
-          </a:p>
-          <a:p>
-            <a:pPr lvl="1"/>
-            <a:r>
-              <a:rPr lang="en-US" dirty="0"/>
-              <a:t>Sometimes automatic, sometimes manually</a:t>
-            </a:r>
-          </a:p>
-          <a:p>
-            <a:r>
-              <a:rPr lang="en-US" dirty="0"/>
-              <a:t>“</a:t>
-            </a:r>
-            <a:r>
-              <a:rPr lang="en-US" dirty="0" err="1"/>
-              <a:t>traceparent</a:t>
-            </a:r>
-            <a:r>
-              <a:rPr lang="en-US" dirty="0"/>
-              <a:t>” Header</a:t>
-            </a:r>
-          </a:p>
-          <a:p>
-            <a:pPr lvl="1"/>
-            <a:r>
-              <a:rPr lang="en-US" dirty="0"/>
-              <a:t>00-c9dafef5b02172ce9f19a70ee83e9fc8-4f78ce7bf9cb7d22-01</a:t>
-            </a:r>
-          </a:p>
-          <a:p>
-            <a:pPr lvl="2"/>
-            <a:r>
-              <a:rPr lang="en-US" dirty="0"/>
-              <a:t>Separated by dashes:</a:t>
-            </a:r>
-          </a:p>
-          <a:p>
-            <a:pPr lvl="3"/>
-            <a:r>
-              <a:rPr lang="en-US" dirty="0"/>
-              <a:t>Version Format</a:t>
-            </a:r>
-          </a:p>
-          <a:p>
-            <a:pPr lvl="3"/>
-            <a:r>
-              <a:rPr lang="en-US" dirty="0"/>
-              <a:t>Trace Id</a:t>
-            </a:r>
-          </a:p>
-          <a:p>
-            <a:pPr lvl="3"/>
-            <a:r>
-              <a:rPr lang="en-US" dirty="0"/>
-              <a:t>Parent Id</a:t>
-            </a:r>
-          </a:p>
-          <a:p>
-            <a:pPr lvl="3"/>
-            <a:r>
-              <a:rPr lang="en-US" dirty="0"/>
-              <a:t>Trace Flags</a:t>
-            </a:r>
-          </a:p>
-        </p:txBody>
-      </p:sp>
+        </p:nvPicPr>
+        <p:blipFill>
+          <a:blip r:embed="rId2">
+            <a:extLst>
+              <a:ext uri="{28A0092B-C50C-407E-A947-70E740481C1C}">
+                <a14:useLocalDpi xmlns:a14="http://schemas.microsoft.com/office/drawing/2010/main" val="0"/>
+              </a:ext>
+            </a:extLst>
+          </a:blip>
+          <a:stretch>
+            <a:fillRect/>
+          </a:stretch>
+        </p:blipFill>
+        <p:spPr>
+          <a:xfrm>
+            <a:off x="1276480" y="1825625"/>
+            <a:ext cx="9639039" cy="4351338"/>
+          </a:xfrm>
+        </p:spPr>
+      </p:pic>
     </p:spTree>
     <p:extLst>
       <p:ext uri="{BB962C8B-B14F-4D97-AF65-F5344CB8AC3E}">
-        <p14:creationId xmlns:p14="http://schemas.microsoft.com/office/powerpoint/2010/main" val="2071471505"/>
+        <p14:creationId xmlns:p14="http://schemas.microsoft.com/office/powerpoint/2010/main" val="717331255"/>
       </p:ext>
     </p:extLst>
   </p:cSld>
@@ -4216,103 +4199,6 @@
           <p:cNvPr id="2" name="Title 1">
             <a:extLst>
               <a:ext uri="{FF2B5EF4-FFF2-40B4-BE49-F238E27FC236}">
-                <a16:creationId xmlns:a16="http://schemas.microsoft.com/office/drawing/2014/main" id="{1E4B3E1C-B7FB-73D4-80B8-E85002405217}"/>
-              </a:ext>
-            </a:extLst>
-          </p:cNvPr>
-          <p:cNvSpPr>
-            <a:spLocks noGrp="1"/>
-          </p:cNvSpPr>
-          <p:nvPr>
-            <p:ph type="title"/>
-          </p:nvPr>
-        </p:nvSpPr>
-        <p:spPr/>
-        <p:txBody>
-          <a:bodyPr/>
-          <a:lstStyle/>
-          <a:p>
-            <a:r>
-              <a:rPr lang="en-US" dirty="0" err="1"/>
-              <a:t>TraceContext</a:t>
-            </a:r>
-            <a:r>
-              <a:rPr lang="en-US" dirty="0"/>
-              <a:t> contd.</a:t>
-            </a:r>
-          </a:p>
-        </p:txBody>
-      </p:sp>
-      <p:pic>
-        <p:nvPicPr>
-          <p:cNvPr id="5" name="Content Placeholder 4" descr="Diagram&#10;&#10;Description automatically generated">
-            <a:extLst>
-              <a:ext uri="{FF2B5EF4-FFF2-40B4-BE49-F238E27FC236}">
-                <a16:creationId xmlns:a16="http://schemas.microsoft.com/office/drawing/2014/main" id="{641DFCD3-020C-004A-DFB8-818F4D9B4B77}"/>
-              </a:ext>
-            </a:extLst>
-          </p:cNvPr>
-          <p:cNvPicPr>
-            <a:picLocks noGrp="1" noChangeAspect="1"/>
-          </p:cNvPicPr>
-          <p:nvPr>
-            <p:ph idx="1"/>
-          </p:nvPr>
-        </p:nvPicPr>
-        <p:blipFill>
-          <a:blip r:embed="rId2">
-            <a:extLst>
-              <a:ext uri="{28A0092B-C50C-407E-A947-70E740481C1C}">
-                <a14:useLocalDpi xmlns:a14="http://schemas.microsoft.com/office/drawing/2010/main" val="0"/>
-              </a:ext>
-            </a:extLst>
-          </a:blip>
-          <a:stretch>
-            <a:fillRect/>
-          </a:stretch>
-        </p:blipFill>
-        <p:spPr>
-          <a:xfrm>
-            <a:off x="1276480" y="1825625"/>
-            <a:ext cx="9639039" cy="4351338"/>
-          </a:xfrm>
-        </p:spPr>
-      </p:pic>
-    </p:spTree>
-    <p:extLst>
-      <p:ext uri="{BB962C8B-B14F-4D97-AF65-F5344CB8AC3E}">
-        <p14:creationId xmlns:p14="http://schemas.microsoft.com/office/powerpoint/2010/main" val="717331255"/>
-      </p:ext>
-    </p:extLst>
-  </p:cSld>
-  <p:clrMapOvr>
-    <a:masterClrMapping/>
-  </p:clrMapOvr>
-</p:sld>
-</file>
-
-<file path=ppt/slides/slide17.xml><?xml version="1.0" encoding="utf-8"?>
-<p:sld xmlns:a="http://schemas.openxmlformats.org/drawingml/2006/main" xmlns:r="http://schemas.openxmlformats.org/officeDocument/2006/relationships" xmlns:p="http://schemas.openxmlformats.org/presentationml/2006/main">
-  <p:cSld>
-    <p:spTree>
-      <p:nvGrpSpPr>
-        <p:cNvPr id="1" name=""/>
-        <p:cNvGrpSpPr/>
-        <p:nvPr/>
-      </p:nvGrpSpPr>
-      <p:grpSpPr>
-        <a:xfrm>
-          <a:off x="0" y="0"/>
-          <a:ext cx="0" cy="0"/>
-          <a:chOff x="0" y="0"/>
-          <a:chExt cx="0" cy="0"/>
-        </a:xfrm>
-      </p:grpSpPr>
-      <p:sp>
-        <p:nvSpPr>
-          <p:cNvPr id="2" name="Title 1">
-            <a:extLst>
-              <a:ext uri="{FF2B5EF4-FFF2-40B4-BE49-F238E27FC236}">
                 <a16:creationId xmlns:a16="http://schemas.microsoft.com/office/drawing/2014/main" id="{7E66F3A5-A777-B1AF-24E4-DB86EE46F263}"/>
               </a:ext>
             </a:extLst>
@@ -4396,7 +4282,7 @@
 </p:sld>
 </file>
 
-<file path=ppt/slides/slide18.xml><?xml version="1.0" encoding="utf-8"?>
+<file path=ppt/slides/slide17.xml><?xml version="1.0" encoding="utf-8"?>
 <p:sld xmlns:a="http://schemas.openxmlformats.org/drawingml/2006/main" xmlns:r="http://schemas.openxmlformats.org/officeDocument/2006/relationships" xmlns:p="http://schemas.openxmlformats.org/presentationml/2006/main">
   <p:cSld>
     <p:spTree>
@@ -4519,7 +4405,7 @@
 </p:sld>
 </file>
 
-<file path=ppt/slides/slide19.xml><?xml version="1.0" encoding="utf-8"?>
+<file path=ppt/slides/slide18.xml><?xml version="1.0" encoding="utf-8"?>
 <p:sld xmlns:a="http://schemas.openxmlformats.org/drawingml/2006/main" xmlns:r="http://schemas.openxmlformats.org/officeDocument/2006/relationships" xmlns:p="http://schemas.openxmlformats.org/presentationml/2006/main">
   <p:cSld>
     <p:spTree>
@@ -4607,6 +4493,146 @@
 </p:sld>
 </file>
 
+<file path=ppt/slides/slide19.xml><?xml version="1.0" encoding="utf-8"?>
+<p:sld xmlns:a="http://schemas.openxmlformats.org/drawingml/2006/main" xmlns:r="http://schemas.openxmlformats.org/officeDocument/2006/relationships" xmlns:p="http://schemas.openxmlformats.org/presentationml/2006/main">
+  <p:cSld>
+    <p:spTree>
+      <p:nvGrpSpPr>
+        <p:cNvPr id="1" name=""/>
+        <p:cNvGrpSpPr/>
+        <p:nvPr/>
+      </p:nvGrpSpPr>
+      <p:grpSpPr>
+        <a:xfrm>
+          <a:off x="0" y="0"/>
+          <a:ext cx="0" cy="0"/>
+          <a:chOff x="0" y="0"/>
+          <a:chExt cx="0" cy="0"/>
+        </a:xfrm>
+      </p:grpSpPr>
+      <p:sp>
+        <p:nvSpPr>
+          <p:cNvPr id="2" name="Title 1">
+            <a:extLst>
+              <a:ext uri="{FF2B5EF4-FFF2-40B4-BE49-F238E27FC236}">
+                <a16:creationId xmlns:a16="http://schemas.microsoft.com/office/drawing/2014/main" id="{19763F4F-4189-4CAC-BE61-827CC3767D44}"/>
+              </a:ext>
+            </a:extLst>
+          </p:cNvPr>
+          <p:cNvSpPr>
+            <a:spLocks noGrp="1"/>
+          </p:cNvSpPr>
+          <p:nvPr>
+            <p:ph type="title"/>
+          </p:nvPr>
+        </p:nvSpPr>
+        <p:spPr/>
+        <p:txBody>
+          <a:bodyPr/>
+          <a:lstStyle/>
+          <a:p>
+            <a:r>
+              <a:rPr lang="en-US" dirty="0"/>
+              <a:t>Demo Code</a:t>
+            </a:r>
+          </a:p>
+        </p:txBody>
+      </p:sp>
+      <p:sp>
+        <p:nvSpPr>
+          <p:cNvPr id="3" name="Content Placeholder 2">
+            <a:extLst>
+              <a:ext uri="{FF2B5EF4-FFF2-40B4-BE49-F238E27FC236}">
+                <a16:creationId xmlns:a16="http://schemas.microsoft.com/office/drawing/2014/main" id="{F948B744-B6D1-7295-0EC0-29823A74405F}"/>
+              </a:ext>
+            </a:extLst>
+          </p:cNvPr>
+          <p:cNvSpPr>
+            <a:spLocks noGrp="1"/>
+          </p:cNvSpPr>
+          <p:nvPr>
+            <p:ph idx="1"/>
+          </p:nvPr>
+        </p:nvSpPr>
+        <p:spPr/>
+        <p:txBody>
+          <a:bodyPr/>
+          <a:lstStyle/>
+          <a:p>
+            <a:r>
+              <a:rPr lang="en-US" dirty="0"/>
+              <a:t>2 Services</a:t>
+            </a:r>
+          </a:p>
+          <a:p>
+            <a:pPr lvl="1"/>
+            <a:r>
+              <a:rPr lang="en-US" dirty="0"/>
+              <a:t>Purchases Service</a:t>
+            </a:r>
+          </a:p>
+          <a:p>
+            <a:pPr lvl="2"/>
+            <a:r>
+              <a:rPr lang="en-US" dirty="0"/>
+              <a:t>Uses SQL Server database</a:t>
+            </a:r>
+          </a:p>
+          <a:p>
+            <a:pPr lvl="2"/>
+            <a:r>
+              <a:rPr lang="en-US" dirty="0" err="1"/>
+              <a:t>ActivitySource</a:t>
+            </a:r>
+            <a:endParaRPr lang="en-US" dirty="0"/>
+          </a:p>
+          <a:p>
+            <a:pPr lvl="1"/>
+            <a:r>
+              <a:rPr lang="en-US" dirty="0"/>
+              <a:t>Users Service</a:t>
+            </a:r>
+          </a:p>
+          <a:p>
+            <a:pPr lvl="2"/>
+            <a:r>
+              <a:rPr lang="en-US" dirty="0"/>
+              <a:t>Uses Cosmos DB</a:t>
+            </a:r>
+          </a:p>
+          <a:p>
+            <a:pPr lvl="2"/>
+            <a:r>
+              <a:rPr lang="en-US" dirty="0"/>
+              <a:t>When purchase made by User, makes HTTP call to Purchases Service</a:t>
+            </a:r>
+          </a:p>
+          <a:p>
+            <a:pPr lvl="2"/>
+            <a:r>
+              <a:rPr lang="en-US" dirty="0"/>
+              <a:t>Trace/Span</a:t>
+            </a:r>
+          </a:p>
+          <a:p>
+            <a:pPr lvl="1"/>
+            <a:endParaRPr lang="en-US" dirty="0"/>
+          </a:p>
+        </p:txBody>
+      </p:sp>
+    </p:spTree>
+    <p:extLst>
+      <p:ext uri="{BB962C8B-B14F-4D97-AF65-F5344CB8AC3E}">
+        <p14:creationId xmlns:p14="http://schemas.microsoft.com/office/powerpoint/2010/main" val="638038387"/>
+      </p:ext>
+    </p:extLst>
+  </p:cSld>
+  <p:clrMapOvr>
+    <a:masterClrMapping/>
+  </p:clrMapOvr>
+</p:sld>
+</file>
+
 <file path=ppt/slides/slide2.xml><?xml version="1.0" encoding="utf-8"?>
 <p:sld xmlns:a="http://schemas.openxmlformats.org/drawingml/2006/main" xmlns:r="http://schemas.openxmlformats.org/officeDocument/2006/relationships" xmlns:p="http://schemas.openxmlformats.org/presentationml/2006/main">
   <p:cSld>
@@ -4767,7 +4793,7 @@
           <p:cNvPr id="2" name="Title 1">
             <a:extLst>
               <a:ext uri="{FF2B5EF4-FFF2-40B4-BE49-F238E27FC236}">
-                <a16:creationId xmlns:a16="http://schemas.microsoft.com/office/drawing/2014/main" id="{19763F4F-4189-4CAC-BE61-827CC3767D44}"/>
+                <a16:creationId xmlns:a16="http://schemas.microsoft.com/office/drawing/2014/main" id="{9FC0D34E-0B37-D3D1-9C8B-DCEE347A1A4D}"/>
               </a:ext>
             </a:extLst>
           </p:cNvPr>
@@ -4785,7 +4811,7 @@
           <a:p>
             <a:r>
               <a:rPr lang="en-US" dirty="0"/>
-              <a:t>Demo Code</a:t>
+              <a:t>Extra Items</a:t>
             </a:r>
           </a:p>
         </p:txBody>
@@ -4795,7 +4821,7 @@
           <p:cNvPr id="3" name="Content Placeholder 2">
             <a:extLst>
               <a:ext uri="{FF2B5EF4-FFF2-40B4-BE49-F238E27FC236}">
-                <a16:creationId xmlns:a16="http://schemas.microsoft.com/office/drawing/2014/main" id="{F948B744-B6D1-7295-0EC0-29823A74405F}"/>
+                <a16:creationId xmlns:a16="http://schemas.microsoft.com/office/drawing/2014/main" id="{0F5CE967-98ED-3637-8D29-B666265DB37C}"/>
               </a:ext>
             </a:extLst>
           </p:cNvPr>
@@ -4811,71 +4837,14 @@
           <a:bodyPr/>
           <a:lstStyle/>
           <a:p>
-            <a:r>
-              <a:rPr lang="en-US" dirty="0"/>
-              <a:t>2 Services</a:t>
-            </a:r>
-          </a:p>
-          <a:p>
-            <a:pPr lvl="1"/>
-            <a:r>
-              <a:rPr lang="en-US" dirty="0"/>
-              <a:t>Purchases Service</a:t>
-            </a:r>
-          </a:p>
-          <a:p>
-            <a:pPr lvl="2"/>
-            <a:r>
-              <a:rPr lang="en-US" dirty="0"/>
-              <a:t>Uses SQL Server database</a:t>
-            </a:r>
-          </a:p>
-          <a:p>
-            <a:pPr lvl="2"/>
-            <a:r>
-              <a:rPr lang="en-US" dirty="0" err="1"/>
-              <a:t>ActivitySource</a:t>
-            </a:r>
-            <a:endParaRPr lang="en-US" dirty="0"/>
-          </a:p>
-          <a:p>
-            <a:pPr lvl="1"/>
-            <a:r>
-              <a:rPr lang="en-US" dirty="0"/>
-              <a:t>Users Service</a:t>
-            </a:r>
-          </a:p>
-          <a:p>
-            <a:pPr lvl="2"/>
-            <a:r>
-              <a:rPr lang="en-US" dirty="0"/>
-              <a:t>Uses Cosmos DB</a:t>
-            </a:r>
-          </a:p>
-          <a:p>
-            <a:pPr lvl="2"/>
-            <a:r>
-              <a:rPr lang="en-US" dirty="0"/>
-              <a:t>When purchase made by User, makes HTTP call to Purchases Service</a:t>
-            </a:r>
-          </a:p>
-          <a:p>
-            <a:pPr lvl="2"/>
-            <a:r>
-              <a:rPr lang="en-US" dirty="0"/>
-              <a:t>Trace/Span</a:t>
-            </a:r>
-          </a:p>
-          <a:p>
-            <a:pPr lvl="1"/>
-            <a:endParaRPr lang="en-US" dirty="0"/>
+            <a:endParaRPr lang="en-US"/>
           </a:p>
         </p:txBody>
       </p:sp>
     </p:spTree>
     <p:extLst>
       <p:ext uri="{BB962C8B-B14F-4D97-AF65-F5344CB8AC3E}">
-        <p14:creationId xmlns:p14="http://schemas.microsoft.com/office/powerpoint/2010/main" val="638038387"/>
+        <p14:creationId xmlns:p14="http://schemas.microsoft.com/office/powerpoint/2010/main" val="1559289309"/>
       </p:ext>
     </p:extLst>
   </p:cSld>
@@ -4907,89 +4876,6 @@
           <p:cNvPr id="2" name="Title 1">
             <a:extLst>
               <a:ext uri="{FF2B5EF4-FFF2-40B4-BE49-F238E27FC236}">
-                <a16:creationId xmlns:a16="http://schemas.microsoft.com/office/drawing/2014/main" id="{9FC0D34E-0B37-D3D1-9C8B-DCEE347A1A4D}"/>
-              </a:ext>
-            </a:extLst>
-          </p:cNvPr>
-          <p:cNvSpPr>
-            <a:spLocks noGrp="1"/>
-          </p:cNvSpPr>
-          <p:nvPr>
-            <p:ph type="title"/>
-          </p:nvPr>
-        </p:nvSpPr>
-        <p:spPr/>
-        <p:txBody>
-          <a:bodyPr/>
-          <a:lstStyle/>
-          <a:p>
-            <a:r>
-              <a:rPr lang="en-US" dirty="0"/>
-              <a:t>Extra Items</a:t>
-            </a:r>
-          </a:p>
-        </p:txBody>
-      </p:sp>
-      <p:sp>
-        <p:nvSpPr>
-          <p:cNvPr id="3" name="Content Placeholder 2">
-            <a:extLst>
-              <a:ext uri="{FF2B5EF4-FFF2-40B4-BE49-F238E27FC236}">
-                <a16:creationId xmlns:a16="http://schemas.microsoft.com/office/drawing/2014/main" id="{0F5CE967-98ED-3637-8D29-B666265DB37C}"/>
-              </a:ext>
-            </a:extLst>
-          </p:cNvPr>
-          <p:cNvSpPr>
-            <a:spLocks noGrp="1"/>
-          </p:cNvSpPr>
-          <p:nvPr>
-            <p:ph idx="1"/>
-          </p:nvPr>
-        </p:nvSpPr>
-        <p:spPr/>
-        <p:txBody>
-          <a:bodyPr/>
-          <a:lstStyle/>
-          <a:p>
-            <a:endParaRPr lang="en-US"/>
-          </a:p>
-        </p:txBody>
-      </p:sp>
-    </p:spTree>
-    <p:extLst>
-      <p:ext uri="{BB962C8B-B14F-4D97-AF65-F5344CB8AC3E}">
-        <p14:creationId xmlns:p14="http://schemas.microsoft.com/office/powerpoint/2010/main" val="1559289309"/>
-      </p:ext>
-    </p:extLst>
-  </p:cSld>
-  <p:clrMapOvr>
-    <a:masterClrMapping/>
-  </p:clrMapOvr>
-</p:sld>
-</file>
-
-<file path=ppt/slides/slide22.xml><?xml version="1.0" encoding="utf-8"?>
-<p:sld xmlns:a="http://schemas.openxmlformats.org/drawingml/2006/main" xmlns:r="http://schemas.openxmlformats.org/officeDocument/2006/relationships" xmlns:p="http://schemas.openxmlformats.org/presentationml/2006/main">
-  <p:cSld>
-    <p:spTree>
-      <p:nvGrpSpPr>
-        <p:cNvPr id="1" name=""/>
-        <p:cNvGrpSpPr/>
-        <p:nvPr/>
-      </p:nvGrpSpPr>
-      <p:grpSpPr>
-        <a:xfrm>
-          <a:off x="0" y="0"/>
-          <a:ext cx="0" cy="0"/>
-          <a:chOff x="0" y="0"/>
-          <a:chExt cx="0" cy="0"/>
-        </a:xfrm>
-      </p:grpSpPr>
-      <p:sp>
-        <p:nvSpPr>
-          <p:cNvPr id="2" name="Title 1">
-            <a:extLst>
-              <a:ext uri="{FF2B5EF4-FFF2-40B4-BE49-F238E27FC236}">
                 <a16:creationId xmlns:a16="http://schemas.microsoft.com/office/drawing/2014/main" id="{1B34032A-7733-FF48-0ED1-FE488BD4E2DD}"/>
               </a:ext>
             </a:extLst>
@@ -5078,7 +4964,7 @@
 </p:sld>
 </file>
 
-<file path=ppt/slides/slide23.xml><?xml version="1.0" encoding="utf-8"?>
+<file path=ppt/slides/slide22.xml><?xml version="1.0" encoding="utf-8"?>
 <p:sld xmlns:a="http://schemas.openxmlformats.org/drawingml/2006/main" xmlns:r="http://schemas.openxmlformats.org/officeDocument/2006/relationships" xmlns:p="http://schemas.openxmlformats.org/presentationml/2006/main">
   <p:cSld>
     <p:spTree>
@@ -5594,7 +5480,7 @@
           <p:cNvPr id="2" name="Title 1">
             <a:extLst>
               <a:ext uri="{FF2B5EF4-FFF2-40B4-BE49-F238E27FC236}">
-                <a16:creationId xmlns:a16="http://schemas.microsoft.com/office/drawing/2014/main" id="{2C6AA810-5B21-CD27-EAE6-10F6BE261640}"/>
+                <a16:creationId xmlns:a16="http://schemas.microsoft.com/office/drawing/2014/main" id="{5E307F74-4B66-E256-883D-61DAB1C2B0A8}"/>
               </a:ext>
             </a:extLst>
           </p:cNvPr>
@@ -5612,7 +5498,7 @@
           <a:p>
             <a:r>
               <a:rPr lang="en-US" dirty="0"/>
-              <a:t>What is Open Telemetry (OTel)?</a:t>
+              <a:t>What is OpenTelemetry (OTel)?</a:t>
             </a:r>
           </a:p>
         </p:txBody>
@@ -5622,7 +5508,7 @@
           <p:cNvPr id="3" name="Content Placeholder 2">
             <a:extLst>
               <a:ext uri="{FF2B5EF4-FFF2-40B4-BE49-F238E27FC236}">
-                <a16:creationId xmlns:a16="http://schemas.microsoft.com/office/drawing/2014/main" id="{3F7DE21D-2382-B67A-2430-4E7BEF80C845}"/>
+                <a16:creationId xmlns:a16="http://schemas.microsoft.com/office/drawing/2014/main" id="{B70B10D9-25F8-1530-119E-C1523AD1F882}"/>
               </a:ext>
             </a:extLst>
           </p:cNvPr>
@@ -5640,6 +5526,27 @@
           <a:p>
             <a:r>
               <a:rPr lang="en-US" dirty="0"/>
+              <a:t>A standard for collecting telemetry data about your services</a:t>
+            </a:r>
+          </a:p>
+          <a:p>
+            <a:r>
+              <a:rPr lang="en-US" dirty="0"/>
+              <a:t>Open Source, Vendor Neutral, Language Agnostic</a:t>
+            </a:r>
+          </a:p>
+          <a:p>
+            <a:r>
+              <a:rPr lang="en-US" dirty="0">
+                <a:hlinkClick r:id="rId2"/>
+              </a:rPr>
+              <a:t>https://opentelemetry.io/</a:t>
+            </a:r>
+            <a:endParaRPr lang="en-US" dirty="0"/>
+          </a:p>
+          <a:p>
+            <a:r>
+              <a:rPr lang="en-US" dirty="0"/>
               <a:t>A different way to log data</a:t>
             </a:r>
           </a:p>
@@ -5649,13 +5556,19 @@
               <a:rPr lang="en-US" dirty="0"/>
               <a:t>A programmatic way</a:t>
             </a:r>
+          </a:p>
+          <a:p>
+            <a:endParaRPr lang="en-US" dirty="0"/>
+          </a:p>
+          <a:p>
+            <a:endParaRPr lang="en-US" dirty="0"/>
           </a:p>
         </p:txBody>
       </p:sp>
     </p:spTree>
     <p:extLst>
       <p:ext uri="{BB962C8B-B14F-4D97-AF65-F5344CB8AC3E}">
-        <p14:creationId xmlns:p14="http://schemas.microsoft.com/office/powerpoint/2010/main" val="1373373935"/>
+        <p14:creationId xmlns:p14="http://schemas.microsoft.com/office/powerpoint/2010/main" val="1831172772"/>
       </p:ext>
     </p:extLst>
   </p:cSld>
@@ -5687,7 +5600,7 @@
           <p:cNvPr id="2" name="Title 1">
             <a:extLst>
               <a:ext uri="{FF2B5EF4-FFF2-40B4-BE49-F238E27FC236}">
-                <a16:creationId xmlns:a16="http://schemas.microsoft.com/office/drawing/2014/main" id="{5E307F74-4B66-E256-883D-61DAB1C2B0A8}"/>
+                <a16:creationId xmlns:a16="http://schemas.microsoft.com/office/drawing/2014/main" id="{AAD5DAA3-53C8-E9B6-E493-EF43BE2291AF}"/>
               </a:ext>
             </a:extLst>
           </p:cNvPr>
@@ -5705,7 +5618,7 @@
           <a:p>
             <a:r>
               <a:rPr lang="en-US" dirty="0"/>
-              <a:t>What is OpenTelemetry (OTel)?</a:t>
+              <a:t>Anything new in OTel?</a:t>
             </a:r>
           </a:p>
         </p:txBody>
@@ -5715,7 +5628,7 @@
           <p:cNvPr id="3" name="Content Placeholder 2">
             <a:extLst>
               <a:ext uri="{FF2B5EF4-FFF2-40B4-BE49-F238E27FC236}">
-                <a16:creationId xmlns:a16="http://schemas.microsoft.com/office/drawing/2014/main" id="{B70B10D9-25F8-1530-119E-C1523AD1F882}"/>
+                <a16:creationId xmlns:a16="http://schemas.microsoft.com/office/drawing/2014/main" id="{19E33655-393E-BA6E-5196-A5AE05A269A1}"/>
               </a:ext>
             </a:extLst>
           </p:cNvPr>
@@ -5733,36 +5646,21 @@
           <a:p>
             <a:r>
               <a:rPr lang="en-US" dirty="0"/>
-              <a:t>A standard for collecting telemetry data about your services</a:t>
-            </a:r>
-          </a:p>
-          <a:p>
-            <a:r>
-              <a:rPr lang="en-US" dirty="0"/>
-              <a:t>Open Source, Vendor Neutral, Language Agnostic</a:t>
-            </a:r>
-          </a:p>
-          <a:p>
-            <a:r>
-              <a:rPr lang="en-US" dirty="0">
-                <a:hlinkClick r:id="rId2"/>
-              </a:rPr>
-              <a:t>https://opentelemetry.io/</a:t>
-            </a:r>
-            <a:endParaRPr lang="en-US" dirty="0"/>
-          </a:p>
-          <a:p>
-            <a:endParaRPr lang="en-US" dirty="0"/>
-          </a:p>
-          <a:p>
-            <a:endParaRPr lang="en-US" dirty="0"/>
+              <a:t>Not really</a:t>
+            </a:r>
+          </a:p>
+          <a:p>
+            <a:r>
+              <a:rPr lang="en-US" dirty="0"/>
+              <a:t>But it standardizes functionality</a:t>
+            </a:r>
           </a:p>
         </p:txBody>
       </p:sp>
     </p:spTree>
     <p:extLst>
       <p:ext uri="{BB962C8B-B14F-4D97-AF65-F5344CB8AC3E}">
-        <p14:creationId xmlns:p14="http://schemas.microsoft.com/office/powerpoint/2010/main" val="1831172772"/>
+        <p14:creationId xmlns:p14="http://schemas.microsoft.com/office/powerpoint/2010/main" val="4089575898"/>
       </p:ext>
     </p:extLst>
   </p:cSld>
@@ -5794,7 +5692,7 @@
           <p:cNvPr id="2" name="Title 1">
             <a:extLst>
               <a:ext uri="{FF2B5EF4-FFF2-40B4-BE49-F238E27FC236}">
-                <a16:creationId xmlns:a16="http://schemas.microsoft.com/office/drawing/2014/main" id="{AAD5DAA3-53C8-E9B6-E493-EF43BE2291AF}"/>
+                <a16:creationId xmlns:a16="http://schemas.microsoft.com/office/drawing/2014/main" id="{D8B96612-17A0-176A-92F7-3BCE97F3A665}"/>
               </a:ext>
             </a:extLst>
           </p:cNvPr>
@@ -5812,7 +5710,7 @@
           <a:p>
             <a:r>
               <a:rPr lang="en-US" dirty="0"/>
-              <a:t>Anything new in OTel?</a:t>
+              <a:t>What kind of data does OTel collect?</a:t>
             </a:r>
           </a:p>
         </p:txBody>
@@ -5822,7 +5720,7 @@
           <p:cNvPr id="3" name="Content Placeholder 2">
             <a:extLst>
               <a:ext uri="{FF2B5EF4-FFF2-40B4-BE49-F238E27FC236}">
-                <a16:creationId xmlns:a16="http://schemas.microsoft.com/office/drawing/2014/main" id="{19E33655-393E-BA6E-5196-A5AE05A269A1}"/>
+                <a16:creationId xmlns:a16="http://schemas.microsoft.com/office/drawing/2014/main" id="{E2E199BB-9297-AC8A-E12E-8C5CB312F3FD}"/>
               </a:ext>
             </a:extLst>
           </p:cNvPr>
@@ -5840,13 +5738,48 @@
           <a:p>
             <a:r>
               <a:rPr lang="en-US" dirty="0"/>
-              <a:t>Not really</a:t>
-            </a:r>
-          </a:p>
-          <a:p>
-            <a:r>
-              <a:rPr lang="en-US" dirty="0"/>
-              <a:t>But it standardizes functionality</a:t>
+              <a:t>Traces</a:t>
+            </a:r>
+          </a:p>
+          <a:p>
+            <a:pPr lvl="1"/>
+            <a:r>
+              <a:rPr lang="en-US" dirty="0"/>
+              <a:t>Tracks requests in the system</a:t>
+            </a:r>
+          </a:p>
+          <a:p>
+            <a:pPr lvl="1"/>
+            <a:r>
+              <a:rPr lang="en-US" dirty="0"/>
+              <a:t>Can add custom spans</a:t>
+            </a:r>
+          </a:p>
+          <a:p>
+            <a:r>
+              <a:rPr lang="en-US" dirty="0"/>
+              <a:t>Metrics</a:t>
+            </a:r>
+          </a:p>
+          <a:p>
+            <a:pPr lvl="1"/>
+            <a:r>
+              <a:rPr lang="en-US" dirty="0"/>
+              <a:t>Performance counters</a:t>
+            </a:r>
+          </a:p>
+          <a:p>
+            <a:pPr lvl="1"/>
+            <a:r>
+              <a:rPr lang="en-US" dirty="0"/>
+              <a:t>Mostly Automatic</a:t>
+            </a:r>
+          </a:p>
+          <a:p>
+            <a:pPr lvl="2"/>
+            <a:r>
+              <a:rPr lang="en-US" dirty="0"/>
+              <a:t>Install agent on box, set some config, leave it alone</a:t>
             </a:r>
           </a:p>
         </p:txBody>
@@ -5854,7 +5787,7 @@
     </p:spTree>
     <p:extLst>
       <p:ext uri="{BB962C8B-B14F-4D97-AF65-F5344CB8AC3E}">
-        <p14:creationId xmlns:p14="http://schemas.microsoft.com/office/powerpoint/2010/main" val="4089575898"/>
+        <p14:creationId xmlns:p14="http://schemas.microsoft.com/office/powerpoint/2010/main" val="2452761775"/>
       </p:ext>
     </p:extLst>
   </p:cSld>
@@ -5886,7 +5819,7 @@
           <p:cNvPr id="2" name="Title 1">
             <a:extLst>
               <a:ext uri="{FF2B5EF4-FFF2-40B4-BE49-F238E27FC236}">
-                <a16:creationId xmlns:a16="http://schemas.microsoft.com/office/drawing/2014/main" id="{D8B96612-17A0-176A-92F7-3BCE97F3A665}"/>
+                <a16:creationId xmlns:a16="http://schemas.microsoft.com/office/drawing/2014/main" id="{E9D5BFED-98DA-1F9D-BD38-501E6FA022AC}"/>
               </a:ext>
             </a:extLst>
           </p:cNvPr>
@@ -5904,7 +5837,7 @@
           <a:p>
             <a:r>
               <a:rPr lang="en-US" dirty="0"/>
-              <a:t>What kind of data does OTel collect?</a:t>
+              <a:t>OTel Metrics</a:t>
             </a:r>
           </a:p>
         </p:txBody>
@@ -5914,7 +5847,7 @@
           <p:cNvPr id="3" name="Content Placeholder 2">
             <a:extLst>
               <a:ext uri="{FF2B5EF4-FFF2-40B4-BE49-F238E27FC236}">
-                <a16:creationId xmlns:a16="http://schemas.microsoft.com/office/drawing/2014/main" id="{E2E199BB-9297-AC8A-E12E-8C5CB312F3FD}"/>
+                <a16:creationId xmlns:a16="http://schemas.microsoft.com/office/drawing/2014/main" id="{8BED0D18-AA50-7A8C-26EC-7C136586261A}"/>
               </a:ext>
             </a:extLst>
           </p:cNvPr>
@@ -5932,48 +5865,34 @@
           <a:p>
             <a:r>
               <a:rPr lang="en-US" dirty="0"/>
-              <a:t>Traces</a:t>
+              <a:t>Counters</a:t>
             </a:r>
           </a:p>
           <a:p>
             <a:pPr lvl="1"/>
             <a:r>
               <a:rPr lang="en-US" dirty="0"/>
-              <a:t>Tracks requests in the system</a:t>
+              <a:t>CPU/Memory usage on the box</a:t>
             </a:r>
           </a:p>
           <a:p>
             <a:pPr lvl="1"/>
             <a:r>
               <a:rPr lang="en-US" dirty="0"/>
-              <a:t>Can add custom spans</a:t>
-            </a:r>
-          </a:p>
-          <a:p>
-            <a:r>
-              <a:rPr lang="en-US" dirty="0"/>
-              <a:t>Metrics</a:t>
+              <a:t>Requests per second</a:t>
+            </a:r>
+          </a:p>
+          <a:p>
+            <a:r>
+              <a:rPr lang="en-US" dirty="0"/>
+              <a:t>Has an API to write custom data to</a:t>
             </a:r>
           </a:p>
           <a:p>
             <a:pPr lvl="1"/>
             <a:r>
               <a:rPr lang="en-US" dirty="0"/>
-              <a:t>Performance counters</a:t>
-            </a:r>
-          </a:p>
-          <a:p>
-            <a:pPr lvl="1"/>
-            <a:r>
-              <a:rPr lang="en-US" dirty="0"/>
-              <a:t>Mostly Automatic</a:t>
-            </a:r>
-          </a:p>
-          <a:p>
-            <a:pPr lvl="2"/>
-            <a:r>
-              <a:rPr lang="en-US" dirty="0"/>
-              <a:t>Install agent on box, set some config, leave it alone</a:t>
+              <a:t>Still in beta</a:t>
             </a:r>
           </a:p>
         </p:txBody>
@@ -5981,7 +5900,7 @@
     </p:spTree>
     <p:extLst>
       <p:ext uri="{BB962C8B-B14F-4D97-AF65-F5344CB8AC3E}">
-        <p14:creationId xmlns:p14="http://schemas.microsoft.com/office/powerpoint/2010/main" val="2452761775"/>
+        <p14:creationId xmlns:p14="http://schemas.microsoft.com/office/powerpoint/2010/main" val="1300523344"/>
       </p:ext>
     </p:extLst>
   </p:cSld>

</xml_diff>